<commit_message>
add reference for chapter 11 - t test
</commit_message>
<xml_diff>
--- a/Lecture 9_sampling distribution/Lecture 9_sampling distribution.pptx
+++ b/Lecture 9_sampling distribution/Lecture 9_sampling distribution.pptx
@@ -5,10 +5,10 @@
     <p:sldMasterId id="2147483648" r:id="rId1"/>
   </p:sldMasterIdLst>
   <p:notesMasterIdLst>
-    <p:notesMasterId r:id="rId48"/>
+    <p:notesMasterId r:id="rId54"/>
   </p:notesMasterIdLst>
   <p:handoutMasterIdLst>
-    <p:handoutMasterId r:id="rId49"/>
+    <p:handoutMasterId r:id="rId55"/>
   </p:handoutMasterIdLst>
   <p:sldIdLst>
     <p:sldId id="257" r:id="rId2"/>
@@ -34,29 +34,35 @@
     <p:sldId id="290" r:id="rId22"/>
     <p:sldId id="292" r:id="rId23"/>
     <p:sldId id="298" r:id="rId24"/>
-    <p:sldId id="271" r:id="rId25"/>
-    <p:sldId id="325" r:id="rId26"/>
-    <p:sldId id="323" r:id="rId27"/>
-    <p:sldId id="324" r:id="rId28"/>
-    <p:sldId id="273" r:id="rId29"/>
-    <p:sldId id="312" r:id="rId30"/>
-    <p:sldId id="274" r:id="rId31"/>
-    <p:sldId id="275" r:id="rId32"/>
-    <p:sldId id="313" r:id="rId33"/>
-    <p:sldId id="276" r:id="rId34"/>
-    <p:sldId id="314" r:id="rId35"/>
-    <p:sldId id="277" r:id="rId36"/>
-    <p:sldId id="315" r:id="rId37"/>
-    <p:sldId id="278" r:id="rId38"/>
-    <p:sldId id="319" r:id="rId39"/>
-    <p:sldId id="327" r:id="rId40"/>
-    <p:sldId id="320" r:id="rId41"/>
-    <p:sldId id="326" r:id="rId42"/>
-    <p:sldId id="321" r:id="rId43"/>
-    <p:sldId id="328" r:id="rId44"/>
-    <p:sldId id="329" r:id="rId45"/>
-    <p:sldId id="322" r:id="rId46"/>
-    <p:sldId id="303" r:id="rId47"/>
+    <p:sldId id="334" r:id="rId25"/>
+    <p:sldId id="335" r:id="rId26"/>
+    <p:sldId id="271" r:id="rId27"/>
+    <p:sldId id="325" r:id="rId28"/>
+    <p:sldId id="323" r:id="rId29"/>
+    <p:sldId id="324" r:id="rId30"/>
+    <p:sldId id="273" r:id="rId31"/>
+    <p:sldId id="312" r:id="rId32"/>
+    <p:sldId id="274" r:id="rId33"/>
+    <p:sldId id="275" r:id="rId34"/>
+    <p:sldId id="313" r:id="rId35"/>
+    <p:sldId id="276" r:id="rId36"/>
+    <p:sldId id="314" r:id="rId37"/>
+    <p:sldId id="277" r:id="rId38"/>
+    <p:sldId id="315" r:id="rId39"/>
+    <p:sldId id="278" r:id="rId40"/>
+    <p:sldId id="319" r:id="rId41"/>
+    <p:sldId id="327" r:id="rId42"/>
+    <p:sldId id="320" r:id="rId43"/>
+    <p:sldId id="326" r:id="rId44"/>
+    <p:sldId id="321" r:id="rId45"/>
+    <p:sldId id="328" r:id="rId46"/>
+    <p:sldId id="329" r:id="rId47"/>
+    <p:sldId id="331" r:id="rId48"/>
+    <p:sldId id="330" r:id="rId49"/>
+    <p:sldId id="322" r:id="rId50"/>
+    <p:sldId id="332" r:id="rId51"/>
+    <p:sldId id="333" r:id="rId52"/>
+    <p:sldId id="303" r:id="rId53"/>
   </p:sldIdLst>
   <p:sldSz cx="9144000" cy="6858000" type="screen4x3"/>
   <p:notesSz cx="7315200" cy="9601200"/>
@@ -157,7 +163,7 @@
   </p:defaultTextStyle>
   <p:extLst>
     <p:ext uri="{EFAFB233-063F-42B5-8137-9DF3F51BA10A}">
-      <p15:sldGuideLst xmlns="" xmlns:p15="http://schemas.microsoft.com/office/powerpoint/2012/main">
+      <p15:sldGuideLst xmlns:p15="http://schemas.microsoft.com/office/powerpoint/2012/main" xmlns="">
         <p15:guide id="1" orient="horz" pos="2160">
           <p15:clr>
             <a:srgbClr val="A4A3A4"/>
@@ -256,7 +262,7 @@
           <a:p>
             <a:fld id="{69CDA215-AF22-475F-A961-78881B639E67}" type="datetimeFigureOut">
               <a:rPr lang="en-US" smtClean="0"/>
-              <a:t>3/8/18</a:t>
+              <a:t>3/13/18</a:t>
             </a:fld>
             <a:endParaRPr lang="en-US"/>
           </a:p>
@@ -421,7 +427,7 @@
           <a:p>
             <a:fld id="{FF9CD7A9-0DC6-47D7-894C-35B8153AD2CB}" type="datetimeFigureOut">
               <a:rPr lang="en-US" smtClean="0"/>
-              <a:t>3/8/18</a:t>
+              <a:t>3/13/18</a:t>
             </a:fld>
             <a:endParaRPr lang="en-US"/>
           </a:p>
@@ -3007,7 +3013,7 @@
           <a:p>
             <a:fld id="{9670BC65-8AAA-4439-AFEF-DA78B7FAA1F0}" type="datetime1">
               <a:rPr lang="en-US" smtClean="0"/>
-              <a:t>3/8/18</a:t>
+              <a:t>3/13/18</a:t>
             </a:fld>
             <a:endParaRPr lang="en-US"/>
           </a:p>
@@ -3175,7 +3181,7 @@
           <a:p>
             <a:fld id="{7E0E5236-C4E6-45E2-B14E-65E57952A16C}" type="datetime1">
               <a:rPr lang="en-US" smtClean="0"/>
-              <a:t>3/8/18</a:t>
+              <a:t>3/13/18</a:t>
             </a:fld>
             <a:endParaRPr lang="en-US"/>
           </a:p>
@@ -3353,7 +3359,7 @@
           <a:p>
             <a:fld id="{C110288B-096E-4794-BE78-FD317393E06C}" type="datetime1">
               <a:rPr lang="en-US" smtClean="0"/>
-              <a:t>3/8/18</a:t>
+              <a:t>3/13/18</a:t>
             </a:fld>
             <a:endParaRPr lang="en-US"/>
           </a:p>
@@ -3521,7 +3527,7 @@
           <a:p>
             <a:fld id="{EE1E176C-60DB-42B7-B2CC-39CEA12A3F36}" type="datetime1">
               <a:rPr lang="en-US" smtClean="0"/>
-              <a:t>3/8/18</a:t>
+              <a:t>3/13/18</a:t>
             </a:fld>
             <a:endParaRPr lang="en-US"/>
           </a:p>
@@ -3766,7 +3772,7 @@
           <a:p>
             <a:fld id="{E382FAFB-F3AC-4A27-8F73-8E9D8D9AE92E}" type="datetime1">
               <a:rPr lang="en-US" smtClean="0"/>
-              <a:t>3/8/18</a:t>
+              <a:t>3/13/18</a:t>
             </a:fld>
             <a:endParaRPr lang="en-US"/>
           </a:p>
@@ -4051,7 +4057,7 @@
           <a:p>
             <a:fld id="{1D1E3FFE-1E43-4BE4-9CA8-135C8CCE7E7D}" type="datetime1">
               <a:rPr lang="en-US" smtClean="0"/>
-              <a:t>3/8/18</a:t>
+              <a:t>3/13/18</a:t>
             </a:fld>
             <a:endParaRPr lang="en-US"/>
           </a:p>
@@ -4470,7 +4476,7 @@
           <a:p>
             <a:fld id="{81190A66-06D8-4E4C-9F95-F774ABBFEB3A}" type="datetime1">
               <a:rPr lang="en-US" smtClean="0"/>
-              <a:t>3/8/18</a:t>
+              <a:t>3/13/18</a:t>
             </a:fld>
             <a:endParaRPr lang="en-US"/>
           </a:p>
@@ -4587,7 +4593,7 @@
           <a:p>
             <a:fld id="{530EAB99-5DD0-4F05-A139-3E0056110267}" type="datetime1">
               <a:rPr lang="en-US" smtClean="0"/>
-              <a:t>3/8/18</a:t>
+              <a:t>3/13/18</a:t>
             </a:fld>
             <a:endParaRPr lang="en-US"/>
           </a:p>
@@ -4682,7 +4688,7 @@
           <a:p>
             <a:fld id="{496BF5FC-381C-48F0-8DC7-1A679BB4F04E}" type="datetime1">
               <a:rPr lang="en-US" smtClean="0"/>
-              <a:t>3/8/18</a:t>
+              <a:t>3/13/18</a:t>
             </a:fld>
             <a:endParaRPr lang="en-US"/>
           </a:p>
@@ -4957,7 +4963,7 @@
           <a:p>
             <a:fld id="{E5E0CE3B-C8B0-4E25-BAD3-943E463C96CB}" type="datetime1">
               <a:rPr lang="en-US" smtClean="0"/>
-              <a:t>3/8/18</a:t>
+              <a:t>3/13/18</a:t>
             </a:fld>
             <a:endParaRPr lang="en-US"/>
           </a:p>
@@ -5209,7 +5215,7 @@
           <a:p>
             <a:fld id="{426A1528-4B59-495A-BA54-39C7AABD0870}" type="datetime1">
               <a:rPr lang="en-US" smtClean="0"/>
-              <a:t>3/8/18</a:t>
+              <a:t>3/13/18</a:t>
             </a:fld>
             <a:endParaRPr lang="en-US"/>
           </a:p>
@@ -5420,7 +5426,7 @@
           <a:p>
             <a:fld id="{6260F93B-6865-4A14-BFD2-8E2908B94C9F}" type="datetime1">
               <a:rPr lang="en-US" smtClean="0"/>
-              <a:t>3/8/18</a:t>
+              <a:t>3/13/18</a:t>
             </a:fld>
             <a:endParaRPr lang="en-US"/>
           </a:p>
@@ -5821,17 +5827,7 @@
                 <a:latin typeface="Palatino Linotype" pitchFamily="18" charset="0"/>
                 <a:ea typeface="Cambria Math" pitchFamily="18" charset="0"/>
               </a:rPr>
-              <a:t>Lecture </a:t>
-            </a:r>
-            <a:r>
-              <a:rPr lang="en-US" sz="3600" b="1" dirty="0">
-                <a:solidFill>
-                  <a:srgbClr val="000099"/>
-                </a:solidFill>
-                <a:latin typeface="Palatino Linotype" pitchFamily="18" charset="0"/>
-                <a:ea typeface="Cambria Math" pitchFamily="18" charset="0"/>
-              </a:rPr>
-              <a:t>9</a:t>
+              <a:t>Lecture 9</a:t>
             </a:r>
             <a:r>
               <a:rPr lang="en-US" sz="3600" b="1" dirty="0" smtClean="0">
@@ -6273,7 +6269,7 @@
           <a:graphicData uri="http://schemas.openxmlformats.org/presentationml/2006/ole">
             <mc:AlternateContent xmlns:mc="http://schemas.openxmlformats.org/markup-compatibility/2006">
               <mc:Choice xmlns:v="urn:schemas-microsoft-com:vml" Requires="v">
-                <p:oleObj spid="_x0000_s16411" name="Bitmap Image" r:id="rId4" imgW="4915080" imgH="3017520" progId="Paint.Picture">
+                <p:oleObj spid="_x0000_s16441" name="Bitmap Image" r:id="rId4" imgW="4915080" imgH="3017520" progId="Paint.Picture">
                   <p:embed/>
                 </p:oleObj>
               </mc:Choice>
@@ -6846,7 +6842,7 @@
           <a:graphicData uri="http://schemas.openxmlformats.org/presentationml/2006/ole">
             <mc:AlternateContent xmlns:mc="http://schemas.openxmlformats.org/markup-compatibility/2006">
               <mc:Choice xmlns:v="urn:schemas-microsoft-com:vml" Requires="v">
-                <p:oleObj spid="_x0000_s12378" name="Equation" r:id="rId4" imgW="203040" imgH="228600" progId="">
+                <p:oleObj spid="_x0000_s12408" name="Equation" r:id="rId4" imgW="203040" imgH="228600" progId="">
                   <p:embed/>
                 </p:oleObj>
               </mc:Choice>
@@ -7631,7 +7627,7 @@
           <a:graphicData uri="http://schemas.openxmlformats.org/presentationml/2006/ole">
             <mc:AlternateContent xmlns:mc="http://schemas.openxmlformats.org/markup-compatibility/2006">
               <mc:Choice xmlns:v="urn:schemas-microsoft-com:vml" Requires="v">
-                <p:oleObj spid="_x0000_s14423" name="Equation" r:id="rId4" imgW="609480" imgH="419040" progId="Equation.DSMT4">
+                <p:oleObj spid="_x0000_s14453" name="Equation" r:id="rId4" imgW="609480" imgH="419040" progId="Equation.DSMT4">
                   <p:embed/>
                 </p:oleObj>
               </mc:Choice>
@@ -7757,7 +7753,7 @@
           <a:graphicData uri="http://schemas.openxmlformats.org/presentationml/2006/ole">
             <mc:AlternateContent xmlns:mc="http://schemas.openxmlformats.org/markup-compatibility/2006">
               <mc:Choice xmlns:v="urn:schemas-microsoft-com:vml" Requires="v">
-                <p:oleObj spid="_x0000_s17550" name="Worksheet" r:id="rId4" imgW="4457734" imgH="1952640" progId="Excel.Sheet.8">
+                <p:oleObj spid="_x0000_s17725" name="Worksheet" r:id="rId4" imgW="4457734" imgH="1952640" progId="Excel.Sheet.8">
                   <p:embed/>
                 </p:oleObj>
               </mc:Choice>
@@ -7817,7 +7813,7 @@
           <a:graphicData uri="http://schemas.openxmlformats.org/presentationml/2006/ole">
             <mc:AlternateContent xmlns:mc="http://schemas.openxmlformats.org/markup-compatibility/2006">
               <mc:Choice xmlns:v="urn:schemas-microsoft-com:vml" Requires="v">
-                <p:oleObj spid="_x0000_s17551" name="Worksheet" r:id="rId6" imgW="37363400" imgH="18516600" progId="Excel.Sheet.8">
+                <p:oleObj spid="_x0000_s17726" name="Worksheet" r:id="rId6" imgW="37363400" imgH="18516600" progId="Excel.Sheet.8">
                   <p:embed/>
                 </p:oleObj>
               </mc:Choice>
@@ -8346,7 +8342,7 @@
           <a:graphicData uri="http://schemas.openxmlformats.org/presentationml/2006/ole">
             <mc:AlternateContent xmlns:mc="http://schemas.openxmlformats.org/markup-compatibility/2006">
               <mc:Choice xmlns:v="urn:schemas-microsoft-com:vml" Requires="v">
-                <p:oleObj spid="_x0000_s17552" name="Worksheet" r:id="rId8" imgW="3076544" imgH="1381050" progId="Excel.Sheet.8">
+                <p:oleObj spid="_x0000_s17727" name="Worksheet" r:id="rId8" imgW="3076544" imgH="1381050" progId="Excel.Sheet.8">
                   <p:embed/>
                 </p:oleObj>
               </mc:Choice>
@@ -8481,7 +8477,7 @@
             <a:graphicData uri="http://schemas.openxmlformats.org/presentationml/2006/ole">
               <mc:AlternateContent xmlns:mc="http://schemas.openxmlformats.org/markup-compatibility/2006">
                 <mc:Choice xmlns:v="urn:schemas-microsoft-com:vml" Requires="v">
-                  <p:oleObj spid="_x0000_s17553" name="Equation" r:id="rId10" imgW="152400" imgH="152400" progId="Equation.3">
+                  <p:oleObj spid="_x0000_s17728" name="Equation" r:id="rId10" imgW="152400" imgH="152400" progId="Equation.3">
                     <p:embed/>
                   </p:oleObj>
                 </mc:Choice>
@@ -9659,7 +9655,7 @@
             <a:graphicData uri="http://schemas.openxmlformats.org/presentationml/2006/ole">
               <mc:AlternateContent xmlns:mc="http://schemas.openxmlformats.org/markup-compatibility/2006">
                 <mc:Choice xmlns:v="urn:schemas-microsoft-com:vml" Requires="v">
-                  <p:oleObj spid="_x0000_s17554" name="Equation" r:id="rId12" imgW="190500" imgH="203200" progId="Equation.3">
+                  <p:oleObj spid="_x0000_s17729" name="Equation" r:id="rId12" imgW="190500" imgH="203200" progId="Equation.3">
                     <p:embed/>
                   </p:oleObj>
                 </mc:Choice>
@@ -9930,7 +9926,7 @@
           <a:graphicData uri="http://schemas.openxmlformats.org/presentationml/2006/ole">
             <mc:AlternateContent xmlns:mc="http://schemas.openxmlformats.org/markup-compatibility/2006">
               <mc:Choice xmlns:v="urn:schemas-microsoft-com:vml" Requires="v">
-                <p:oleObj spid="_x0000_s17555" name="Equation" r:id="rId14" imgW="596900" imgH="381000" progId="Equation.3">
+                <p:oleObj spid="_x0000_s17730" name="Equation" r:id="rId14" imgW="596900" imgH="381000" progId="Equation.3">
                   <p:embed/>
                 </p:oleObj>
               </mc:Choice>
@@ -11867,7 +11863,7 @@
           <a:graphicData uri="http://schemas.openxmlformats.org/presentationml/2006/ole">
             <mc:AlternateContent xmlns:mc="http://schemas.openxmlformats.org/markup-compatibility/2006">
               <mc:Choice xmlns:v="urn:schemas-microsoft-com:vml" Requires="v">
-                <p:oleObj spid="_x0000_s13577" name="Equation" r:id="rId4" imgW="469800" imgH="228600" progId="">
+                <p:oleObj spid="_x0000_s13665" name="Equation" r:id="rId4" imgW="469800" imgH="228600" progId="">
                   <p:embed/>
                 </p:oleObj>
               </mc:Choice>
@@ -11943,7 +11939,7 @@
           <a:graphicData uri="http://schemas.openxmlformats.org/presentationml/2006/ole">
             <mc:AlternateContent xmlns:mc="http://schemas.openxmlformats.org/markup-compatibility/2006">
               <mc:Choice xmlns:v="urn:schemas-microsoft-com:vml" Requires="v">
-                <p:oleObj spid="_x0000_s13578" name="Equation" r:id="rId6" imgW="203040" imgH="241200" progId="">
+                <p:oleObj spid="_x0000_s13666" name="Equation" r:id="rId6" imgW="203040" imgH="241200" progId="">
                   <p:embed/>
                 </p:oleObj>
               </mc:Choice>
@@ -12019,7 +12015,7 @@
           <a:graphicData uri="http://schemas.openxmlformats.org/presentationml/2006/ole">
             <mc:AlternateContent xmlns:mc="http://schemas.openxmlformats.org/markup-compatibility/2006">
               <mc:Choice xmlns:v="urn:schemas-microsoft-com:vml" Requires="v">
-                <p:oleObj spid="_x0000_s13579" name="Equation" r:id="rId8" imgW="355320" imgH="228600" progId="Equation.DSMT4">
+                <p:oleObj spid="_x0000_s13667" name="Equation" r:id="rId8" imgW="355320" imgH="228600" progId="Equation.DSMT4">
                   <p:embed/>
                 </p:oleObj>
               </mc:Choice>
@@ -12091,7 +12087,7 @@
               <a:lstStyle/>
               <a:p>
                 <a14:m>
-                  <m:oMathPara xmlns="" xmlns:m="http://schemas.openxmlformats.org/officeDocument/2006/math">
+                  <m:oMathPara xmlns:m="http://schemas.openxmlformats.org/officeDocument/2006/math" xmlns="">
                     <m:oMathParaPr>
                       <m:jc m:val="centerGroup"/>
                     </m:oMathParaPr>
@@ -13880,6 +13876,230 @@
       </p:grpSpPr>
       <p:sp>
         <p:nvSpPr>
+          <p:cNvPr id="2" name="Title 1"/>
+          <p:cNvSpPr>
+            <a:spLocks noGrp="1"/>
+          </p:cNvSpPr>
+          <p:nvPr>
+            <p:ph type="title"/>
+          </p:nvPr>
+        </p:nvSpPr>
+        <p:spPr/>
+        <p:txBody>
+          <a:bodyPr>
+            <a:normAutofit fontScale="90000"/>
+          </a:bodyPr>
+          <a:lstStyle/>
+          <a:p>
+            <a:r>
+              <a:rPr lang="en-US" b="1" dirty="0" smtClean="0">
+                <a:solidFill>
+                  <a:srgbClr val="FF0000"/>
+                </a:solidFill>
+              </a:rPr>
+              <a:t>Standard deviation vs. standard error</a:t>
+            </a:r>
+            <a:endParaRPr lang="en-US" b="1" dirty="0">
+              <a:solidFill>
+                <a:srgbClr val="FF0000"/>
+              </a:solidFill>
+            </a:endParaRPr>
+          </a:p>
+        </p:txBody>
+      </p:sp>
+      <p:sp>
+        <p:nvSpPr>
+          <p:cNvPr id="3" name="Slide Number Placeholder 2"/>
+          <p:cNvSpPr>
+            <a:spLocks noGrp="1"/>
+          </p:cNvSpPr>
+          <p:nvPr>
+            <p:ph type="sldNum" sz="quarter" idx="12"/>
+          </p:nvPr>
+        </p:nvSpPr>
+        <p:spPr/>
+        <p:txBody>
+          <a:bodyPr/>
+          <a:lstStyle/>
+          <a:p>
+            <a:fld id="{BC036538-61FF-498C-AE50-3DCC7CF1F650}" type="slidenum">
+              <a:rPr lang="en-US" smtClean="0"/>
+              <a:t>24</a:t>
+            </a:fld>
+            <a:endParaRPr lang="en-US"/>
+          </a:p>
+        </p:txBody>
+      </p:sp>
+      <p:pic>
+        <p:nvPicPr>
+          <p:cNvPr id="4" name="Picture 3" descr="Screen Shot 2018-03-13 at 9.51.28 AM.png"/>
+          <p:cNvPicPr>
+            <a:picLocks noChangeAspect="1"/>
+          </p:cNvPicPr>
+          <p:nvPr/>
+        </p:nvPicPr>
+        <p:blipFill>
+          <a:blip r:embed="rId2">
+            <a:extLst>
+              <a:ext uri="{28A0092B-C50C-407E-A947-70E740481C1C}">
+                <a14:useLocalDpi xmlns:a14="http://schemas.microsoft.com/office/drawing/2010/main" val="0"/>
+              </a:ext>
+            </a:extLst>
+          </a:blip>
+          <a:stretch>
+            <a:fillRect/>
+          </a:stretch>
+        </p:blipFill>
+        <p:spPr>
+          <a:xfrm>
+            <a:off x="139700" y="1371600"/>
+            <a:ext cx="9004300" cy="4762500"/>
+          </a:xfrm>
+          <a:prstGeom prst="rect">
+            <a:avLst/>
+          </a:prstGeom>
+        </p:spPr>
+      </p:pic>
+    </p:spTree>
+    <p:extLst>
+      <p:ext uri="{BB962C8B-B14F-4D97-AF65-F5344CB8AC3E}">
+        <p14:creationId xmlns:p14="http://schemas.microsoft.com/office/powerpoint/2010/main" val="7234108"/>
+      </p:ext>
+    </p:extLst>
+  </p:cSld>
+  <p:clrMapOvr>
+    <a:masterClrMapping/>
+  </p:clrMapOvr>
+</p:sld>
+</file>
+
+<file path=ppt/slides/slide25.xml><?xml version="1.0" encoding="utf-8"?>
+<p:sld xmlns:a="http://schemas.openxmlformats.org/drawingml/2006/main" xmlns:r="http://schemas.openxmlformats.org/officeDocument/2006/relationships" xmlns:p="http://schemas.openxmlformats.org/presentationml/2006/main">
+  <p:cSld>
+    <p:spTree>
+      <p:nvGrpSpPr>
+        <p:cNvPr id="1" name=""/>
+        <p:cNvGrpSpPr/>
+        <p:nvPr/>
+      </p:nvGrpSpPr>
+      <p:grpSpPr>
+        <a:xfrm>
+          <a:off x="0" y="0"/>
+          <a:ext cx="0" cy="0"/>
+          <a:chOff x="0" y="0"/>
+          <a:chExt cx="0" cy="0"/>
+        </a:xfrm>
+      </p:grpSpPr>
+      <p:sp>
+        <p:nvSpPr>
+          <p:cNvPr id="2" name="Title 1"/>
+          <p:cNvSpPr>
+            <a:spLocks noGrp="1"/>
+          </p:cNvSpPr>
+          <p:nvPr>
+            <p:ph type="title"/>
+          </p:nvPr>
+        </p:nvSpPr>
+        <p:spPr/>
+        <p:txBody>
+          <a:bodyPr>
+            <a:normAutofit fontScale="90000"/>
+          </a:bodyPr>
+          <a:lstStyle/>
+          <a:p>
+            <a:r>
+              <a:rPr lang="en-US" dirty="0" smtClean="0"/>
+              <a:t>Standard deviation vs. standard error</a:t>
+            </a:r>
+            <a:endParaRPr lang="en-US" dirty="0"/>
+          </a:p>
+        </p:txBody>
+      </p:sp>
+      <p:sp>
+        <p:nvSpPr>
+          <p:cNvPr id="3" name="Slide Number Placeholder 2"/>
+          <p:cNvSpPr>
+            <a:spLocks noGrp="1"/>
+          </p:cNvSpPr>
+          <p:nvPr>
+            <p:ph type="sldNum" sz="quarter" idx="12"/>
+          </p:nvPr>
+        </p:nvSpPr>
+        <p:spPr/>
+        <p:txBody>
+          <a:bodyPr/>
+          <a:lstStyle/>
+          <a:p>
+            <a:fld id="{BC036538-61FF-498C-AE50-3DCC7CF1F650}" type="slidenum">
+              <a:rPr lang="en-US" smtClean="0"/>
+              <a:t>25</a:t>
+            </a:fld>
+            <a:endParaRPr lang="en-US"/>
+          </a:p>
+        </p:txBody>
+      </p:sp>
+      <p:pic>
+        <p:nvPicPr>
+          <p:cNvPr id="5" name="Picture 4" descr="Screen Shot 2018-03-13 at 9.52.26 AM.png"/>
+          <p:cNvPicPr>
+            <a:picLocks noChangeAspect="1"/>
+          </p:cNvPicPr>
+          <p:nvPr/>
+        </p:nvPicPr>
+        <p:blipFill>
+          <a:blip r:embed="rId2">
+            <a:extLst>
+              <a:ext uri="{28A0092B-C50C-407E-A947-70E740481C1C}">
+                <a14:useLocalDpi xmlns:a14="http://schemas.microsoft.com/office/drawing/2010/main" val="0"/>
+              </a:ext>
+            </a:extLst>
+          </a:blip>
+          <a:stretch>
+            <a:fillRect/>
+          </a:stretch>
+        </p:blipFill>
+        <p:spPr>
+          <a:xfrm>
+            <a:off x="508000" y="342900"/>
+            <a:ext cx="8128000" cy="6159500"/>
+          </a:xfrm>
+          <a:prstGeom prst="rect">
+            <a:avLst/>
+          </a:prstGeom>
+        </p:spPr>
+      </p:pic>
+    </p:spTree>
+    <p:extLst>
+      <p:ext uri="{BB962C8B-B14F-4D97-AF65-F5344CB8AC3E}">
+        <p14:creationId xmlns:p14="http://schemas.microsoft.com/office/powerpoint/2010/main" val="3270153729"/>
+      </p:ext>
+    </p:extLst>
+  </p:cSld>
+  <p:clrMapOvr>
+    <a:masterClrMapping/>
+  </p:clrMapOvr>
+</p:sld>
+</file>
+
+<file path=ppt/slides/slide26.xml><?xml version="1.0" encoding="utf-8"?>
+<p:sld xmlns:a="http://schemas.openxmlformats.org/drawingml/2006/main" xmlns:r="http://schemas.openxmlformats.org/officeDocument/2006/relationships" xmlns:p="http://schemas.openxmlformats.org/presentationml/2006/main">
+  <p:cSld>
+    <p:spTree>
+      <p:nvGrpSpPr>
+        <p:cNvPr id="1" name=""/>
+        <p:cNvGrpSpPr/>
+        <p:nvPr/>
+      </p:nvGrpSpPr>
+      <p:grpSpPr>
+        <a:xfrm>
+          <a:off x="0" y="0"/>
+          <a:ext cx="0" cy="0"/>
+          <a:chOff x="0" y="0"/>
+          <a:chExt cx="0" cy="0"/>
+        </a:xfrm>
+      </p:grpSpPr>
+      <p:sp>
+        <p:nvSpPr>
           <p:cNvPr id="32770" name="Rectangle 3"/>
           <p:cNvSpPr>
             <a:spLocks noGrp="1" noChangeArrowheads="1"/>
@@ -14246,7 +14466,7 @@
           <a:graphicData uri="http://schemas.openxmlformats.org/presentationml/2006/ole">
             <mc:AlternateContent xmlns:mc="http://schemas.openxmlformats.org/markup-compatibility/2006">
               <mc:Choice xmlns:v="urn:schemas-microsoft-com:vml" Requires="v">
-                <p:oleObj spid="_x0000_s15435" name="Equation" r:id="rId4" imgW="1015920" imgH="444240" progId="Equation.DSMT4">
+                <p:oleObj spid="_x0000_s15465" name="Equation" r:id="rId4" imgW="1015920" imgH="444240" progId="Equation.DSMT4">
                   <p:embed/>
                 </p:oleObj>
               </mc:Choice>
@@ -14298,7 +14518,7 @@
           <a:p>
             <a:fld id="{BC036538-61FF-498C-AE50-3DCC7CF1F650}" type="slidenum">
               <a:rPr lang="en-US" smtClean="0"/>
-              <a:t>24</a:t>
+              <a:t>26</a:t>
             </a:fld>
             <a:endParaRPr lang="en-US"/>
           </a:p>
@@ -14315,276 +14535,6 @@
     <a:masterClrMapping/>
   </p:clrMapOvr>
   <p:transition xmlns:p14="http://schemas.microsoft.com/office/powerpoint/2010/main"/>
-</p:sld>
-</file>
-
-<file path=ppt/slides/slide25.xml><?xml version="1.0" encoding="utf-8"?>
-<p:sld xmlns:a="http://schemas.openxmlformats.org/drawingml/2006/main" xmlns:r="http://schemas.openxmlformats.org/officeDocument/2006/relationships" xmlns:p="http://schemas.openxmlformats.org/presentationml/2006/main">
-  <p:cSld>
-    <p:spTree>
-      <p:nvGrpSpPr>
-        <p:cNvPr id="1" name=""/>
-        <p:cNvGrpSpPr/>
-        <p:nvPr/>
-      </p:nvGrpSpPr>
-      <p:grpSpPr>
-        <a:xfrm>
-          <a:off x="0" y="0"/>
-          <a:ext cx="0" cy="0"/>
-          <a:chOff x="0" y="0"/>
-          <a:chExt cx="0" cy="0"/>
-        </a:xfrm>
-      </p:grpSpPr>
-      <p:sp>
-        <p:nvSpPr>
-          <p:cNvPr id="2" name="Title 1"/>
-          <p:cNvSpPr>
-            <a:spLocks noGrp="1"/>
-          </p:cNvSpPr>
-          <p:nvPr>
-            <p:ph type="title"/>
-          </p:nvPr>
-        </p:nvSpPr>
-        <p:spPr/>
-        <p:txBody>
-          <a:bodyPr>
-            <a:normAutofit/>
-          </a:bodyPr>
-          <a:lstStyle/>
-          <a:p>
-            <a:r>
-              <a:rPr lang="en-US" b="1" dirty="0">
-                <a:solidFill>
-                  <a:srgbClr val="000099"/>
-                </a:solidFill>
-                <a:latin typeface="Palatino Linotype" pitchFamily="18" charset="0"/>
-                <a:ea typeface="Cambria Math" pitchFamily="18" charset="0"/>
-              </a:rPr>
-              <a:t>Example</a:t>
-            </a:r>
-          </a:p>
-        </p:txBody>
-      </p:sp>
-      <p:sp>
-        <p:nvSpPr>
-          <p:cNvPr id="3" name="Content Placeholder 2"/>
-          <p:cNvSpPr>
-            <a:spLocks noGrp="1"/>
-          </p:cNvSpPr>
-          <p:nvPr>
-            <p:ph idx="1"/>
-          </p:nvPr>
-        </p:nvSpPr>
-        <p:spPr/>
-        <p:txBody>
-          <a:bodyPr>
-            <a:normAutofit/>
-          </a:bodyPr>
-          <a:lstStyle/>
-          <a:p>
-            <a:r>
-              <a:rPr lang="en-US" dirty="0">
-                <a:latin typeface="Palatino Linotype" pitchFamily="18" charset="0"/>
-                <a:ea typeface="宋体" pitchFamily="2" charset="-122"/>
-              </a:rPr>
-              <a:t>IQ scores are normally distributed with a (population) mean of 100 and a (population) standard deviation of 15. What is the sampling distribution of the mean for a sample size of 25?</a:t>
-            </a:r>
-          </a:p>
-          <a:p>
-            <a:endParaRPr lang="en-US" dirty="0">
-              <a:solidFill>
-                <a:schemeClr val="tx2"/>
-              </a:solidFill>
-              <a:latin typeface="Palatino Linotype" pitchFamily="18" charset="0"/>
-              <a:ea typeface="宋体" pitchFamily="2" charset="-122"/>
-            </a:endParaRPr>
-          </a:p>
-          <a:p>
-            <a:endParaRPr lang="en-US" dirty="0">
-              <a:latin typeface="Palatino Linotype" pitchFamily="18" charset="0"/>
-            </a:endParaRPr>
-          </a:p>
-        </p:txBody>
-      </p:sp>
-      <p:sp>
-        <p:nvSpPr>
-          <p:cNvPr id="4" name="Slide Number Placeholder 3"/>
-          <p:cNvSpPr>
-            <a:spLocks noGrp="1"/>
-          </p:cNvSpPr>
-          <p:nvPr>
-            <p:ph type="sldNum" sz="quarter" idx="12"/>
-          </p:nvPr>
-        </p:nvSpPr>
-        <p:spPr/>
-        <p:txBody>
-          <a:bodyPr/>
-          <a:lstStyle/>
-          <a:p>
-            <a:fld id="{BC036538-61FF-498C-AE50-3DCC7CF1F650}" type="slidenum">
-              <a:rPr lang="en-US" smtClean="0"/>
-              <a:t>25</a:t>
-            </a:fld>
-            <a:endParaRPr lang="en-US"/>
-          </a:p>
-        </p:txBody>
-      </p:sp>
-    </p:spTree>
-    <p:extLst>
-      <p:ext uri="{BB962C8B-B14F-4D97-AF65-F5344CB8AC3E}">
-        <p14:creationId xmlns:p14="http://schemas.microsoft.com/office/powerpoint/2010/main" val="1574118818"/>
-      </p:ext>
-    </p:extLst>
-  </p:cSld>
-  <p:clrMapOvr>
-    <a:masterClrMapping/>
-  </p:clrMapOvr>
-</p:sld>
-</file>
-
-<file path=ppt/slides/slide26.xml><?xml version="1.0" encoding="utf-8"?>
-<p:sld xmlns:a="http://schemas.openxmlformats.org/drawingml/2006/main" xmlns:r="http://schemas.openxmlformats.org/officeDocument/2006/relationships" xmlns:p="http://schemas.openxmlformats.org/presentationml/2006/main">
-  <p:cSld>
-    <p:spTree>
-      <p:nvGrpSpPr>
-        <p:cNvPr id="1" name=""/>
-        <p:cNvGrpSpPr/>
-        <p:nvPr/>
-      </p:nvGrpSpPr>
-      <p:grpSpPr>
-        <a:xfrm>
-          <a:off x="0" y="0"/>
-          <a:ext cx="0" cy="0"/>
-          <a:chOff x="0" y="0"/>
-          <a:chExt cx="0" cy="0"/>
-        </a:xfrm>
-      </p:grpSpPr>
-      <p:sp>
-        <p:nvSpPr>
-          <p:cNvPr id="2" name="Title 1"/>
-          <p:cNvSpPr>
-            <a:spLocks noGrp="1"/>
-          </p:cNvSpPr>
-          <p:nvPr>
-            <p:ph type="title"/>
-          </p:nvPr>
-        </p:nvSpPr>
-        <p:spPr/>
-        <p:txBody>
-          <a:bodyPr>
-            <a:normAutofit/>
-          </a:bodyPr>
-          <a:lstStyle/>
-          <a:p>
-            <a:r>
-              <a:rPr lang="en-US" b="1" dirty="0">
-                <a:solidFill>
-                  <a:srgbClr val="000099"/>
-                </a:solidFill>
-                <a:latin typeface="Palatino Linotype" pitchFamily="18" charset="0"/>
-                <a:ea typeface="Cambria Math" pitchFamily="18" charset="0"/>
-              </a:rPr>
-              <a:t>Example</a:t>
-            </a:r>
-          </a:p>
-        </p:txBody>
-      </p:sp>
-      <p:sp>
-        <p:nvSpPr>
-          <p:cNvPr id="3" name="Content Placeholder 2"/>
-          <p:cNvSpPr>
-            <a:spLocks noGrp="1"/>
-          </p:cNvSpPr>
-          <p:nvPr>
-            <p:ph idx="1"/>
-          </p:nvPr>
-        </p:nvSpPr>
-        <p:spPr/>
-        <p:txBody>
-          <a:bodyPr>
-            <a:normAutofit fontScale="92500" lnSpcReduction="10000"/>
-          </a:bodyPr>
-          <a:lstStyle/>
-          <a:p>
-            <a:r>
-              <a:rPr lang="en-US" dirty="0">
-                <a:latin typeface="Palatino Linotype" pitchFamily="18" charset="0"/>
-                <a:ea typeface="宋体" pitchFamily="2" charset="-122"/>
-              </a:rPr>
-              <a:t>IQ scores are normally distributed with a (population) mean of 100 and a (population) standard deviation of 15. What is the sampling distribution of the mean for a sample size of 25?</a:t>
-            </a:r>
-          </a:p>
-          <a:p>
-            <a:endParaRPr lang="en-US" dirty="0">
-              <a:solidFill>
-                <a:schemeClr val="tx2"/>
-              </a:solidFill>
-              <a:latin typeface="Palatino Linotype" pitchFamily="18" charset="0"/>
-              <a:ea typeface="宋体" pitchFamily="2" charset="-122"/>
-            </a:endParaRPr>
-          </a:p>
-          <a:p>
-            <a:r>
-              <a:rPr lang="en-US" u="sng" dirty="0">
-                <a:latin typeface="Palatino Linotype" pitchFamily="18" charset="0"/>
-                <a:ea typeface="宋体" pitchFamily="2" charset="-122"/>
-              </a:rPr>
-              <a:t>Solution:</a:t>
-            </a:r>
-          </a:p>
-          <a:p>
-            <a:pPr>
-              <a:buFont typeface="Wingdings 3" pitchFamily="18" charset="2"/>
-              <a:buNone/>
-            </a:pPr>
-            <a:r>
-              <a:rPr lang="en-US" dirty="0">
-                <a:latin typeface="Palatino Linotype" pitchFamily="18" charset="0"/>
-                <a:ea typeface="宋体" pitchFamily="2" charset="-122"/>
-              </a:rPr>
-              <a:t>	First, because IQ scores are normally distributed, so the sampling distribution of the mean will be normally distributed</a:t>
-            </a:r>
-          </a:p>
-          <a:p>
-            <a:endParaRPr lang="en-US" dirty="0">
-              <a:latin typeface="Palatino Linotype" pitchFamily="18" charset="0"/>
-            </a:endParaRPr>
-          </a:p>
-        </p:txBody>
-      </p:sp>
-      <p:sp>
-        <p:nvSpPr>
-          <p:cNvPr id="4" name="Slide Number Placeholder 3"/>
-          <p:cNvSpPr>
-            <a:spLocks noGrp="1"/>
-          </p:cNvSpPr>
-          <p:nvPr>
-            <p:ph type="sldNum" sz="quarter" idx="12"/>
-          </p:nvPr>
-        </p:nvSpPr>
-        <p:spPr/>
-        <p:txBody>
-          <a:bodyPr/>
-          <a:lstStyle/>
-          <a:p>
-            <a:fld id="{BC036538-61FF-498C-AE50-3DCC7CF1F650}" type="slidenum">
-              <a:rPr lang="en-US" smtClean="0"/>
-              <a:t>26</a:t>
-            </a:fld>
-            <a:endParaRPr lang="en-US"/>
-          </a:p>
-        </p:txBody>
-      </p:sp>
-    </p:spTree>
-    <p:extLst>
-      <p:ext uri="{BB962C8B-B14F-4D97-AF65-F5344CB8AC3E}">
-        <p14:creationId xmlns:p14="http://schemas.microsoft.com/office/powerpoint/2010/main" val="2687480915"/>
-      </p:ext>
-    </p:extLst>
-  </p:cSld>
-  <p:clrMapOvr>
-    <a:masterClrMapping/>
-  </p:clrMapOvr>
 </p:sld>
 </file>
 
@@ -14607,6 +14557,276 @@
       </p:grpSpPr>
       <p:sp>
         <p:nvSpPr>
+          <p:cNvPr id="2" name="Title 1"/>
+          <p:cNvSpPr>
+            <a:spLocks noGrp="1"/>
+          </p:cNvSpPr>
+          <p:nvPr>
+            <p:ph type="title"/>
+          </p:nvPr>
+        </p:nvSpPr>
+        <p:spPr/>
+        <p:txBody>
+          <a:bodyPr>
+            <a:normAutofit/>
+          </a:bodyPr>
+          <a:lstStyle/>
+          <a:p>
+            <a:r>
+              <a:rPr lang="en-US" b="1" dirty="0">
+                <a:solidFill>
+                  <a:srgbClr val="000099"/>
+                </a:solidFill>
+                <a:latin typeface="Palatino Linotype" pitchFamily="18" charset="0"/>
+                <a:ea typeface="Cambria Math" pitchFamily="18" charset="0"/>
+              </a:rPr>
+              <a:t>Example</a:t>
+            </a:r>
+          </a:p>
+        </p:txBody>
+      </p:sp>
+      <p:sp>
+        <p:nvSpPr>
+          <p:cNvPr id="3" name="Content Placeholder 2"/>
+          <p:cNvSpPr>
+            <a:spLocks noGrp="1"/>
+          </p:cNvSpPr>
+          <p:nvPr>
+            <p:ph idx="1"/>
+          </p:nvPr>
+        </p:nvSpPr>
+        <p:spPr/>
+        <p:txBody>
+          <a:bodyPr>
+            <a:normAutofit/>
+          </a:bodyPr>
+          <a:lstStyle/>
+          <a:p>
+            <a:r>
+              <a:rPr lang="en-US" dirty="0">
+                <a:latin typeface="Palatino Linotype" pitchFamily="18" charset="0"/>
+                <a:ea typeface="宋体" pitchFamily="2" charset="-122"/>
+              </a:rPr>
+              <a:t>IQ scores are normally distributed with a (population) mean of 100 and a (population) standard deviation of 15. What is the sampling distribution of the mean for a sample size of 25?</a:t>
+            </a:r>
+          </a:p>
+          <a:p>
+            <a:endParaRPr lang="en-US" dirty="0">
+              <a:solidFill>
+                <a:schemeClr val="tx2"/>
+              </a:solidFill>
+              <a:latin typeface="Palatino Linotype" pitchFamily="18" charset="0"/>
+              <a:ea typeface="宋体" pitchFamily="2" charset="-122"/>
+            </a:endParaRPr>
+          </a:p>
+          <a:p>
+            <a:endParaRPr lang="en-US" dirty="0">
+              <a:latin typeface="Palatino Linotype" pitchFamily="18" charset="0"/>
+            </a:endParaRPr>
+          </a:p>
+        </p:txBody>
+      </p:sp>
+      <p:sp>
+        <p:nvSpPr>
+          <p:cNvPr id="4" name="Slide Number Placeholder 3"/>
+          <p:cNvSpPr>
+            <a:spLocks noGrp="1"/>
+          </p:cNvSpPr>
+          <p:nvPr>
+            <p:ph type="sldNum" sz="quarter" idx="12"/>
+          </p:nvPr>
+        </p:nvSpPr>
+        <p:spPr/>
+        <p:txBody>
+          <a:bodyPr/>
+          <a:lstStyle/>
+          <a:p>
+            <a:fld id="{BC036538-61FF-498C-AE50-3DCC7CF1F650}" type="slidenum">
+              <a:rPr lang="en-US" smtClean="0"/>
+              <a:t>27</a:t>
+            </a:fld>
+            <a:endParaRPr lang="en-US"/>
+          </a:p>
+        </p:txBody>
+      </p:sp>
+    </p:spTree>
+    <p:extLst>
+      <p:ext uri="{BB962C8B-B14F-4D97-AF65-F5344CB8AC3E}">
+        <p14:creationId xmlns:p14="http://schemas.microsoft.com/office/powerpoint/2010/main" val="1574118818"/>
+      </p:ext>
+    </p:extLst>
+  </p:cSld>
+  <p:clrMapOvr>
+    <a:masterClrMapping/>
+  </p:clrMapOvr>
+</p:sld>
+</file>
+
+<file path=ppt/slides/slide28.xml><?xml version="1.0" encoding="utf-8"?>
+<p:sld xmlns:a="http://schemas.openxmlformats.org/drawingml/2006/main" xmlns:r="http://schemas.openxmlformats.org/officeDocument/2006/relationships" xmlns:p="http://schemas.openxmlformats.org/presentationml/2006/main">
+  <p:cSld>
+    <p:spTree>
+      <p:nvGrpSpPr>
+        <p:cNvPr id="1" name=""/>
+        <p:cNvGrpSpPr/>
+        <p:nvPr/>
+      </p:nvGrpSpPr>
+      <p:grpSpPr>
+        <a:xfrm>
+          <a:off x="0" y="0"/>
+          <a:ext cx="0" cy="0"/>
+          <a:chOff x="0" y="0"/>
+          <a:chExt cx="0" cy="0"/>
+        </a:xfrm>
+      </p:grpSpPr>
+      <p:sp>
+        <p:nvSpPr>
+          <p:cNvPr id="2" name="Title 1"/>
+          <p:cNvSpPr>
+            <a:spLocks noGrp="1"/>
+          </p:cNvSpPr>
+          <p:nvPr>
+            <p:ph type="title"/>
+          </p:nvPr>
+        </p:nvSpPr>
+        <p:spPr/>
+        <p:txBody>
+          <a:bodyPr>
+            <a:normAutofit/>
+          </a:bodyPr>
+          <a:lstStyle/>
+          <a:p>
+            <a:r>
+              <a:rPr lang="en-US" b="1" dirty="0">
+                <a:solidFill>
+                  <a:srgbClr val="000099"/>
+                </a:solidFill>
+                <a:latin typeface="Palatino Linotype" pitchFamily="18" charset="0"/>
+                <a:ea typeface="Cambria Math" pitchFamily="18" charset="0"/>
+              </a:rPr>
+              <a:t>Example</a:t>
+            </a:r>
+          </a:p>
+        </p:txBody>
+      </p:sp>
+      <p:sp>
+        <p:nvSpPr>
+          <p:cNvPr id="3" name="Content Placeholder 2"/>
+          <p:cNvSpPr>
+            <a:spLocks noGrp="1"/>
+          </p:cNvSpPr>
+          <p:nvPr>
+            <p:ph idx="1"/>
+          </p:nvPr>
+        </p:nvSpPr>
+        <p:spPr/>
+        <p:txBody>
+          <a:bodyPr>
+            <a:normAutofit fontScale="92500" lnSpcReduction="10000"/>
+          </a:bodyPr>
+          <a:lstStyle/>
+          <a:p>
+            <a:r>
+              <a:rPr lang="en-US" dirty="0">
+                <a:latin typeface="Palatino Linotype" pitchFamily="18" charset="0"/>
+                <a:ea typeface="宋体" pitchFamily="2" charset="-122"/>
+              </a:rPr>
+              <a:t>IQ scores are normally distributed with a (population) mean of 100 and a (population) standard deviation of 15. What is the sampling distribution of the mean for a sample size of 25?</a:t>
+            </a:r>
+          </a:p>
+          <a:p>
+            <a:endParaRPr lang="en-US" dirty="0">
+              <a:solidFill>
+                <a:schemeClr val="tx2"/>
+              </a:solidFill>
+              <a:latin typeface="Palatino Linotype" pitchFamily="18" charset="0"/>
+              <a:ea typeface="宋体" pitchFamily="2" charset="-122"/>
+            </a:endParaRPr>
+          </a:p>
+          <a:p>
+            <a:r>
+              <a:rPr lang="en-US" u="sng" dirty="0">
+                <a:latin typeface="Palatino Linotype" pitchFamily="18" charset="0"/>
+                <a:ea typeface="宋体" pitchFamily="2" charset="-122"/>
+              </a:rPr>
+              <a:t>Solution:</a:t>
+            </a:r>
+          </a:p>
+          <a:p>
+            <a:pPr>
+              <a:buFont typeface="Wingdings 3" pitchFamily="18" charset="2"/>
+              <a:buNone/>
+            </a:pPr>
+            <a:r>
+              <a:rPr lang="en-US" dirty="0">
+                <a:latin typeface="Palatino Linotype" pitchFamily="18" charset="0"/>
+                <a:ea typeface="宋体" pitchFamily="2" charset="-122"/>
+              </a:rPr>
+              <a:t>	First, because IQ scores are normally distributed, so the sampling distribution of the mean will be normally distributed</a:t>
+            </a:r>
+          </a:p>
+          <a:p>
+            <a:endParaRPr lang="en-US" dirty="0">
+              <a:latin typeface="Palatino Linotype" pitchFamily="18" charset="0"/>
+            </a:endParaRPr>
+          </a:p>
+        </p:txBody>
+      </p:sp>
+      <p:sp>
+        <p:nvSpPr>
+          <p:cNvPr id="4" name="Slide Number Placeholder 3"/>
+          <p:cNvSpPr>
+            <a:spLocks noGrp="1"/>
+          </p:cNvSpPr>
+          <p:nvPr>
+            <p:ph type="sldNum" sz="quarter" idx="12"/>
+          </p:nvPr>
+        </p:nvSpPr>
+        <p:spPr/>
+        <p:txBody>
+          <a:bodyPr/>
+          <a:lstStyle/>
+          <a:p>
+            <a:fld id="{BC036538-61FF-498C-AE50-3DCC7CF1F650}" type="slidenum">
+              <a:rPr lang="en-US" smtClean="0"/>
+              <a:t>28</a:t>
+            </a:fld>
+            <a:endParaRPr lang="en-US"/>
+          </a:p>
+        </p:txBody>
+      </p:sp>
+    </p:spTree>
+    <p:extLst>
+      <p:ext uri="{BB962C8B-B14F-4D97-AF65-F5344CB8AC3E}">
+        <p14:creationId xmlns:p14="http://schemas.microsoft.com/office/powerpoint/2010/main" val="2687480915"/>
+      </p:ext>
+    </p:extLst>
+  </p:cSld>
+  <p:clrMapOvr>
+    <a:masterClrMapping/>
+  </p:clrMapOvr>
+</p:sld>
+</file>
+
+<file path=ppt/slides/slide29.xml><?xml version="1.0" encoding="utf-8"?>
+<p:sld xmlns:a="http://schemas.openxmlformats.org/drawingml/2006/main" xmlns:r="http://schemas.openxmlformats.org/officeDocument/2006/relationships" xmlns:p="http://schemas.openxmlformats.org/presentationml/2006/main">
+  <p:cSld>
+    <p:spTree>
+      <p:nvGrpSpPr>
+        <p:cNvPr id="1" name=""/>
+        <p:cNvGrpSpPr/>
+        <p:nvPr/>
+      </p:nvGrpSpPr>
+      <p:grpSpPr>
+        <a:xfrm>
+          <a:off x="0" y="0"/>
+          <a:ext cx="0" cy="0"/>
+          <a:chOff x="0" y="0"/>
+          <a:chExt cx="0" cy="0"/>
+        </a:xfrm>
+      </p:grpSpPr>
+      <p:sp>
+        <p:nvSpPr>
           <p:cNvPr id="4100" name="Rectangle 3"/>
           <p:cNvSpPr>
             <a:spLocks noGrp="1" noChangeArrowheads="1"/>
@@ -14862,7 +15082,7 @@
           <a:graphicData uri="http://schemas.openxmlformats.org/presentationml/2006/ole">
             <mc:AlternateContent xmlns:mc="http://schemas.openxmlformats.org/markup-compatibility/2006">
               <mc:Choice xmlns:v="urn:schemas-microsoft-com:vml" Requires="v">
-                <p:oleObj spid="_x0000_s19500" name="Equation" r:id="rId4" imgW="977900" imgH="241300" progId="Equation.3">
+                <p:oleObj spid="_x0000_s19559" name="Equation" r:id="rId4" imgW="977900" imgH="241300" progId="Equation.3">
                   <p:embed/>
                 </p:oleObj>
               </mc:Choice>
@@ -14990,7 +15210,7 @@
           <a:graphicData uri="http://schemas.openxmlformats.org/presentationml/2006/ole">
             <mc:AlternateContent xmlns:mc="http://schemas.openxmlformats.org/markup-compatibility/2006">
               <mc:Choice xmlns:v="urn:schemas-microsoft-com:vml" Requires="v">
-                <p:oleObj spid="_x0000_s19501" name="Equation" r:id="rId6" imgW="1333500" imgH="431800" progId="Equation.3">
+                <p:oleObj spid="_x0000_s19560" name="Equation" r:id="rId6" imgW="1333500" imgH="431800" progId="Equation.3">
                   <p:embed/>
                 </p:oleObj>
               </mc:Choice>
@@ -15061,7 +15281,7 @@
           <a:p>
             <a:fld id="{BC036538-61FF-498C-AE50-3DCC7CF1F650}" type="slidenum">
               <a:rPr lang="en-US" smtClean="0"/>
-              <a:t>27</a:t>
+              <a:t>29</a:t>
             </a:fld>
             <a:endParaRPr lang="en-US"/>
           </a:p>
@@ -15081,7 +15301,7 @@
 </p:sld>
 </file>
 
-<file path=ppt/slides/slide28.xml><?xml version="1.0" encoding="utf-8"?>
+<file path=ppt/slides/slide3.xml><?xml version="1.0" encoding="utf-8"?>
 <p:sld xmlns:a="http://schemas.openxmlformats.org/drawingml/2006/main" xmlns:r="http://schemas.openxmlformats.org/officeDocument/2006/relationships" xmlns:p="http://schemas.openxmlformats.org/presentationml/2006/main">
   <p:cSld>
     <p:spTree>
@@ -15100,6 +15320,580 @@
       </p:grpSpPr>
       <p:sp>
         <p:nvSpPr>
+          <p:cNvPr id="2" name="Title 1"/>
+          <p:cNvSpPr>
+            <a:spLocks noGrp="1"/>
+          </p:cNvSpPr>
+          <p:nvPr>
+            <p:ph type="title"/>
+          </p:nvPr>
+        </p:nvSpPr>
+        <p:spPr/>
+        <p:txBody>
+          <a:bodyPr/>
+          <a:lstStyle/>
+          <a:p>
+            <a:r>
+              <a:rPr lang="en-US" b="1" dirty="0">
+                <a:solidFill>
+                  <a:srgbClr val="000099"/>
+                </a:solidFill>
+                <a:latin typeface="Palatino Linotype" pitchFamily="18" charset="0"/>
+                <a:ea typeface="Cambria Math" pitchFamily="18" charset="0"/>
+              </a:rPr>
+              <a:t>Review of Probability</a:t>
+            </a:r>
+            <a:endParaRPr lang="en-US" dirty="0">
+              <a:latin typeface="Palatino Linotype" pitchFamily="18" charset="0"/>
+            </a:endParaRPr>
+          </a:p>
+        </p:txBody>
+      </p:sp>
+      <p:sp>
+        <p:nvSpPr>
+          <p:cNvPr id="3" name="Content Placeholder 2"/>
+          <p:cNvSpPr>
+            <a:spLocks noGrp="1"/>
+          </p:cNvSpPr>
+          <p:nvPr>
+            <p:ph idx="1"/>
+          </p:nvPr>
+        </p:nvSpPr>
+        <p:spPr/>
+        <p:txBody>
+          <a:bodyPr>
+            <a:normAutofit lnSpcReduction="10000"/>
+          </a:bodyPr>
+          <a:lstStyle/>
+          <a:p>
+            <a:r>
+              <a:rPr lang="en-US" sz="2800" dirty="0">
+                <a:latin typeface="Palatino Linotype" pitchFamily="18" charset="0"/>
+              </a:rPr>
+              <a:t>Sampling with and without replacement</a:t>
+            </a:r>
+          </a:p>
+          <a:p>
+            <a:r>
+              <a:rPr lang="en-US" sz="2800" dirty="0">
+                <a:latin typeface="Palatino Linotype" pitchFamily="18" charset="0"/>
+              </a:rPr>
+              <a:t>Conditional probability and Bayes theorem</a:t>
+            </a:r>
+          </a:p>
+          <a:p>
+            <a:endParaRPr lang="en-US" sz="2800" dirty="0">
+              <a:latin typeface="Palatino Linotype" pitchFamily="18" charset="0"/>
+            </a:endParaRPr>
+          </a:p>
+          <a:p>
+            <a:endParaRPr lang="en-US" sz="2800" dirty="0">
+              <a:latin typeface="Palatino Linotype" pitchFamily="18" charset="0"/>
+            </a:endParaRPr>
+          </a:p>
+          <a:p>
+            <a:r>
+              <a:rPr lang="en-US" sz="2800" dirty="0">
+                <a:latin typeface="Palatino Linotype" pitchFamily="18" charset="0"/>
+              </a:rPr>
+              <a:t>Probability rules</a:t>
+            </a:r>
+          </a:p>
+          <a:p>
+            <a:pPr lvl="1"/>
+            <a:r>
+              <a:rPr lang="en-US" sz="2400" dirty="0">
+                <a:latin typeface="Palatino Linotype" pitchFamily="18" charset="0"/>
+                <a:ea typeface="Cambria Math" pitchFamily="18" charset="0"/>
+                <a:cs typeface="Times" pitchFamily="18" charset="0"/>
+              </a:rPr>
+              <a:t>Probability is bounded by 0 and 1</a:t>
+            </a:r>
+          </a:p>
+          <a:p>
+            <a:pPr lvl="1"/>
+            <a:r>
+              <a:rPr lang="en-US" sz="2400" dirty="0">
+                <a:latin typeface="Palatino Linotype" pitchFamily="18" charset="0"/>
+                <a:ea typeface="Cambria Math" pitchFamily="18" charset="0"/>
+                <a:cs typeface="Times" pitchFamily="18" charset="0"/>
+              </a:rPr>
+              <a:t>Sample space has a probability of 1</a:t>
+            </a:r>
+          </a:p>
+          <a:p>
+            <a:pPr lvl="1"/>
+            <a:r>
+              <a:rPr lang="en-US" sz="2400" dirty="0">
+                <a:latin typeface="Palatino Linotype" pitchFamily="18" charset="0"/>
+                <a:ea typeface="Cambria Math" pitchFamily="18" charset="0"/>
+                <a:cs typeface="Times" pitchFamily="18" charset="0"/>
+              </a:rPr>
+              <a:t>Mutually exclusive events </a:t>
+            </a:r>
+            <a:r>
+              <a:rPr lang="en-US" sz="2000" i="1" dirty="0">
+                <a:solidFill>
+                  <a:srgbClr val="FF0000"/>
+                </a:solidFill>
+                <a:latin typeface="Palatino Linotype" pitchFamily="18" charset="0"/>
+                <a:ea typeface="Cambria Math" pitchFamily="18" charset="0"/>
+                <a:cs typeface="Times" pitchFamily="18" charset="0"/>
+              </a:rPr>
+              <a:t>P</a:t>
+            </a:r>
+            <a:r>
+              <a:rPr lang="en-US" sz="2000" dirty="0">
+                <a:solidFill>
+                  <a:srgbClr val="FF0000"/>
+                </a:solidFill>
+                <a:latin typeface="Palatino Linotype" pitchFamily="18" charset="0"/>
+                <a:ea typeface="Cambria Math" pitchFamily="18" charset="0"/>
+                <a:cs typeface="Times" pitchFamily="18" charset="0"/>
+              </a:rPr>
+              <a:t>(A or B) = </a:t>
+            </a:r>
+            <a:r>
+              <a:rPr lang="en-US" sz="2000" i="1" dirty="0">
+                <a:solidFill>
+                  <a:srgbClr val="FF0000"/>
+                </a:solidFill>
+                <a:latin typeface="Palatino Linotype" pitchFamily="18" charset="0"/>
+                <a:ea typeface="Cambria Math" pitchFamily="18" charset="0"/>
+                <a:cs typeface="Times" pitchFamily="18" charset="0"/>
+              </a:rPr>
+              <a:t>P</a:t>
+            </a:r>
+            <a:r>
+              <a:rPr lang="en-US" sz="2000" dirty="0">
+                <a:solidFill>
+                  <a:srgbClr val="FF0000"/>
+                </a:solidFill>
+                <a:latin typeface="Palatino Linotype" pitchFamily="18" charset="0"/>
+                <a:ea typeface="Cambria Math" pitchFamily="18" charset="0"/>
+                <a:cs typeface="Times" pitchFamily="18" charset="0"/>
+              </a:rPr>
+              <a:t>(A) + </a:t>
+            </a:r>
+            <a:r>
+              <a:rPr lang="en-US" sz="2000" i="1" dirty="0">
+                <a:solidFill>
+                  <a:srgbClr val="FF0000"/>
+                </a:solidFill>
+                <a:latin typeface="Palatino Linotype" pitchFamily="18" charset="0"/>
+                <a:ea typeface="Cambria Math" pitchFamily="18" charset="0"/>
+                <a:cs typeface="Times" pitchFamily="18" charset="0"/>
+              </a:rPr>
+              <a:t>P</a:t>
+            </a:r>
+            <a:r>
+              <a:rPr lang="en-US" sz="2000" dirty="0">
+                <a:solidFill>
+                  <a:srgbClr val="FF0000"/>
+                </a:solidFill>
+                <a:latin typeface="Palatino Linotype" pitchFamily="18" charset="0"/>
+                <a:ea typeface="Cambria Math" pitchFamily="18" charset="0"/>
+                <a:cs typeface="Times" pitchFamily="18" charset="0"/>
+              </a:rPr>
+              <a:t>(B) or general addition rule </a:t>
+            </a:r>
+            <a:r>
+              <a:rPr lang="en-US" sz="2000" i="1" dirty="0">
+                <a:solidFill>
+                  <a:srgbClr val="FF0000"/>
+                </a:solidFill>
+                <a:latin typeface="Palatino Linotype" pitchFamily="18" charset="0"/>
+                <a:ea typeface="Cambria Math" pitchFamily="18" charset="0"/>
+                <a:cs typeface="Times" pitchFamily="18" charset="0"/>
+              </a:rPr>
+              <a:t>P</a:t>
+            </a:r>
+            <a:r>
+              <a:rPr lang="en-US" sz="2000" dirty="0">
+                <a:solidFill>
+                  <a:srgbClr val="FF0000"/>
+                </a:solidFill>
+                <a:latin typeface="Palatino Linotype" pitchFamily="18" charset="0"/>
+                <a:ea typeface="Cambria Math" pitchFamily="18" charset="0"/>
+                <a:cs typeface="Times" pitchFamily="18" charset="0"/>
+              </a:rPr>
+              <a:t>(A or B) = </a:t>
+            </a:r>
+            <a:r>
+              <a:rPr lang="en-US" sz="2000" i="1" dirty="0">
+                <a:solidFill>
+                  <a:srgbClr val="FF0000"/>
+                </a:solidFill>
+                <a:latin typeface="Palatino Linotype" pitchFamily="18" charset="0"/>
+                <a:ea typeface="Cambria Math" pitchFamily="18" charset="0"/>
+                <a:cs typeface="Times" pitchFamily="18" charset="0"/>
+              </a:rPr>
+              <a:t>P</a:t>
+            </a:r>
+            <a:r>
+              <a:rPr lang="en-US" sz="2000" dirty="0">
+                <a:solidFill>
+                  <a:srgbClr val="FF0000"/>
+                </a:solidFill>
+                <a:latin typeface="Palatino Linotype" pitchFamily="18" charset="0"/>
+                <a:ea typeface="Cambria Math" pitchFamily="18" charset="0"/>
+                <a:cs typeface="Times" pitchFamily="18" charset="0"/>
+              </a:rPr>
+              <a:t>(A) + </a:t>
+            </a:r>
+            <a:r>
+              <a:rPr lang="en-US" sz="2000" i="1" dirty="0">
+                <a:solidFill>
+                  <a:srgbClr val="FF0000"/>
+                </a:solidFill>
+                <a:latin typeface="Palatino Linotype" pitchFamily="18" charset="0"/>
+                <a:ea typeface="Cambria Math" pitchFamily="18" charset="0"/>
+                <a:cs typeface="Times" pitchFamily="18" charset="0"/>
+              </a:rPr>
+              <a:t>P</a:t>
+            </a:r>
+            <a:r>
+              <a:rPr lang="en-US" sz="2000" dirty="0">
+                <a:solidFill>
+                  <a:srgbClr val="FF0000"/>
+                </a:solidFill>
+                <a:latin typeface="Palatino Linotype" pitchFamily="18" charset="0"/>
+                <a:ea typeface="Cambria Math" pitchFamily="18" charset="0"/>
+                <a:cs typeface="Times" pitchFamily="18" charset="0"/>
+              </a:rPr>
+              <a:t>(B) –</a:t>
+            </a:r>
+            <a:r>
+              <a:rPr lang="en-US" sz="2000" i="1" dirty="0">
+                <a:solidFill>
+                  <a:srgbClr val="FF0000"/>
+                </a:solidFill>
+                <a:latin typeface="Palatino Linotype" pitchFamily="18" charset="0"/>
+                <a:ea typeface="Cambria Math" pitchFamily="18" charset="0"/>
+                <a:cs typeface="Times" pitchFamily="18" charset="0"/>
+              </a:rPr>
+              <a:t> P</a:t>
+            </a:r>
+            <a:r>
+              <a:rPr lang="en-US" sz="2000" dirty="0">
+                <a:solidFill>
+                  <a:srgbClr val="FF0000"/>
+                </a:solidFill>
+                <a:latin typeface="Palatino Linotype" pitchFamily="18" charset="0"/>
+                <a:ea typeface="Cambria Math" pitchFamily="18" charset="0"/>
+                <a:cs typeface="Times" pitchFamily="18" charset="0"/>
+              </a:rPr>
+              <a:t>(A and B)</a:t>
+            </a:r>
+          </a:p>
+          <a:p>
+            <a:pPr lvl="1"/>
+            <a:r>
+              <a:rPr lang="en-US" sz="2400" dirty="0">
+                <a:latin typeface="Palatino Linotype" pitchFamily="18" charset="0"/>
+                <a:ea typeface="Cambria Math" pitchFamily="18" charset="0"/>
+                <a:cs typeface="Times" pitchFamily="18" charset="0"/>
+              </a:rPr>
+              <a:t>Multiplication Rule for Independent Events</a:t>
+            </a:r>
+          </a:p>
+          <a:p>
+            <a:pPr lvl="1"/>
+            <a:endParaRPr lang="en-US" sz="2400" dirty="0">
+              <a:latin typeface="Palatino Linotype" pitchFamily="18" charset="0"/>
+            </a:endParaRPr>
+          </a:p>
+        </p:txBody>
+      </p:sp>
+      <p:graphicFrame>
+        <p:nvGraphicFramePr>
+          <p:cNvPr id="4" name="Object 3"/>
+          <p:cNvGraphicFramePr>
+            <a:graphicFrameLocks noChangeAspect="1"/>
+          </p:cNvGraphicFramePr>
+          <p:nvPr>
+            <p:extLst>
+              <p:ext uri="{D42A27DB-BD31-4B8C-83A1-F6EECF244321}">
+                <p14:modId xmlns:p14="http://schemas.microsoft.com/office/powerpoint/2010/main" val="3683154649"/>
+              </p:ext>
+            </p:extLst>
+          </p:nvPr>
+        </p:nvGraphicFramePr>
+        <p:xfrm>
+          <a:off x="2667000" y="2590800"/>
+          <a:ext cx="2590800" cy="838200"/>
+        </p:xfrm>
+        <a:graphic>
+          <a:graphicData uri="http://schemas.openxmlformats.org/presentationml/2006/ole">
+            <mc:AlternateContent xmlns:mc="http://schemas.openxmlformats.org/markup-compatibility/2006">
+              <mc:Choice xmlns:v="urn:schemas-microsoft-com:vml" Requires="v">
+                <p:oleObj spid="_x0000_s11399" name="Equation" r:id="rId3" imgW="1295280" imgH="419040" progId="Equation.DSMT4">
+                  <p:embed/>
+                </p:oleObj>
+              </mc:Choice>
+              <mc:Fallback>
+                <p:oleObj name="Equation" r:id="rId3" imgW="1295280" imgH="419040" progId="Equation.DSMT4">
+                  <p:embed/>
+                  <p:pic>
+                    <p:nvPicPr>
+                      <p:cNvPr id="0" name="Object 4"/>
+                      <p:cNvPicPr>
+                        <a:picLocks noChangeAspect="1" noChangeArrowheads="1"/>
+                      </p:cNvPicPr>
+                      <p:nvPr/>
+                    </p:nvPicPr>
+                    <p:blipFill>
+                      <a:blip r:embed="rId4">
+                        <a:extLst>
+                          <a:ext uri="{28A0092B-C50C-407E-A947-70E740481C1C}">
+                            <a14:useLocalDpi xmlns:a14="http://schemas.microsoft.com/office/drawing/2010/main" val="0"/>
+                          </a:ext>
+                        </a:extLst>
+                      </a:blip>
+                      <a:srcRect/>
+                      <a:stretch>
+                        <a:fillRect/>
+                      </a:stretch>
+                    </p:blipFill>
+                    <p:spPr bwMode="auto">
+                      <a:xfrm>
+                        <a:off x="2667000" y="2590800"/>
+                        <a:ext cx="2590800" cy="838200"/>
+                      </a:xfrm>
+                      <a:prstGeom prst="rect">
+                        <a:avLst/>
+                      </a:prstGeom>
+                      <a:noFill/>
+                      <a:ln>
+                        <a:noFill/>
+                      </a:ln>
+                      <a:extLst>
+                        <a:ext uri="{909E8E84-426E-40dd-AFC4-6F175D3DCCD1}">
+                          <a14:hiddenFill xmlns:a14="http://schemas.microsoft.com/office/drawing/2010/main">
+                            <a:solidFill>
+                              <a:srgbClr val="FFFFFF"/>
+                            </a:solidFill>
+                          </a14:hiddenFill>
+                        </a:ext>
+                        <a:ext uri="{91240B29-F687-4f45-9708-019B960494DF}">
+                          <a14:hiddenLine xmlns:a14="http://schemas.microsoft.com/office/drawing/2010/main" w="9525">
+                            <a:solidFill>
+                              <a:srgbClr val="000000"/>
+                            </a:solidFill>
+                            <a:miter lim="800000"/>
+                            <a:headEnd/>
+                            <a:tailEnd/>
+                          </a14:hiddenLine>
+                        </a:ext>
+                      </a:extLst>
+                    </p:spPr>
+                  </p:pic>
+                </p:oleObj>
+              </mc:Fallback>
+            </mc:AlternateContent>
+          </a:graphicData>
+        </a:graphic>
+      </p:graphicFrame>
+      <p:sp>
+        <p:nvSpPr>
+          <p:cNvPr id="5" name="Rectangle 4"/>
+          <p:cNvSpPr/>
+          <p:nvPr/>
+        </p:nvSpPr>
+        <p:spPr>
+          <a:xfrm>
+            <a:off x="1295400" y="5867400"/>
+            <a:ext cx="3358483" cy="369332"/>
+          </a:xfrm>
+          <a:prstGeom prst="rect">
+            <a:avLst/>
+          </a:prstGeom>
+        </p:spPr>
+        <p:txBody>
+          <a:bodyPr wrap="none">
+            <a:spAutoFit/>
+          </a:bodyPr>
+          <a:lstStyle/>
+          <a:p>
+            <a:pPr lvl="2"/>
+            <a:r>
+              <a:rPr lang="en-US" i="1" dirty="0">
+                <a:latin typeface="Palatino Linotype" pitchFamily="18" charset="0"/>
+                <a:ea typeface="Cambria Math" pitchFamily="18" charset="0"/>
+                <a:cs typeface="Times" pitchFamily="18" charset="0"/>
+              </a:rPr>
+              <a:t>P</a:t>
+            </a:r>
+            <a:r>
+              <a:rPr lang="en-US" dirty="0">
+                <a:latin typeface="Palatino Linotype" pitchFamily="18" charset="0"/>
+                <a:ea typeface="Cambria Math" pitchFamily="18" charset="0"/>
+                <a:cs typeface="Times" pitchFamily="18" charset="0"/>
+              </a:rPr>
+              <a:t>(A and B) = </a:t>
+            </a:r>
+            <a:r>
+              <a:rPr lang="en-US" i="1" dirty="0">
+                <a:latin typeface="Palatino Linotype" pitchFamily="18" charset="0"/>
+                <a:ea typeface="Cambria Math" pitchFamily="18" charset="0"/>
+                <a:cs typeface="Times" pitchFamily="18" charset="0"/>
+              </a:rPr>
+              <a:t>P</a:t>
+            </a:r>
+            <a:r>
+              <a:rPr lang="en-US" dirty="0">
+                <a:latin typeface="Palatino Linotype" pitchFamily="18" charset="0"/>
+                <a:ea typeface="Cambria Math" pitchFamily="18" charset="0"/>
+                <a:cs typeface="Times" pitchFamily="18" charset="0"/>
+              </a:rPr>
+              <a:t>(A)</a:t>
+            </a:r>
+            <a:r>
+              <a:rPr lang="en-US" i="1" dirty="0">
+                <a:latin typeface="Palatino Linotype" pitchFamily="18" charset="0"/>
+                <a:ea typeface="Cambria Math" pitchFamily="18" charset="0"/>
+                <a:cs typeface="Times" pitchFamily="18" charset="0"/>
+              </a:rPr>
+              <a:t>P</a:t>
+            </a:r>
+            <a:r>
+              <a:rPr lang="en-US" dirty="0">
+                <a:latin typeface="Palatino Linotype" pitchFamily="18" charset="0"/>
+                <a:ea typeface="Cambria Math" pitchFamily="18" charset="0"/>
+                <a:cs typeface="Times" pitchFamily="18" charset="0"/>
+              </a:rPr>
+              <a:t>(B)</a:t>
+            </a:r>
+            <a:endParaRPr lang="en-US" i="1" dirty="0">
+              <a:latin typeface="Palatino Linotype" pitchFamily="18" charset="0"/>
+              <a:ea typeface="Cambria Math" pitchFamily="18" charset="0"/>
+              <a:cs typeface="Times" pitchFamily="18" charset="0"/>
+            </a:endParaRPr>
+          </a:p>
+        </p:txBody>
+      </p:sp>
+      <p:sp>
+        <p:nvSpPr>
+          <p:cNvPr id="6" name="Rectangle 5"/>
+          <p:cNvSpPr/>
+          <p:nvPr/>
+        </p:nvSpPr>
+        <p:spPr>
+          <a:xfrm>
+            <a:off x="1295400" y="6324600"/>
+            <a:ext cx="3818225" cy="369332"/>
+          </a:xfrm>
+          <a:prstGeom prst="rect">
+            <a:avLst/>
+          </a:prstGeom>
+        </p:spPr>
+        <p:txBody>
+          <a:bodyPr wrap="none">
+            <a:spAutoFit/>
+          </a:bodyPr>
+          <a:lstStyle/>
+          <a:p>
+            <a:pPr lvl="2"/>
+            <a:r>
+              <a:rPr lang="en-US" i="1" dirty="0">
+                <a:latin typeface="Palatino Linotype" pitchFamily="18" charset="0"/>
+                <a:ea typeface="Cambria Math" pitchFamily="18" charset="0"/>
+              </a:rPr>
+              <a:t>P</a:t>
+            </a:r>
+            <a:r>
+              <a:rPr lang="en-US" dirty="0">
+                <a:latin typeface="Palatino Linotype" pitchFamily="18" charset="0"/>
+                <a:ea typeface="Cambria Math" pitchFamily="18" charset="0"/>
+              </a:rPr>
+              <a:t>(A and B) = </a:t>
+            </a:r>
+            <a:r>
+              <a:rPr lang="en-US" i="1" dirty="0">
+                <a:latin typeface="Palatino Linotype" pitchFamily="18" charset="0"/>
+                <a:ea typeface="Cambria Math" pitchFamily="18" charset="0"/>
+              </a:rPr>
+              <a:t>P</a:t>
+            </a:r>
+            <a:r>
+              <a:rPr lang="en-US" dirty="0">
+                <a:latin typeface="Palatino Linotype" pitchFamily="18" charset="0"/>
+                <a:ea typeface="Cambria Math" pitchFamily="18" charset="0"/>
+              </a:rPr>
+              <a:t>(A) </a:t>
+            </a:r>
+            <a:r>
+              <a:rPr lang="en-US" i="1" dirty="0">
+                <a:latin typeface="Palatino Linotype" pitchFamily="18" charset="0"/>
+                <a:ea typeface="Cambria Math" pitchFamily="18" charset="0"/>
+              </a:rPr>
+              <a:t>P</a:t>
+            </a:r>
+            <a:r>
+              <a:rPr lang="en-US" dirty="0">
+                <a:latin typeface="Palatino Linotype" pitchFamily="18" charset="0"/>
+                <a:ea typeface="Cambria Math" pitchFamily="18" charset="0"/>
+              </a:rPr>
+              <a:t>(B | A)</a:t>
+            </a:r>
+          </a:p>
+        </p:txBody>
+      </p:sp>
+      <p:sp>
+        <p:nvSpPr>
+          <p:cNvPr id="7" name="Slide Number Placeholder 6"/>
+          <p:cNvSpPr>
+            <a:spLocks noGrp="1"/>
+          </p:cNvSpPr>
+          <p:nvPr>
+            <p:ph type="sldNum" sz="quarter" idx="12"/>
+          </p:nvPr>
+        </p:nvSpPr>
+        <p:spPr/>
+        <p:txBody>
+          <a:bodyPr/>
+          <a:lstStyle/>
+          <a:p>
+            <a:fld id="{BC036538-61FF-498C-AE50-3DCC7CF1F650}" type="slidenum">
+              <a:rPr lang="en-US" smtClean="0"/>
+              <a:t>3</a:t>
+            </a:fld>
+            <a:endParaRPr lang="en-US"/>
+          </a:p>
+        </p:txBody>
+      </p:sp>
+    </p:spTree>
+    <p:extLst>
+      <p:ext uri="{BB962C8B-B14F-4D97-AF65-F5344CB8AC3E}">
+        <p14:creationId xmlns:p14="http://schemas.microsoft.com/office/powerpoint/2010/main" val="1770794613"/>
+      </p:ext>
+    </p:extLst>
+  </p:cSld>
+  <p:clrMapOvr>
+    <a:masterClrMapping/>
+  </p:clrMapOvr>
+</p:sld>
+</file>
+
+<file path=ppt/slides/slide30.xml><?xml version="1.0" encoding="utf-8"?>
+<p:sld xmlns:a="http://schemas.openxmlformats.org/drawingml/2006/main" xmlns:r="http://schemas.openxmlformats.org/officeDocument/2006/relationships" xmlns:p="http://schemas.openxmlformats.org/presentationml/2006/main">
+  <p:cSld>
+    <p:spTree>
+      <p:nvGrpSpPr>
+        <p:cNvPr id="1" name=""/>
+        <p:cNvGrpSpPr/>
+        <p:nvPr/>
+      </p:nvGrpSpPr>
+      <p:grpSpPr>
+        <a:xfrm>
+          <a:off x="0" y="0"/>
+          <a:ext cx="0" cy="0"/>
+          <a:chOff x="0" y="0"/>
+          <a:chExt cx="0" cy="0"/>
+        </a:xfrm>
+      </p:grpSpPr>
+      <p:sp>
+        <p:nvSpPr>
           <p:cNvPr id="6147" name="Rectangle 3"/>
           <p:cNvSpPr>
             <a:spLocks noGrp="1" noChangeArrowheads="1"/>
@@ -15584,7 +16378,7 @@
           <a:graphicData uri="http://schemas.openxmlformats.org/presentationml/2006/ole">
             <mc:AlternateContent xmlns:mc="http://schemas.openxmlformats.org/markup-compatibility/2006">
               <mc:Choice xmlns:v="urn:schemas-microsoft-com:vml" Requires="v">
-                <p:oleObj spid="_x0000_s6258" name="Equation" r:id="rId4" imgW="2019300" imgH="469900" progId="Equation.3">
+                <p:oleObj spid="_x0000_s6288" name="Equation" r:id="rId4" imgW="2019300" imgH="469900" progId="Equation.3">
                   <p:embed/>
                 </p:oleObj>
               </mc:Choice>
@@ -15655,9 +16449,58 @@
           <a:p>
             <a:fld id="{BC036538-61FF-498C-AE50-3DCC7CF1F650}" type="slidenum">
               <a:rPr lang="en-US" smtClean="0"/>
-              <a:t>28</a:t>
+              <a:t>30</a:t>
             </a:fld>
             <a:endParaRPr lang="en-US"/>
+          </a:p>
+        </p:txBody>
+      </p:sp>
+      <p:sp>
+        <p:nvSpPr>
+          <p:cNvPr id="3" name="Rounded Rectangle 2"/>
+          <p:cNvSpPr/>
+          <p:nvPr/>
+        </p:nvSpPr>
+        <p:spPr>
+          <a:xfrm>
+            <a:off x="5638800" y="4800600"/>
+            <a:ext cx="2819400" cy="1447800"/>
+          </a:xfrm>
+          <a:prstGeom prst="roundRect">
+            <a:avLst/>
+          </a:prstGeom>
+        </p:spPr>
+        <p:style>
+          <a:lnRef idx="1">
+            <a:schemeClr val="accent1"/>
+          </a:lnRef>
+          <a:fillRef idx="3">
+            <a:schemeClr val="accent1"/>
+          </a:fillRef>
+          <a:effectRef idx="2">
+            <a:schemeClr val="accent1"/>
+          </a:effectRef>
+          <a:fontRef idx="minor">
+            <a:schemeClr val="lt1"/>
+          </a:fontRef>
+        </p:style>
+        <p:txBody>
+          <a:bodyPr rtlCol="0" anchor="ctr"/>
+          <a:lstStyle/>
+          <a:p>
+            <a:pPr algn="ctr"/>
+            <a:r>
+              <a:rPr lang="is-IS" dirty="0"/>
+              <a:t>&gt; 1-pnorm(2)</a:t>
+            </a:r>
+          </a:p>
+          <a:p>
+            <a:pPr algn="ctr"/>
+            <a:r>
+              <a:rPr lang="is-IS" dirty="0"/>
+              <a:t>[1] 0.02275013</a:t>
+            </a:r>
+            <a:endParaRPr lang="en-US" dirty="0"/>
           </a:p>
         </p:txBody>
       </p:sp>
@@ -15675,7 +16518,7 @@
 </p:sld>
 </file>
 
-<file path=ppt/slides/slide29.xml><?xml version="1.0" encoding="utf-8"?>
+<file path=ppt/slides/slide31.xml><?xml version="1.0" encoding="utf-8"?>
 <p:sld xmlns:a="http://schemas.openxmlformats.org/drawingml/2006/main" xmlns:r="http://schemas.openxmlformats.org/officeDocument/2006/relationships" xmlns:p="http://schemas.openxmlformats.org/presentationml/2006/main">
   <p:cSld>
     <p:spTree>
@@ -16235,7 +17078,7 @@
           <a:graphicData uri="http://schemas.openxmlformats.org/presentationml/2006/ole">
             <mc:AlternateContent xmlns:mc="http://schemas.openxmlformats.org/markup-compatibility/2006">
               <mc:Choice xmlns:v="urn:schemas-microsoft-com:vml" Requires="v">
-                <p:oleObj spid="_x0000_s18457" name="Equation" r:id="rId4" imgW="215640" imgH="241200" progId="Equation.DSMT4">
+                <p:oleObj spid="_x0000_s18487" name="Equation" r:id="rId4" imgW="215640" imgH="241200" progId="Equation.DSMT4">
                   <p:embed/>
                 </p:oleObj>
               </mc:Choice>
@@ -16329,7 +17172,7 @@
           <a:p>
             <a:fld id="{BC036538-61FF-498C-AE50-3DCC7CF1F650}" type="slidenum">
               <a:rPr lang="en-US" smtClean="0"/>
-              <a:t>29</a:t>
+              <a:t>31</a:t>
             </a:fld>
             <a:endParaRPr lang="en-US"/>
           </a:p>
@@ -16349,7 +17192,7 @@
 </p:sld>
 </file>
 
-<file path=ppt/slides/slide3.xml><?xml version="1.0" encoding="utf-8"?>
+<file path=ppt/slides/slide32.xml><?xml version="1.0" encoding="utf-8"?>
 <p:sld xmlns:a="http://schemas.openxmlformats.org/drawingml/2006/main" xmlns:r="http://schemas.openxmlformats.org/officeDocument/2006/relationships" xmlns:p="http://schemas.openxmlformats.org/presentationml/2006/main">
   <p:cSld>
     <p:spTree>
@@ -16368,580 +17211,6 @@
       </p:grpSpPr>
       <p:sp>
         <p:nvSpPr>
-          <p:cNvPr id="2" name="Title 1"/>
-          <p:cNvSpPr>
-            <a:spLocks noGrp="1"/>
-          </p:cNvSpPr>
-          <p:nvPr>
-            <p:ph type="title"/>
-          </p:nvPr>
-        </p:nvSpPr>
-        <p:spPr/>
-        <p:txBody>
-          <a:bodyPr/>
-          <a:lstStyle/>
-          <a:p>
-            <a:r>
-              <a:rPr lang="en-US" b="1" dirty="0">
-                <a:solidFill>
-                  <a:srgbClr val="000099"/>
-                </a:solidFill>
-                <a:latin typeface="Palatino Linotype" pitchFamily="18" charset="0"/>
-                <a:ea typeface="Cambria Math" pitchFamily="18" charset="0"/>
-              </a:rPr>
-              <a:t>Review of Probability</a:t>
-            </a:r>
-            <a:endParaRPr lang="en-US" dirty="0">
-              <a:latin typeface="Palatino Linotype" pitchFamily="18" charset="0"/>
-            </a:endParaRPr>
-          </a:p>
-        </p:txBody>
-      </p:sp>
-      <p:sp>
-        <p:nvSpPr>
-          <p:cNvPr id="3" name="Content Placeholder 2"/>
-          <p:cNvSpPr>
-            <a:spLocks noGrp="1"/>
-          </p:cNvSpPr>
-          <p:nvPr>
-            <p:ph idx="1"/>
-          </p:nvPr>
-        </p:nvSpPr>
-        <p:spPr/>
-        <p:txBody>
-          <a:bodyPr>
-            <a:normAutofit lnSpcReduction="10000"/>
-          </a:bodyPr>
-          <a:lstStyle/>
-          <a:p>
-            <a:r>
-              <a:rPr lang="en-US" sz="2800" dirty="0">
-                <a:latin typeface="Palatino Linotype" pitchFamily="18" charset="0"/>
-              </a:rPr>
-              <a:t>Sampling with and without replacement</a:t>
-            </a:r>
-          </a:p>
-          <a:p>
-            <a:r>
-              <a:rPr lang="en-US" sz="2800" dirty="0">
-                <a:latin typeface="Palatino Linotype" pitchFamily="18" charset="0"/>
-              </a:rPr>
-              <a:t>Conditional probability and Bayes theorem</a:t>
-            </a:r>
-          </a:p>
-          <a:p>
-            <a:endParaRPr lang="en-US" sz="2800" dirty="0">
-              <a:latin typeface="Palatino Linotype" pitchFamily="18" charset="0"/>
-            </a:endParaRPr>
-          </a:p>
-          <a:p>
-            <a:endParaRPr lang="en-US" sz="2800" dirty="0">
-              <a:latin typeface="Palatino Linotype" pitchFamily="18" charset="0"/>
-            </a:endParaRPr>
-          </a:p>
-          <a:p>
-            <a:r>
-              <a:rPr lang="en-US" sz="2800" dirty="0">
-                <a:latin typeface="Palatino Linotype" pitchFamily="18" charset="0"/>
-              </a:rPr>
-              <a:t>Probability rules</a:t>
-            </a:r>
-          </a:p>
-          <a:p>
-            <a:pPr lvl="1"/>
-            <a:r>
-              <a:rPr lang="en-US" sz="2400" dirty="0">
-                <a:latin typeface="Palatino Linotype" pitchFamily="18" charset="0"/>
-                <a:ea typeface="Cambria Math" pitchFamily="18" charset="0"/>
-                <a:cs typeface="Times" pitchFamily="18" charset="0"/>
-              </a:rPr>
-              <a:t>Probability is bounded by 0 and 1</a:t>
-            </a:r>
-          </a:p>
-          <a:p>
-            <a:pPr lvl="1"/>
-            <a:r>
-              <a:rPr lang="en-US" sz="2400" dirty="0">
-                <a:latin typeface="Palatino Linotype" pitchFamily="18" charset="0"/>
-                <a:ea typeface="Cambria Math" pitchFamily="18" charset="0"/>
-                <a:cs typeface="Times" pitchFamily="18" charset="0"/>
-              </a:rPr>
-              <a:t>Sample space has a probability of 1</a:t>
-            </a:r>
-          </a:p>
-          <a:p>
-            <a:pPr lvl="1"/>
-            <a:r>
-              <a:rPr lang="en-US" sz="2400" dirty="0">
-                <a:latin typeface="Palatino Linotype" pitchFamily="18" charset="0"/>
-                <a:ea typeface="Cambria Math" pitchFamily="18" charset="0"/>
-                <a:cs typeface="Times" pitchFamily="18" charset="0"/>
-              </a:rPr>
-              <a:t>Mutually exclusive events </a:t>
-            </a:r>
-            <a:r>
-              <a:rPr lang="en-US" sz="2000" i="1" dirty="0">
-                <a:solidFill>
-                  <a:srgbClr val="FF0000"/>
-                </a:solidFill>
-                <a:latin typeface="Palatino Linotype" pitchFamily="18" charset="0"/>
-                <a:ea typeface="Cambria Math" pitchFamily="18" charset="0"/>
-                <a:cs typeface="Times" pitchFamily="18" charset="0"/>
-              </a:rPr>
-              <a:t>P</a:t>
-            </a:r>
-            <a:r>
-              <a:rPr lang="en-US" sz="2000" dirty="0">
-                <a:solidFill>
-                  <a:srgbClr val="FF0000"/>
-                </a:solidFill>
-                <a:latin typeface="Palatino Linotype" pitchFamily="18" charset="0"/>
-                <a:ea typeface="Cambria Math" pitchFamily="18" charset="0"/>
-                <a:cs typeface="Times" pitchFamily="18" charset="0"/>
-              </a:rPr>
-              <a:t>(A or B) = </a:t>
-            </a:r>
-            <a:r>
-              <a:rPr lang="en-US" sz="2000" i="1" dirty="0">
-                <a:solidFill>
-                  <a:srgbClr val="FF0000"/>
-                </a:solidFill>
-                <a:latin typeface="Palatino Linotype" pitchFamily="18" charset="0"/>
-                <a:ea typeface="Cambria Math" pitchFamily="18" charset="0"/>
-                <a:cs typeface="Times" pitchFamily="18" charset="0"/>
-              </a:rPr>
-              <a:t>P</a:t>
-            </a:r>
-            <a:r>
-              <a:rPr lang="en-US" sz="2000" dirty="0">
-                <a:solidFill>
-                  <a:srgbClr val="FF0000"/>
-                </a:solidFill>
-                <a:latin typeface="Palatino Linotype" pitchFamily="18" charset="0"/>
-                <a:ea typeface="Cambria Math" pitchFamily="18" charset="0"/>
-                <a:cs typeface="Times" pitchFamily="18" charset="0"/>
-              </a:rPr>
-              <a:t>(A) + </a:t>
-            </a:r>
-            <a:r>
-              <a:rPr lang="en-US" sz="2000" i="1" dirty="0">
-                <a:solidFill>
-                  <a:srgbClr val="FF0000"/>
-                </a:solidFill>
-                <a:latin typeface="Palatino Linotype" pitchFamily="18" charset="0"/>
-                <a:ea typeface="Cambria Math" pitchFamily="18" charset="0"/>
-                <a:cs typeface="Times" pitchFamily="18" charset="0"/>
-              </a:rPr>
-              <a:t>P</a:t>
-            </a:r>
-            <a:r>
-              <a:rPr lang="en-US" sz="2000" dirty="0">
-                <a:solidFill>
-                  <a:srgbClr val="FF0000"/>
-                </a:solidFill>
-                <a:latin typeface="Palatino Linotype" pitchFamily="18" charset="0"/>
-                <a:ea typeface="Cambria Math" pitchFamily="18" charset="0"/>
-                <a:cs typeface="Times" pitchFamily="18" charset="0"/>
-              </a:rPr>
-              <a:t>(B) or general addition rule </a:t>
-            </a:r>
-            <a:r>
-              <a:rPr lang="en-US" sz="2000" i="1" dirty="0">
-                <a:solidFill>
-                  <a:srgbClr val="FF0000"/>
-                </a:solidFill>
-                <a:latin typeface="Palatino Linotype" pitchFamily="18" charset="0"/>
-                <a:ea typeface="Cambria Math" pitchFamily="18" charset="0"/>
-                <a:cs typeface="Times" pitchFamily="18" charset="0"/>
-              </a:rPr>
-              <a:t>P</a:t>
-            </a:r>
-            <a:r>
-              <a:rPr lang="en-US" sz="2000" dirty="0">
-                <a:solidFill>
-                  <a:srgbClr val="FF0000"/>
-                </a:solidFill>
-                <a:latin typeface="Palatino Linotype" pitchFamily="18" charset="0"/>
-                <a:ea typeface="Cambria Math" pitchFamily="18" charset="0"/>
-                <a:cs typeface="Times" pitchFamily="18" charset="0"/>
-              </a:rPr>
-              <a:t>(A or B) = </a:t>
-            </a:r>
-            <a:r>
-              <a:rPr lang="en-US" sz="2000" i="1" dirty="0">
-                <a:solidFill>
-                  <a:srgbClr val="FF0000"/>
-                </a:solidFill>
-                <a:latin typeface="Palatino Linotype" pitchFamily="18" charset="0"/>
-                <a:ea typeface="Cambria Math" pitchFamily="18" charset="0"/>
-                <a:cs typeface="Times" pitchFamily="18" charset="0"/>
-              </a:rPr>
-              <a:t>P</a:t>
-            </a:r>
-            <a:r>
-              <a:rPr lang="en-US" sz="2000" dirty="0">
-                <a:solidFill>
-                  <a:srgbClr val="FF0000"/>
-                </a:solidFill>
-                <a:latin typeface="Palatino Linotype" pitchFamily="18" charset="0"/>
-                <a:ea typeface="Cambria Math" pitchFamily="18" charset="0"/>
-                <a:cs typeface="Times" pitchFamily="18" charset="0"/>
-              </a:rPr>
-              <a:t>(A) + </a:t>
-            </a:r>
-            <a:r>
-              <a:rPr lang="en-US" sz="2000" i="1" dirty="0">
-                <a:solidFill>
-                  <a:srgbClr val="FF0000"/>
-                </a:solidFill>
-                <a:latin typeface="Palatino Linotype" pitchFamily="18" charset="0"/>
-                <a:ea typeface="Cambria Math" pitchFamily="18" charset="0"/>
-                <a:cs typeface="Times" pitchFamily="18" charset="0"/>
-              </a:rPr>
-              <a:t>P</a:t>
-            </a:r>
-            <a:r>
-              <a:rPr lang="en-US" sz="2000" dirty="0">
-                <a:solidFill>
-                  <a:srgbClr val="FF0000"/>
-                </a:solidFill>
-                <a:latin typeface="Palatino Linotype" pitchFamily="18" charset="0"/>
-                <a:ea typeface="Cambria Math" pitchFamily="18" charset="0"/>
-                <a:cs typeface="Times" pitchFamily="18" charset="0"/>
-              </a:rPr>
-              <a:t>(B) –</a:t>
-            </a:r>
-            <a:r>
-              <a:rPr lang="en-US" sz="2000" i="1" dirty="0">
-                <a:solidFill>
-                  <a:srgbClr val="FF0000"/>
-                </a:solidFill>
-                <a:latin typeface="Palatino Linotype" pitchFamily="18" charset="0"/>
-                <a:ea typeface="Cambria Math" pitchFamily="18" charset="0"/>
-                <a:cs typeface="Times" pitchFamily="18" charset="0"/>
-              </a:rPr>
-              <a:t> P</a:t>
-            </a:r>
-            <a:r>
-              <a:rPr lang="en-US" sz="2000" dirty="0">
-                <a:solidFill>
-                  <a:srgbClr val="FF0000"/>
-                </a:solidFill>
-                <a:latin typeface="Palatino Linotype" pitchFamily="18" charset="0"/>
-                <a:ea typeface="Cambria Math" pitchFamily="18" charset="0"/>
-                <a:cs typeface="Times" pitchFamily="18" charset="0"/>
-              </a:rPr>
-              <a:t>(A and B)</a:t>
-            </a:r>
-          </a:p>
-          <a:p>
-            <a:pPr lvl="1"/>
-            <a:r>
-              <a:rPr lang="en-US" sz="2400" dirty="0">
-                <a:latin typeface="Palatino Linotype" pitchFamily="18" charset="0"/>
-                <a:ea typeface="Cambria Math" pitchFamily="18" charset="0"/>
-                <a:cs typeface="Times" pitchFamily="18" charset="0"/>
-              </a:rPr>
-              <a:t>Multiplication Rule for Independent Events</a:t>
-            </a:r>
-          </a:p>
-          <a:p>
-            <a:pPr lvl="1"/>
-            <a:endParaRPr lang="en-US" sz="2400" dirty="0">
-              <a:latin typeface="Palatino Linotype" pitchFamily="18" charset="0"/>
-            </a:endParaRPr>
-          </a:p>
-        </p:txBody>
-      </p:sp>
-      <p:graphicFrame>
-        <p:nvGraphicFramePr>
-          <p:cNvPr id="4" name="Object 3"/>
-          <p:cNvGraphicFramePr>
-            <a:graphicFrameLocks noChangeAspect="1"/>
-          </p:cNvGraphicFramePr>
-          <p:nvPr>
-            <p:extLst>
-              <p:ext uri="{D42A27DB-BD31-4B8C-83A1-F6EECF244321}">
-                <p14:modId xmlns:p14="http://schemas.microsoft.com/office/powerpoint/2010/main" val="3683154649"/>
-              </p:ext>
-            </p:extLst>
-          </p:nvPr>
-        </p:nvGraphicFramePr>
-        <p:xfrm>
-          <a:off x="2667000" y="2590800"/>
-          <a:ext cx="2590800" cy="838200"/>
-        </p:xfrm>
-        <a:graphic>
-          <a:graphicData uri="http://schemas.openxmlformats.org/presentationml/2006/ole">
-            <mc:AlternateContent xmlns:mc="http://schemas.openxmlformats.org/markup-compatibility/2006">
-              <mc:Choice xmlns:v="urn:schemas-microsoft-com:vml" Requires="v">
-                <p:oleObj spid="_x0000_s11369" name="Equation" r:id="rId3" imgW="1295280" imgH="419040" progId="Equation.DSMT4">
-                  <p:embed/>
-                </p:oleObj>
-              </mc:Choice>
-              <mc:Fallback>
-                <p:oleObj name="Equation" r:id="rId3" imgW="1295280" imgH="419040" progId="Equation.DSMT4">
-                  <p:embed/>
-                  <p:pic>
-                    <p:nvPicPr>
-                      <p:cNvPr id="0" name="Object 4"/>
-                      <p:cNvPicPr>
-                        <a:picLocks noChangeAspect="1" noChangeArrowheads="1"/>
-                      </p:cNvPicPr>
-                      <p:nvPr/>
-                    </p:nvPicPr>
-                    <p:blipFill>
-                      <a:blip r:embed="rId4">
-                        <a:extLst>
-                          <a:ext uri="{28A0092B-C50C-407E-A947-70E740481C1C}">
-                            <a14:useLocalDpi xmlns:a14="http://schemas.microsoft.com/office/drawing/2010/main" val="0"/>
-                          </a:ext>
-                        </a:extLst>
-                      </a:blip>
-                      <a:srcRect/>
-                      <a:stretch>
-                        <a:fillRect/>
-                      </a:stretch>
-                    </p:blipFill>
-                    <p:spPr bwMode="auto">
-                      <a:xfrm>
-                        <a:off x="2667000" y="2590800"/>
-                        <a:ext cx="2590800" cy="838200"/>
-                      </a:xfrm>
-                      <a:prstGeom prst="rect">
-                        <a:avLst/>
-                      </a:prstGeom>
-                      <a:noFill/>
-                      <a:ln>
-                        <a:noFill/>
-                      </a:ln>
-                      <a:extLst>
-                        <a:ext uri="{909E8E84-426E-40dd-AFC4-6F175D3DCCD1}">
-                          <a14:hiddenFill xmlns:a14="http://schemas.microsoft.com/office/drawing/2010/main">
-                            <a:solidFill>
-                              <a:srgbClr val="FFFFFF"/>
-                            </a:solidFill>
-                          </a14:hiddenFill>
-                        </a:ext>
-                        <a:ext uri="{91240B29-F687-4f45-9708-019B960494DF}">
-                          <a14:hiddenLine xmlns:a14="http://schemas.microsoft.com/office/drawing/2010/main" w="9525">
-                            <a:solidFill>
-                              <a:srgbClr val="000000"/>
-                            </a:solidFill>
-                            <a:miter lim="800000"/>
-                            <a:headEnd/>
-                            <a:tailEnd/>
-                          </a14:hiddenLine>
-                        </a:ext>
-                      </a:extLst>
-                    </p:spPr>
-                  </p:pic>
-                </p:oleObj>
-              </mc:Fallback>
-            </mc:AlternateContent>
-          </a:graphicData>
-        </a:graphic>
-      </p:graphicFrame>
-      <p:sp>
-        <p:nvSpPr>
-          <p:cNvPr id="5" name="Rectangle 4"/>
-          <p:cNvSpPr/>
-          <p:nvPr/>
-        </p:nvSpPr>
-        <p:spPr>
-          <a:xfrm>
-            <a:off x="1295400" y="5867400"/>
-            <a:ext cx="3358483" cy="369332"/>
-          </a:xfrm>
-          <a:prstGeom prst="rect">
-            <a:avLst/>
-          </a:prstGeom>
-        </p:spPr>
-        <p:txBody>
-          <a:bodyPr wrap="none">
-            <a:spAutoFit/>
-          </a:bodyPr>
-          <a:lstStyle/>
-          <a:p>
-            <a:pPr lvl="2"/>
-            <a:r>
-              <a:rPr lang="en-US" i="1" dirty="0">
-                <a:latin typeface="Palatino Linotype" pitchFamily="18" charset="0"/>
-                <a:ea typeface="Cambria Math" pitchFamily="18" charset="0"/>
-                <a:cs typeface="Times" pitchFamily="18" charset="0"/>
-              </a:rPr>
-              <a:t>P</a:t>
-            </a:r>
-            <a:r>
-              <a:rPr lang="en-US" dirty="0">
-                <a:latin typeface="Palatino Linotype" pitchFamily="18" charset="0"/>
-                <a:ea typeface="Cambria Math" pitchFamily="18" charset="0"/>
-                <a:cs typeface="Times" pitchFamily="18" charset="0"/>
-              </a:rPr>
-              <a:t>(A and B) = </a:t>
-            </a:r>
-            <a:r>
-              <a:rPr lang="en-US" i="1" dirty="0">
-                <a:latin typeface="Palatino Linotype" pitchFamily="18" charset="0"/>
-                <a:ea typeface="Cambria Math" pitchFamily="18" charset="0"/>
-                <a:cs typeface="Times" pitchFamily="18" charset="0"/>
-              </a:rPr>
-              <a:t>P</a:t>
-            </a:r>
-            <a:r>
-              <a:rPr lang="en-US" dirty="0">
-                <a:latin typeface="Palatino Linotype" pitchFamily="18" charset="0"/>
-                <a:ea typeface="Cambria Math" pitchFamily="18" charset="0"/>
-                <a:cs typeface="Times" pitchFamily="18" charset="0"/>
-              </a:rPr>
-              <a:t>(A)</a:t>
-            </a:r>
-            <a:r>
-              <a:rPr lang="en-US" i="1" dirty="0">
-                <a:latin typeface="Palatino Linotype" pitchFamily="18" charset="0"/>
-                <a:ea typeface="Cambria Math" pitchFamily="18" charset="0"/>
-                <a:cs typeface="Times" pitchFamily="18" charset="0"/>
-              </a:rPr>
-              <a:t>P</a:t>
-            </a:r>
-            <a:r>
-              <a:rPr lang="en-US" dirty="0">
-                <a:latin typeface="Palatino Linotype" pitchFamily="18" charset="0"/>
-                <a:ea typeface="Cambria Math" pitchFamily="18" charset="0"/>
-                <a:cs typeface="Times" pitchFamily="18" charset="0"/>
-              </a:rPr>
-              <a:t>(B)</a:t>
-            </a:r>
-            <a:endParaRPr lang="en-US" i="1" dirty="0">
-              <a:latin typeface="Palatino Linotype" pitchFamily="18" charset="0"/>
-              <a:ea typeface="Cambria Math" pitchFamily="18" charset="0"/>
-              <a:cs typeface="Times" pitchFamily="18" charset="0"/>
-            </a:endParaRPr>
-          </a:p>
-        </p:txBody>
-      </p:sp>
-      <p:sp>
-        <p:nvSpPr>
-          <p:cNvPr id="6" name="Rectangle 5"/>
-          <p:cNvSpPr/>
-          <p:nvPr/>
-        </p:nvSpPr>
-        <p:spPr>
-          <a:xfrm>
-            <a:off x="1295400" y="6324600"/>
-            <a:ext cx="3818225" cy="369332"/>
-          </a:xfrm>
-          <a:prstGeom prst="rect">
-            <a:avLst/>
-          </a:prstGeom>
-        </p:spPr>
-        <p:txBody>
-          <a:bodyPr wrap="none">
-            <a:spAutoFit/>
-          </a:bodyPr>
-          <a:lstStyle/>
-          <a:p>
-            <a:pPr lvl="2"/>
-            <a:r>
-              <a:rPr lang="en-US" i="1" dirty="0">
-                <a:latin typeface="Palatino Linotype" pitchFamily="18" charset="0"/>
-                <a:ea typeface="Cambria Math" pitchFamily="18" charset="0"/>
-              </a:rPr>
-              <a:t>P</a:t>
-            </a:r>
-            <a:r>
-              <a:rPr lang="en-US" dirty="0">
-                <a:latin typeface="Palatino Linotype" pitchFamily="18" charset="0"/>
-                <a:ea typeface="Cambria Math" pitchFamily="18" charset="0"/>
-              </a:rPr>
-              <a:t>(A and B) = </a:t>
-            </a:r>
-            <a:r>
-              <a:rPr lang="en-US" i="1" dirty="0">
-                <a:latin typeface="Palatino Linotype" pitchFamily="18" charset="0"/>
-                <a:ea typeface="Cambria Math" pitchFamily="18" charset="0"/>
-              </a:rPr>
-              <a:t>P</a:t>
-            </a:r>
-            <a:r>
-              <a:rPr lang="en-US" dirty="0">
-                <a:latin typeface="Palatino Linotype" pitchFamily="18" charset="0"/>
-                <a:ea typeface="Cambria Math" pitchFamily="18" charset="0"/>
-              </a:rPr>
-              <a:t>(A) </a:t>
-            </a:r>
-            <a:r>
-              <a:rPr lang="en-US" i="1" dirty="0">
-                <a:latin typeface="Palatino Linotype" pitchFamily="18" charset="0"/>
-                <a:ea typeface="Cambria Math" pitchFamily="18" charset="0"/>
-              </a:rPr>
-              <a:t>P</a:t>
-            </a:r>
-            <a:r>
-              <a:rPr lang="en-US" dirty="0">
-                <a:latin typeface="Palatino Linotype" pitchFamily="18" charset="0"/>
-                <a:ea typeface="Cambria Math" pitchFamily="18" charset="0"/>
-              </a:rPr>
-              <a:t>(B | A)</a:t>
-            </a:r>
-          </a:p>
-        </p:txBody>
-      </p:sp>
-      <p:sp>
-        <p:nvSpPr>
-          <p:cNvPr id="7" name="Slide Number Placeholder 6"/>
-          <p:cNvSpPr>
-            <a:spLocks noGrp="1"/>
-          </p:cNvSpPr>
-          <p:nvPr>
-            <p:ph type="sldNum" sz="quarter" idx="12"/>
-          </p:nvPr>
-        </p:nvSpPr>
-        <p:spPr/>
-        <p:txBody>
-          <a:bodyPr/>
-          <a:lstStyle/>
-          <a:p>
-            <a:fld id="{BC036538-61FF-498C-AE50-3DCC7CF1F650}" type="slidenum">
-              <a:rPr lang="en-US" smtClean="0"/>
-              <a:t>3</a:t>
-            </a:fld>
-            <a:endParaRPr lang="en-US"/>
-          </a:p>
-        </p:txBody>
-      </p:sp>
-    </p:spTree>
-    <p:extLst>
-      <p:ext uri="{BB962C8B-B14F-4D97-AF65-F5344CB8AC3E}">
-        <p14:creationId xmlns:p14="http://schemas.microsoft.com/office/powerpoint/2010/main" val="1770794613"/>
-      </p:ext>
-    </p:extLst>
-  </p:cSld>
-  <p:clrMapOvr>
-    <a:masterClrMapping/>
-  </p:clrMapOvr>
-</p:sld>
-</file>
-
-<file path=ppt/slides/slide30.xml><?xml version="1.0" encoding="utf-8"?>
-<p:sld xmlns:a="http://schemas.openxmlformats.org/drawingml/2006/main" xmlns:r="http://schemas.openxmlformats.org/officeDocument/2006/relationships" xmlns:p="http://schemas.openxmlformats.org/presentationml/2006/main">
-  <p:cSld>
-    <p:spTree>
-      <p:nvGrpSpPr>
-        <p:cNvPr id="1" name=""/>
-        <p:cNvGrpSpPr/>
-        <p:nvPr/>
-      </p:nvGrpSpPr>
-      <p:grpSpPr>
-        <a:xfrm>
-          <a:off x="0" y="0"/>
-          <a:ext cx="0" cy="0"/>
-          <a:chOff x="0" y="0"/>
-          <a:chExt cx="0" cy="0"/>
-        </a:xfrm>
-      </p:grpSpPr>
-      <p:sp>
-        <p:nvSpPr>
           <p:cNvPr id="7171" name="Rectangle 3"/>
           <p:cNvSpPr>
             <a:spLocks noGrp="1" noChangeArrowheads="1"/>
@@ -17483,7 +17752,7 @@
           <a:graphicData uri="http://schemas.openxmlformats.org/presentationml/2006/ole">
             <mc:AlternateContent xmlns:mc="http://schemas.openxmlformats.org/markup-compatibility/2006">
               <mc:Choice xmlns:v="urn:schemas-microsoft-com:vml" Requires="v">
-                <p:oleObj spid="_x0000_s7281" name="Equation" r:id="rId4" imgW="215640" imgH="241200" progId="Equation.DSMT4">
+                <p:oleObj spid="_x0000_s7311" name="Equation" r:id="rId4" imgW="215640" imgH="241200" progId="Equation.DSMT4">
                   <p:embed/>
                 </p:oleObj>
               </mc:Choice>
@@ -17631,7 +17900,7 @@
           <a:p>
             <a:fld id="{BC036538-61FF-498C-AE50-3DCC7CF1F650}" type="slidenum">
               <a:rPr lang="en-US" smtClean="0"/>
-              <a:t>30</a:t>
+              <a:t>32</a:t>
             </a:fld>
             <a:endParaRPr lang="en-US"/>
           </a:p>
@@ -17651,7 +17920,7 @@
 </p:sld>
 </file>
 
-<file path=ppt/slides/slide31.xml><?xml version="1.0" encoding="utf-8"?>
+<file path=ppt/slides/slide33.xml><?xml version="1.0" encoding="utf-8"?>
 <p:sld xmlns:a="http://schemas.openxmlformats.org/drawingml/2006/main" xmlns:r="http://schemas.openxmlformats.org/officeDocument/2006/relationships" xmlns:p="http://schemas.openxmlformats.org/presentationml/2006/main">
   <p:cSld>
     <p:spTree>
@@ -18119,9 +18388,58 @@
           <a:p>
             <a:fld id="{BC036538-61FF-498C-AE50-3DCC7CF1F650}" type="slidenum">
               <a:rPr lang="en-US" smtClean="0"/>
-              <a:t>31</a:t>
+              <a:t>33</a:t>
             </a:fld>
             <a:endParaRPr lang="en-US"/>
+          </a:p>
+        </p:txBody>
+      </p:sp>
+      <p:sp>
+        <p:nvSpPr>
+          <p:cNvPr id="3" name="Rounded Rectangle 2"/>
+          <p:cNvSpPr/>
+          <p:nvPr/>
+        </p:nvSpPr>
+        <p:spPr>
+          <a:xfrm>
+            <a:off x="4419600" y="5486400"/>
+            <a:ext cx="2819400" cy="914400"/>
+          </a:xfrm>
+          <a:prstGeom prst="roundRect">
+            <a:avLst/>
+          </a:prstGeom>
+        </p:spPr>
+        <p:style>
+          <a:lnRef idx="1">
+            <a:schemeClr val="accent1"/>
+          </a:lnRef>
+          <a:fillRef idx="3">
+            <a:schemeClr val="accent1"/>
+          </a:fillRef>
+          <a:effectRef idx="2">
+            <a:schemeClr val="accent1"/>
+          </a:effectRef>
+          <a:fontRef idx="minor">
+            <a:schemeClr val="lt1"/>
+          </a:fontRef>
+        </p:style>
+        <p:txBody>
+          <a:bodyPr rtlCol="0" anchor="ctr"/>
+          <a:lstStyle/>
+          <a:p>
+            <a:pPr algn="ctr"/>
+            <a:r>
+              <a:rPr lang="mr-IN" dirty="0"/>
+              <a:t>&gt; 1-pnorm(3)</a:t>
+            </a:r>
+          </a:p>
+          <a:p>
+            <a:pPr algn="ctr"/>
+            <a:r>
+              <a:rPr lang="mr-IN" dirty="0"/>
+              <a:t>[1] 0.001349898</a:t>
+            </a:r>
+            <a:endParaRPr lang="en-US" dirty="0"/>
           </a:p>
         </p:txBody>
       </p:sp>
@@ -18139,7 +18457,7 @@
 </p:sld>
 </file>
 
-<file path=ppt/slides/slide32.xml><?xml version="1.0" encoding="utf-8"?>
+<file path=ppt/slides/slide34.xml><?xml version="1.0" encoding="utf-8"?>
 <p:sld xmlns:a="http://schemas.openxmlformats.org/drawingml/2006/main" xmlns:r="http://schemas.openxmlformats.org/officeDocument/2006/relationships" xmlns:p="http://schemas.openxmlformats.org/presentationml/2006/main">
   <p:cSld>
     <p:spTree>
@@ -18663,7 +18981,7 @@
           <a:p>
             <a:fld id="{BC036538-61FF-498C-AE50-3DCC7CF1F650}" type="slidenum">
               <a:rPr lang="en-US" smtClean="0"/>
-              <a:t>32</a:t>
+              <a:t>34</a:t>
             </a:fld>
             <a:endParaRPr lang="en-US"/>
           </a:p>
@@ -18683,7 +19001,7 @@
 </p:sld>
 </file>
 
-<file path=ppt/slides/slide33.xml><?xml version="1.0" encoding="utf-8"?>
+<file path=ppt/slides/slide35.xml><?xml version="1.0" encoding="utf-8"?>
 <p:sld xmlns:a="http://schemas.openxmlformats.org/drawingml/2006/main" xmlns:r="http://schemas.openxmlformats.org/officeDocument/2006/relationships" xmlns:p="http://schemas.openxmlformats.org/presentationml/2006/main">
   <p:cSld>
     <p:spTree>
@@ -19212,7 +19530,7 @@
           <a:graphicData uri="http://schemas.openxmlformats.org/presentationml/2006/ole">
             <mc:AlternateContent xmlns:mc="http://schemas.openxmlformats.org/markup-compatibility/2006">
               <mc:Choice xmlns:v="urn:schemas-microsoft-com:vml" Requires="v">
-                <p:oleObj spid="_x0000_s8305" name="Bitmap Image" r:id="rId4" imgW="4086795" imgH="685714" progId="Paint.Picture">
+                <p:oleObj spid="_x0000_s8335" name="Bitmap Image" r:id="rId4" imgW="4086795" imgH="685714" progId="Paint.Picture">
                   <p:embed/>
                 </p:oleObj>
               </mc:Choice>
@@ -19306,7 +19624,7 @@
           <a:p>
             <a:fld id="{BC036538-61FF-498C-AE50-3DCC7CF1F650}" type="slidenum">
               <a:rPr lang="en-US" smtClean="0"/>
-              <a:t>33</a:t>
+              <a:t>35</a:t>
             </a:fld>
             <a:endParaRPr lang="en-US"/>
           </a:p>
@@ -19326,7 +19644,7 @@
 </p:sld>
 </file>
 
-<file path=ppt/slides/slide34.xml><?xml version="1.0" encoding="utf-8"?>
+<file path=ppt/slides/slide36.xml><?xml version="1.0" encoding="utf-8"?>
 <p:sld xmlns:a="http://schemas.openxmlformats.org/drawingml/2006/main" xmlns:r="http://schemas.openxmlformats.org/officeDocument/2006/relationships" xmlns:p="http://schemas.openxmlformats.org/presentationml/2006/main">
   <p:cSld>
     <p:spTree>
@@ -19780,7 +20098,7 @@
           <a:p>
             <a:fld id="{BC036538-61FF-498C-AE50-3DCC7CF1F650}" type="slidenum">
               <a:rPr lang="en-US" smtClean="0"/>
-              <a:t>34</a:t>
+              <a:t>36</a:t>
             </a:fld>
             <a:endParaRPr lang="en-US"/>
           </a:p>
@@ -19800,7 +20118,7 @@
 </p:sld>
 </file>
 
-<file path=ppt/slides/slide35.xml><?xml version="1.0" encoding="utf-8"?>
+<file path=ppt/slides/slide37.xml><?xml version="1.0" encoding="utf-8"?>
 <p:sld xmlns:a="http://schemas.openxmlformats.org/drawingml/2006/main" xmlns:r="http://schemas.openxmlformats.org/officeDocument/2006/relationships" xmlns:p="http://schemas.openxmlformats.org/presentationml/2006/main">
   <p:cSld>
     <p:spTree>
@@ -20259,7 +20577,7 @@
           <a:graphicData uri="http://schemas.openxmlformats.org/presentationml/2006/ole">
             <mc:AlternateContent xmlns:mc="http://schemas.openxmlformats.org/markup-compatibility/2006">
               <mc:Choice xmlns:v="urn:schemas-microsoft-com:vml" Requires="v">
-                <p:oleObj spid="_x0000_s9329" name="Bitmap Image" r:id="rId4" imgW="3123810" imgH="942857" progId="Paint.Picture">
+                <p:oleObj spid="_x0000_s9359" name="Bitmap Image" r:id="rId4" imgW="3123810" imgH="942857" progId="Paint.Picture">
                   <p:embed/>
                 </p:oleObj>
               </mc:Choice>
@@ -20353,9 +20671,58 @@
           <a:p>
             <a:fld id="{BC036538-61FF-498C-AE50-3DCC7CF1F650}" type="slidenum">
               <a:rPr lang="en-US" smtClean="0"/>
-              <a:t>35</a:t>
+              <a:t>37</a:t>
             </a:fld>
             <a:endParaRPr lang="en-US"/>
+          </a:p>
+        </p:txBody>
+      </p:sp>
+      <p:sp>
+        <p:nvSpPr>
+          <p:cNvPr id="3" name="Rounded Rectangle 2"/>
+          <p:cNvSpPr/>
+          <p:nvPr/>
+        </p:nvSpPr>
+        <p:spPr>
+          <a:xfrm>
+            <a:off x="6477000" y="3200400"/>
+            <a:ext cx="2057400" cy="1295400"/>
+          </a:xfrm>
+          <a:prstGeom prst="roundRect">
+            <a:avLst/>
+          </a:prstGeom>
+        </p:spPr>
+        <p:style>
+          <a:lnRef idx="1">
+            <a:schemeClr val="accent1"/>
+          </a:lnRef>
+          <a:fillRef idx="3">
+            <a:schemeClr val="accent1"/>
+          </a:fillRef>
+          <a:effectRef idx="2">
+            <a:schemeClr val="accent1"/>
+          </a:effectRef>
+          <a:fontRef idx="minor">
+            <a:schemeClr val="lt1"/>
+          </a:fontRef>
+        </p:style>
+        <p:txBody>
+          <a:bodyPr rtlCol="0" anchor="ctr"/>
+          <a:lstStyle/>
+          <a:p>
+            <a:pPr algn="ctr"/>
+            <a:r>
+              <a:rPr lang="mr-IN" dirty="0"/>
+              <a:t>&gt; qnorm(0.01)</a:t>
+            </a:r>
+          </a:p>
+          <a:p>
+            <a:pPr algn="ctr"/>
+            <a:r>
+              <a:rPr lang="mr-IN" dirty="0"/>
+              <a:t>[1] -2.326348</a:t>
+            </a:r>
+            <a:endParaRPr lang="en-US" dirty="0"/>
           </a:p>
         </p:txBody>
       </p:sp>
@@ -20373,7 +20740,7 @@
 </p:sld>
 </file>
 
-<file path=ppt/slides/slide36.xml><?xml version="1.0" encoding="utf-8"?>
+<file path=ppt/slides/slide38.xml><?xml version="1.0" encoding="utf-8"?>
 <p:sld xmlns:a="http://schemas.openxmlformats.org/drawingml/2006/main" xmlns:r="http://schemas.openxmlformats.org/officeDocument/2006/relationships" xmlns:p="http://schemas.openxmlformats.org/presentationml/2006/main">
   <p:cSld>
     <p:spTree>
@@ -20821,7 +21188,7 @@
           <a:p>
             <a:fld id="{BC036538-61FF-498C-AE50-3DCC7CF1F650}" type="slidenum">
               <a:rPr lang="en-US" smtClean="0"/>
-              <a:t>36</a:t>
+              <a:t>38</a:t>
             </a:fld>
             <a:endParaRPr lang="en-US"/>
           </a:p>
@@ -20841,7 +21208,7 @@
 </p:sld>
 </file>
 
-<file path=ppt/slides/slide37.xml><?xml version="1.0" encoding="utf-8"?>
+<file path=ppt/slides/slide39.xml><?xml version="1.0" encoding="utf-8"?>
 <p:sld xmlns:a="http://schemas.openxmlformats.org/drawingml/2006/main" xmlns:r="http://schemas.openxmlformats.org/officeDocument/2006/relationships" xmlns:p="http://schemas.openxmlformats.org/presentationml/2006/main">
   <p:cSld>
     <p:spTree>
@@ -21294,7 +21661,7 @@
           <a:graphicData uri="http://schemas.openxmlformats.org/presentationml/2006/ole">
             <mc:AlternateContent xmlns:mc="http://schemas.openxmlformats.org/markup-compatibility/2006">
               <mc:Choice xmlns:v="urn:schemas-microsoft-com:vml" Requires="v">
-                <p:oleObj spid="_x0000_s10353" name="Bitmap Image" r:id="rId4" imgW="4323810" imgH="961905" progId="Paint.Picture">
+                <p:oleObj spid="_x0000_s10383" name="Bitmap Image" r:id="rId4" imgW="4323810" imgH="961905" progId="Paint.Picture">
                   <p:embed/>
                 </p:oleObj>
               </mc:Choice>
@@ -21388,9 +21755,56 @@
           <a:p>
             <a:fld id="{BC036538-61FF-498C-AE50-3DCC7CF1F650}" type="slidenum">
               <a:rPr lang="en-US" smtClean="0"/>
-              <a:t>37</a:t>
+              <a:t>39</a:t>
             </a:fld>
             <a:endParaRPr lang="en-US"/>
+          </a:p>
+        </p:txBody>
+      </p:sp>
+      <p:sp>
+        <p:nvSpPr>
+          <p:cNvPr id="3" name="Rounded Rectangle 2"/>
+          <p:cNvSpPr/>
+          <p:nvPr/>
+        </p:nvSpPr>
+        <p:spPr>
+          <a:xfrm>
+            <a:off x="5029200" y="2667000"/>
+            <a:ext cx="3962400" cy="1371600"/>
+          </a:xfrm>
+          <a:prstGeom prst="roundRect">
+            <a:avLst/>
+          </a:prstGeom>
+        </p:spPr>
+        <p:style>
+          <a:lnRef idx="1">
+            <a:schemeClr val="accent1"/>
+          </a:lnRef>
+          <a:fillRef idx="3">
+            <a:schemeClr val="accent1"/>
+          </a:fillRef>
+          <a:effectRef idx="2">
+            <a:schemeClr val="accent1"/>
+          </a:effectRef>
+          <a:fontRef idx="minor">
+            <a:schemeClr val="lt1"/>
+          </a:fontRef>
+        </p:style>
+        <p:txBody>
+          <a:bodyPr rtlCol="0" anchor="ctr"/>
+          <a:lstStyle/>
+          <a:p>
+            <a:r>
+              <a:rPr lang="mr-IN" dirty="0"/>
+              <a:t>&gt; qnorm(1-(1-0.95)/2)</a:t>
+            </a:r>
+          </a:p>
+          <a:p>
+            <a:r>
+              <a:rPr lang="mr-IN" dirty="0"/>
+              <a:t>[1] 1.959964</a:t>
+            </a:r>
+            <a:endParaRPr lang="en-US" dirty="0"/>
           </a:p>
         </p:txBody>
       </p:sp>
@@ -21408,7 +21822,7 @@
 </p:sld>
 </file>
 
-<file path=ppt/slides/slide38.xml><?xml version="1.0" encoding="utf-8"?>
+<file path=ppt/slides/slide4.xml><?xml version="1.0" encoding="utf-8"?>
 <p:sld xmlns:a="http://schemas.openxmlformats.org/drawingml/2006/main" xmlns:r="http://schemas.openxmlformats.org/officeDocument/2006/relationships" xmlns:p="http://schemas.openxmlformats.org/presentationml/2006/main">
   <p:cSld>
     <p:spTree>
@@ -21450,7 +21864,7 @@
                 <a:latin typeface="Palatino Linotype" pitchFamily="18" charset="0"/>
                 <a:ea typeface="Cambria Math" pitchFamily="18" charset="0"/>
               </a:rPr>
-              <a:t>Exercise</a:t>
+              <a:t>Inferential Statistics</a:t>
             </a:r>
           </a:p>
         </p:txBody>
@@ -21463,6 +21877,81 @@
           </p:cNvSpPr>
           <p:nvPr>
             <p:ph idx="1"/>
+          </p:nvPr>
+        </p:nvSpPr>
+        <p:spPr/>
+        <p:txBody>
+          <a:bodyPr>
+            <a:normAutofit fontScale="92500" lnSpcReduction="20000"/>
+          </a:bodyPr>
+          <a:lstStyle/>
+          <a:p>
+            <a:r>
+              <a:rPr lang="en-US" dirty="0">
+                <a:latin typeface="Palatino Linotype" pitchFamily="18" charset="0"/>
+              </a:rPr>
+              <a:t>“Inferential statistics” tries to make inferences about the population of interest (population parameters) from sample data (sample statistics).</a:t>
+            </a:r>
+          </a:p>
+          <a:p>
+            <a:r>
+              <a:rPr lang="en-US" dirty="0">
+                <a:latin typeface="Palatino Linotype" pitchFamily="18" charset="0"/>
+              </a:rPr>
+              <a:t>To do this, we need to figure out</a:t>
+            </a:r>
+          </a:p>
+          <a:p>
+            <a:pPr lvl="1"/>
+            <a:r>
+              <a:rPr lang="en-US" dirty="0">
+                <a:latin typeface="Palatino Linotype" pitchFamily="18" charset="0"/>
+              </a:rPr>
+              <a:t>Sampling error</a:t>
+            </a:r>
+          </a:p>
+          <a:p>
+            <a:pPr lvl="2"/>
+            <a:r>
+              <a:rPr lang="en-US" dirty="0">
+                <a:latin typeface="Palatino Linotype" pitchFamily="18" charset="0"/>
+                <a:ea typeface="Cambria Math" pitchFamily="18" charset="0"/>
+                <a:cs typeface="Times New Roman" pitchFamily="18" charset="0"/>
+              </a:rPr>
+              <a:t>Variability of a statistic from sample to sample due to chance</a:t>
+            </a:r>
+            <a:endParaRPr lang="en-US" dirty="0">
+              <a:latin typeface="Palatino Linotype" pitchFamily="18" charset="0"/>
+            </a:endParaRPr>
+          </a:p>
+          <a:p>
+            <a:pPr lvl="1"/>
+            <a:r>
+              <a:rPr lang="en-US" dirty="0">
+                <a:latin typeface="Palatino Linotype" pitchFamily="18" charset="0"/>
+              </a:rPr>
+              <a:t>How to figure out the magnitude of sampling error?</a:t>
+            </a:r>
+          </a:p>
+          <a:p>
+            <a:pPr lvl="1"/>
+            <a:r>
+              <a:rPr lang="en-US" dirty="0">
+                <a:latin typeface="Palatino Linotype" pitchFamily="18" charset="0"/>
+              </a:rPr>
+              <a:t>Through sampling distributions</a:t>
+            </a:r>
+          </a:p>
+        </p:txBody>
+      </p:sp>
+      <p:sp>
+        <p:nvSpPr>
+          <p:cNvPr id="4" name="Slide Number Placeholder 3"/>
+          <p:cNvSpPr>
+            <a:spLocks noGrp="1"/>
+          </p:cNvSpPr>
+          <p:nvPr>
+            <p:ph type="sldNum" sz="quarter" idx="12"/>
           </p:nvPr>
         </p:nvSpPr>
         <p:spPr/>
@@ -21470,75 +21959,9 @@
           <a:bodyPr/>
           <a:lstStyle/>
           <a:p>
-            <a:r>
-              <a:rPr lang="en-US" dirty="0">
-                <a:latin typeface="Palatino Linotype" pitchFamily="18" charset="0"/>
-              </a:rPr>
-              <a:t>A population has a mean (</a:t>
-            </a:r>
-            <a:r>
-              <a:rPr lang="el-GR" dirty="0">
-                <a:latin typeface="Palatino Linotype" pitchFamily="18" charset="0"/>
-              </a:rPr>
-              <a:t>μ</a:t>
-            </a:r>
-            <a:r>
-              <a:rPr lang="en-US" dirty="0">
-                <a:latin typeface="Palatino Linotype" pitchFamily="18" charset="0"/>
-              </a:rPr>
-              <a:t>) of 24.12, and standard deviation (</a:t>
-            </a:r>
-            <a:r>
-              <a:rPr lang="el-GR" dirty="0">
-                <a:latin typeface="Palatino Linotype" pitchFamily="18" charset="0"/>
-              </a:rPr>
-              <a:t>σ</a:t>
-            </a:r>
-            <a:r>
-              <a:rPr lang="en-US" dirty="0">
-                <a:latin typeface="Palatino Linotype" pitchFamily="18" charset="0"/>
-              </a:rPr>
-              <a:t>) of 4. Assume that a sampling distribution of sample means has been constructed, based on repeated samples of n=100 from this population.</a:t>
-            </a:r>
-          </a:p>
-          <a:p>
-            <a:pPr lvl="1"/>
-            <a:r>
-              <a:rPr lang="en-US" dirty="0">
-                <a:latin typeface="Palatino Linotype" pitchFamily="18" charset="0"/>
-              </a:rPr>
-              <a:t>What would be the value of the mean of the sampling distribution?</a:t>
-            </a:r>
-          </a:p>
-          <a:p>
-            <a:pPr lvl="1"/>
-            <a:r>
-              <a:rPr lang="en-US" dirty="0">
-                <a:latin typeface="Palatino Linotype" pitchFamily="18" charset="0"/>
-              </a:rPr>
-              <a:t>What would be the value of the standard error of the mean?</a:t>
-            </a:r>
-          </a:p>
-        </p:txBody>
-      </p:sp>
-      <p:sp>
-        <p:nvSpPr>
-          <p:cNvPr id="4" name="Slide Number Placeholder 3"/>
-          <p:cNvSpPr>
-            <a:spLocks noGrp="1"/>
-          </p:cNvSpPr>
-          <p:nvPr>
-            <p:ph type="sldNum" sz="quarter" idx="12"/>
-          </p:nvPr>
-        </p:nvSpPr>
-        <p:spPr/>
-        <p:txBody>
-          <a:bodyPr/>
-          <a:lstStyle/>
-          <a:p>
             <a:fld id="{BC036538-61FF-498C-AE50-3DCC7CF1F650}" type="slidenum">
               <a:rPr lang="en-US" smtClean="0"/>
-              <a:t>38</a:t>
+              <a:t>4</a:t>
             </a:fld>
             <a:endParaRPr lang="en-US"/>
           </a:p>
@@ -21547,7 +21970,7 @@
     </p:spTree>
     <p:extLst>
       <p:ext uri="{BB962C8B-B14F-4D97-AF65-F5344CB8AC3E}">
-        <p14:creationId xmlns:p14="http://schemas.microsoft.com/office/powerpoint/2010/main" val="1738044144"/>
+        <p14:creationId xmlns:p14="http://schemas.microsoft.com/office/powerpoint/2010/main" val="1693886001"/>
       </p:ext>
     </p:extLst>
   </p:cSld>
@@ -21557,7 +21980,7 @@
 </p:sld>
 </file>
 
-<file path=ppt/slides/slide39.xml><?xml version="1.0" encoding="utf-8"?>
+<file path=ppt/slides/slide40.xml><?xml version="1.0" encoding="utf-8"?>
 <p:sld xmlns:a="http://schemas.openxmlformats.org/drawingml/2006/main" xmlns:r="http://schemas.openxmlformats.org/officeDocument/2006/relationships" xmlns:p="http://schemas.openxmlformats.org/presentationml/2006/main">
   <p:cSld>
     <p:spTree>
@@ -21599,7 +22022,7 @@
                 <a:latin typeface="Palatino Linotype" pitchFamily="18" charset="0"/>
                 <a:ea typeface="Cambria Math" pitchFamily="18" charset="0"/>
               </a:rPr>
-              <a:t>Answer</a:t>
+              <a:t>Exercise</a:t>
             </a:r>
           </a:p>
         </p:txBody>
@@ -21619,7 +22042,54 @@
           <a:bodyPr/>
           <a:lstStyle/>
           <a:p>
-            <a:endParaRPr lang="en-US"/>
+            <a:r>
+              <a:rPr lang="en-US" dirty="0">
+                <a:latin typeface="Palatino Linotype" pitchFamily="18" charset="0"/>
+              </a:rPr>
+              <a:t>A population has a mean (</a:t>
+            </a:r>
+            <a:r>
+              <a:rPr lang="el-GR" dirty="0">
+                <a:latin typeface="Palatino Linotype" pitchFamily="18" charset="0"/>
+              </a:rPr>
+              <a:t>μ</a:t>
+            </a:r>
+            <a:r>
+              <a:rPr lang="en-US" dirty="0">
+                <a:latin typeface="Palatino Linotype" pitchFamily="18" charset="0"/>
+              </a:rPr>
+              <a:t>) of 24.12, and standard deviation (</a:t>
+            </a:r>
+            <a:r>
+              <a:rPr lang="el-GR" dirty="0">
+                <a:latin typeface="Palatino Linotype" pitchFamily="18" charset="0"/>
+              </a:rPr>
+              <a:t>σ</a:t>
+            </a:r>
+            <a:r>
+              <a:rPr lang="en-US" dirty="0">
+                <a:latin typeface="Palatino Linotype" pitchFamily="18" charset="0"/>
+              </a:rPr>
+              <a:t>) of 4. Assume that a sampling distribution of sample means has been constructed, based on repeated samples of n=100 from this population.</a:t>
+            </a:r>
+          </a:p>
+          <a:p>
+            <a:pPr lvl="1"/>
+            <a:r>
+              <a:rPr lang="en-US" dirty="0">
+                <a:latin typeface="Palatino Linotype" pitchFamily="18" charset="0"/>
+              </a:rPr>
+              <a:t>What would be the value of the mean of the sampling distribution?</a:t>
+            </a:r>
+          </a:p>
+          <a:p>
+            <a:pPr lvl="1"/>
+            <a:r>
+              <a:rPr lang="en-US" dirty="0">
+                <a:latin typeface="Palatino Linotype" pitchFamily="18" charset="0"/>
+              </a:rPr>
+              <a:t>What would be the value of the standard error of the mean?</a:t>
+            </a:r>
           </a:p>
         </p:txBody>
       </p:sp>
@@ -21640,7 +22110,109 @@
           <a:p>
             <a:fld id="{BC036538-61FF-498C-AE50-3DCC7CF1F650}" type="slidenum">
               <a:rPr lang="en-US" smtClean="0"/>
-              <a:t>39</a:t>
+              <a:t>40</a:t>
+            </a:fld>
+            <a:endParaRPr lang="en-US"/>
+          </a:p>
+        </p:txBody>
+      </p:sp>
+    </p:spTree>
+    <p:extLst>
+      <p:ext uri="{BB962C8B-B14F-4D97-AF65-F5344CB8AC3E}">
+        <p14:creationId xmlns:p14="http://schemas.microsoft.com/office/powerpoint/2010/main" val="1738044144"/>
+      </p:ext>
+    </p:extLst>
+  </p:cSld>
+  <p:clrMapOvr>
+    <a:masterClrMapping/>
+  </p:clrMapOvr>
+</p:sld>
+</file>
+
+<file path=ppt/slides/slide41.xml><?xml version="1.0" encoding="utf-8"?>
+<p:sld xmlns:a="http://schemas.openxmlformats.org/drawingml/2006/main" xmlns:r="http://schemas.openxmlformats.org/officeDocument/2006/relationships" xmlns:p="http://schemas.openxmlformats.org/presentationml/2006/main">
+  <p:cSld>
+    <p:spTree>
+      <p:nvGrpSpPr>
+        <p:cNvPr id="1" name=""/>
+        <p:cNvGrpSpPr/>
+        <p:nvPr/>
+      </p:nvGrpSpPr>
+      <p:grpSpPr>
+        <a:xfrm>
+          <a:off x="0" y="0"/>
+          <a:ext cx="0" cy="0"/>
+          <a:chOff x="0" y="0"/>
+          <a:chExt cx="0" cy="0"/>
+        </a:xfrm>
+      </p:grpSpPr>
+      <p:sp>
+        <p:nvSpPr>
+          <p:cNvPr id="2" name="Title 1"/>
+          <p:cNvSpPr>
+            <a:spLocks noGrp="1"/>
+          </p:cNvSpPr>
+          <p:nvPr>
+            <p:ph type="title"/>
+          </p:nvPr>
+        </p:nvSpPr>
+        <p:spPr/>
+        <p:txBody>
+          <a:bodyPr>
+            <a:normAutofit/>
+          </a:bodyPr>
+          <a:lstStyle/>
+          <a:p>
+            <a:r>
+              <a:rPr lang="en-US" b="1" dirty="0">
+                <a:solidFill>
+                  <a:srgbClr val="000099"/>
+                </a:solidFill>
+                <a:latin typeface="Palatino Linotype" pitchFamily="18" charset="0"/>
+                <a:ea typeface="Cambria Math" pitchFamily="18" charset="0"/>
+              </a:rPr>
+              <a:t>Answer</a:t>
+            </a:r>
+          </a:p>
+        </p:txBody>
+      </p:sp>
+      <p:sp>
+        <p:nvSpPr>
+          <p:cNvPr id="3" name="Content Placeholder 2"/>
+          <p:cNvSpPr>
+            <a:spLocks noGrp="1"/>
+          </p:cNvSpPr>
+          <p:nvPr>
+            <p:ph idx="1"/>
+          </p:nvPr>
+        </p:nvSpPr>
+        <p:spPr/>
+        <p:txBody>
+          <a:bodyPr/>
+          <a:lstStyle/>
+          <a:p>
+            <a:endParaRPr lang="en-US"/>
+          </a:p>
+        </p:txBody>
+      </p:sp>
+      <p:sp>
+        <p:nvSpPr>
+          <p:cNvPr id="4" name="Slide Number Placeholder 3"/>
+          <p:cNvSpPr>
+            <a:spLocks noGrp="1"/>
+          </p:cNvSpPr>
+          <p:nvPr>
+            <p:ph type="sldNum" sz="quarter" idx="12"/>
+          </p:nvPr>
+        </p:nvSpPr>
+        <p:spPr/>
+        <p:txBody>
+          <a:bodyPr/>
+          <a:lstStyle/>
+          <a:p>
+            <a:fld id="{BC036538-61FF-498C-AE50-3DCC7CF1F650}" type="slidenum">
+              <a:rPr lang="en-US" smtClean="0"/>
+              <a:t>41</a:t>
             </a:fld>
             <a:endParaRPr lang="en-US"/>
           </a:p>
@@ -21713,165 +22285,7 @@
 </p:sld>
 </file>
 
-<file path=ppt/slides/slide4.xml><?xml version="1.0" encoding="utf-8"?>
-<p:sld xmlns:a="http://schemas.openxmlformats.org/drawingml/2006/main" xmlns:r="http://schemas.openxmlformats.org/officeDocument/2006/relationships" xmlns:p="http://schemas.openxmlformats.org/presentationml/2006/main">
-  <p:cSld>
-    <p:spTree>
-      <p:nvGrpSpPr>
-        <p:cNvPr id="1" name=""/>
-        <p:cNvGrpSpPr/>
-        <p:nvPr/>
-      </p:nvGrpSpPr>
-      <p:grpSpPr>
-        <a:xfrm>
-          <a:off x="0" y="0"/>
-          <a:ext cx="0" cy="0"/>
-          <a:chOff x="0" y="0"/>
-          <a:chExt cx="0" cy="0"/>
-        </a:xfrm>
-      </p:grpSpPr>
-      <p:sp>
-        <p:nvSpPr>
-          <p:cNvPr id="2" name="Title 1"/>
-          <p:cNvSpPr>
-            <a:spLocks noGrp="1"/>
-          </p:cNvSpPr>
-          <p:nvPr>
-            <p:ph type="title"/>
-          </p:nvPr>
-        </p:nvSpPr>
-        <p:spPr/>
-        <p:txBody>
-          <a:bodyPr>
-            <a:normAutofit/>
-          </a:bodyPr>
-          <a:lstStyle/>
-          <a:p>
-            <a:r>
-              <a:rPr lang="en-US" b="1" dirty="0">
-                <a:solidFill>
-                  <a:srgbClr val="000099"/>
-                </a:solidFill>
-                <a:latin typeface="Palatino Linotype" pitchFamily="18" charset="0"/>
-                <a:ea typeface="Cambria Math" pitchFamily="18" charset="0"/>
-              </a:rPr>
-              <a:t>Inferential Statistics</a:t>
-            </a:r>
-          </a:p>
-        </p:txBody>
-      </p:sp>
-      <p:sp>
-        <p:nvSpPr>
-          <p:cNvPr id="3" name="Content Placeholder 2"/>
-          <p:cNvSpPr>
-            <a:spLocks noGrp="1"/>
-          </p:cNvSpPr>
-          <p:nvPr>
-            <p:ph idx="1"/>
-          </p:nvPr>
-        </p:nvSpPr>
-        <p:spPr/>
-        <p:txBody>
-          <a:bodyPr>
-            <a:normAutofit fontScale="92500" lnSpcReduction="20000"/>
-          </a:bodyPr>
-          <a:lstStyle/>
-          <a:p>
-            <a:r>
-              <a:rPr lang="en-US" dirty="0">
-                <a:latin typeface="Palatino Linotype" pitchFamily="18" charset="0"/>
-              </a:rPr>
-              <a:t>“Inferential statistics” tries to make inferences about the population of interest (population parameters) from sample data (sample statistics).</a:t>
-            </a:r>
-          </a:p>
-          <a:p>
-            <a:r>
-              <a:rPr lang="en-US" dirty="0">
-                <a:latin typeface="Palatino Linotype" pitchFamily="18" charset="0"/>
-              </a:rPr>
-              <a:t>To do this, we need to figure out</a:t>
-            </a:r>
-          </a:p>
-          <a:p>
-            <a:pPr lvl="1"/>
-            <a:r>
-              <a:rPr lang="en-US" dirty="0">
-                <a:latin typeface="Palatino Linotype" pitchFamily="18" charset="0"/>
-              </a:rPr>
-              <a:t>Sampling error</a:t>
-            </a:r>
-          </a:p>
-          <a:p>
-            <a:pPr lvl="2"/>
-            <a:r>
-              <a:rPr lang="en-US" dirty="0">
-                <a:latin typeface="Palatino Linotype" pitchFamily="18" charset="0"/>
-                <a:ea typeface="Cambria Math" pitchFamily="18" charset="0"/>
-                <a:cs typeface="Times New Roman" pitchFamily="18" charset="0"/>
-              </a:rPr>
-              <a:t>Variability of a statistic from sample to sample due to chance</a:t>
-            </a:r>
-            <a:endParaRPr lang="en-US" dirty="0">
-              <a:latin typeface="Palatino Linotype" pitchFamily="18" charset="0"/>
-            </a:endParaRPr>
-          </a:p>
-          <a:p>
-            <a:pPr lvl="1"/>
-            <a:r>
-              <a:rPr lang="en-US" dirty="0">
-                <a:latin typeface="Palatino Linotype" pitchFamily="18" charset="0"/>
-              </a:rPr>
-              <a:t>How to figure out the magnitude of sampling error?</a:t>
-            </a:r>
-          </a:p>
-          <a:p>
-            <a:pPr lvl="1"/>
-            <a:r>
-              <a:rPr lang="en-US" dirty="0">
-                <a:latin typeface="Palatino Linotype" pitchFamily="18" charset="0"/>
-              </a:rPr>
-              <a:t>Through sampling distributions</a:t>
-            </a:r>
-          </a:p>
-        </p:txBody>
-      </p:sp>
-      <p:sp>
-        <p:nvSpPr>
-          <p:cNvPr id="4" name="Slide Number Placeholder 3"/>
-          <p:cNvSpPr>
-            <a:spLocks noGrp="1"/>
-          </p:cNvSpPr>
-          <p:nvPr>
-            <p:ph type="sldNum" sz="quarter" idx="12"/>
-          </p:nvPr>
-        </p:nvSpPr>
-        <p:spPr/>
-        <p:txBody>
-          <a:bodyPr/>
-          <a:lstStyle/>
-          <a:p>
-            <a:fld id="{BC036538-61FF-498C-AE50-3DCC7CF1F650}" type="slidenum">
-              <a:rPr lang="en-US" smtClean="0"/>
-              <a:t>4</a:t>
-            </a:fld>
-            <a:endParaRPr lang="en-US"/>
-          </a:p>
-        </p:txBody>
-      </p:sp>
-    </p:spTree>
-    <p:extLst>
-      <p:ext uri="{BB962C8B-B14F-4D97-AF65-F5344CB8AC3E}">
-        <p14:creationId xmlns:p14="http://schemas.microsoft.com/office/powerpoint/2010/main" val="1693886001"/>
-      </p:ext>
-    </p:extLst>
-  </p:cSld>
-  <p:clrMapOvr>
-    <a:masterClrMapping/>
-  </p:clrMapOvr>
-</p:sld>
-</file>
-
-<file path=ppt/slides/slide40.xml><?xml version="1.0" encoding="utf-8"?>
+<file path=ppt/slides/slide42.xml><?xml version="1.0" encoding="utf-8"?>
 <p:sld xmlns:a="http://schemas.openxmlformats.org/drawingml/2006/main" xmlns:r="http://schemas.openxmlformats.org/officeDocument/2006/relationships" xmlns:p="http://schemas.openxmlformats.org/presentationml/2006/main">
   <p:cSld>
     <p:spTree>
@@ -21956,7 +22370,7 @@
                   <a:t>)=54.72, and the mean of a sample from that population (</a:t>
                 </a:r>
                 <a14:m>
-                  <m:oMath xmlns="" xmlns:m="http://schemas.openxmlformats.org/officeDocument/2006/math">
+                  <m:oMath xmlns:m="http://schemas.openxmlformats.org/officeDocument/2006/math" xmlns="">
                     <m:acc>
                       <m:accPr>
                         <m:chr m:val="̅"/>
@@ -22072,7 +22486,7 @@
           <a:p>
             <a:fld id="{BC036538-61FF-498C-AE50-3DCC7CF1F650}" type="slidenum">
               <a:rPr lang="en-US" smtClean="0"/>
-              <a:t>40</a:t>
+              <a:t>42</a:t>
             </a:fld>
             <a:endParaRPr lang="en-US"/>
           </a:p>
@@ -22091,7 +22505,7 @@
 </p:sld>
 </file>
 
-<file path=ppt/slides/slide41.xml><?xml version="1.0" encoding="utf-8"?>
+<file path=ppt/slides/slide43.xml><?xml version="1.0" encoding="utf-8"?>
 <p:sld xmlns:a="http://schemas.openxmlformats.org/drawingml/2006/main" xmlns:r="http://schemas.openxmlformats.org/officeDocument/2006/relationships" xmlns:p="http://schemas.openxmlformats.org/presentationml/2006/main">
   <p:cSld>
     <p:spTree>
@@ -22181,7 +22595,7 @@
                   <a:t>)=54.72, and the mean of a sample from that population (</a:t>
                 </a:r>
                 <a14:m>
-                  <m:oMath xmlns="" xmlns:m="http://schemas.openxmlformats.org/officeDocument/2006/math">
+                  <m:oMath xmlns:m="http://schemas.openxmlformats.org/officeDocument/2006/math" xmlns="">
                     <m:acc>
                       <m:accPr>
                         <m:chr m:val="̅"/>
@@ -22349,7 +22763,7 @@
           <a:p>
             <a:fld id="{BC036538-61FF-498C-AE50-3DCC7CF1F650}" type="slidenum">
               <a:rPr lang="en-US" smtClean="0"/>
-              <a:t>41</a:t>
+              <a:t>43</a:t>
             </a:fld>
             <a:endParaRPr lang="en-US"/>
           </a:p>
@@ -22368,7 +22782,7 @@
 </p:sld>
 </file>
 
-<file path=ppt/slides/slide42.xml><?xml version="1.0" encoding="utf-8"?>
+<file path=ppt/slides/slide44.xml><?xml version="1.0" encoding="utf-8"?>
 <p:sld xmlns:a="http://schemas.openxmlformats.org/drawingml/2006/main" xmlns:r="http://schemas.openxmlformats.org/officeDocument/2006/relationships" xmlns:p="http://schemas.openxmlformats.org/presentationml/2006/main">
   <p:cSld>
     <p:spTree>
@@ -22527,7 +22941,7 @@
           <a:p>
             <a:fld id="{BC036538-61FF-498C-AE50-3DCC7CF1F650}" type="slidenum">
               <a:rPr lang="en-US" smtClean="0"/>
-              <a:t>42</a:t>
+              <a:t>44</a:t>
             </a:fld>
             <a:endParaRPr lang="en-US"/>
           </a:p>
@@ -22546,7 +22960,7 @@
 </p:sld>
 </file>
 
-<file path=ppt/slides/slide43.xml><?xml version="1.0" encoding="utf-8"?>
+<file path=ppt/slides/slide45.xml><?xml version="1.0" encoding="utf-8"?>
 <p:sld xmlns:a="http://schemas.openxmlformats.org/drawingml/2006/main" xmlns:r="http://schemas.openxmlformats.org/officeDocument/2006/relationships" xmlns:p="http://schemas.openxmlformats.org/presentationml/2006/main">
   <p:cSld>
     <p:spTree>
@@ -22658,7 +23072,7 @@
           <a:p>
             <a:fld id="{BC036538-61FF-498C-AE50-3DCC7CF1F650}" type="slidenum">
               <a:rPr lang="en-US" smtClean="0"/>
-              <a:t>43</a:t>
+              <a:t>45</a:t>
             </a:fld>
             <a:endParaRPr lang="en-US"/>
           </a:p>
@@ -22731,7 +23145,7 @@
 </p:sld>
 </file>
 
-<file path=ppt/slides/slide44.xml><?xml version="1.0" encoding="utf-8"?>
+<file path=ppt/slides/slide46.xml><?xml version="1.0" encoding="utf-8"?>
 <p:sld xmlns:a="http://schemas.openxmlformats.org/drawingml/2006/main" xmlns:r="http://schemas.openxmlformats.org/officeDocument/2006/relationships" xmlns:p="http://schemas.openxmlformats.org/presentationml/2006/main">
   <p:cSld>
     <p:spTree>
@@ -22803,7 +23217,7 @@
           <a:p>
             <a:fld id="{BC036538-61FF-498C-AE50-3DCC7CF1F650}" type="slidenum">
               <a:rPr lang="en-US" smtClean="0"/>
-              <a:t>44</a:t>
+              <a:t>46</a:t>
             </a:fld>
             <a:endParaRPr lang="en-US"/>
           </a:p>
@@ -22876,7 +23290,7 @@
 </p:sld>
 </file>
 
-<file path=ppt/slides/slide45.xml><?xml version="1.0" encoding="utf-8"?>
+<file path=ppt/slides/slide47.xml><?xml version="1.0" encoding="utf-8"?>
 <p:sld xmlns:a="http://schemas.openxmlformats.org/drawingml/2006/main" xmlns:r="http://schemas.openxmlformats.org/officeDocument/2006/relationships" xmlns:p="http://schemas.openxmlformats.org/presentationml/2006/main">
   <p:cSld>
     <p:spTree>
@@ -22911,17 +23325,21 @@
           <a:lstStyle/>
           <a:p>
             <a:r>
-              <a:rPr lang="en-US" b="1" dirty="0" smtClean="0">
+              <a:rPr lang="en-US" sz="4000" b="1" dirty="0" smtClean="0">
                 <a:solidFill>
                   <a:srgbClr val="000099"/>
                 </a:solidFill>
                 <a:latin typeface="Palatino Linotype" pitchFamily="18" charset="0"/>
                 <a:ea typeface="Cambria Math" pitchFamily="18" charset="0"/>
               </a:rPr>
-              <a:t>Example 2</a:t>
-            </a:r>
-            <a:endParaRPr lang="en-US" dirty="0">
+              <a:t>Example 1</a:t>
+            </a:r>
+            <a:endParaRPr lang="en-US" sz="4000" b="1" dirty="0">
+              <a:solidFill>
+                <a:srgbClr val="000099"/>
+              </a:solidFill>
               <a:latin typeface="Palatino Linotype" pitchFamily="18" charset="0"/>
+              <a:ea typeface="Cambria Math" pitchFamily="18" charset="0"/>
             </a:endParaRPr>
           </a:p>
         </p:txBody>
@@ -22938,72 +23356,70 @@
         </p:nvSpPr>
         <p:spPr>
           <a:xfrm>
-            <a:off x="457200" y="1447800"/>
-            <a:ext cx="8229600" cy="5181600"/>
+            <a:off x="304800" y="1447800"/>
+            <a:ext cx="8534400" cy="3352800"/>
           </a:xfrm>
         </p:spPr>
         <p:txBody>
           <a:bodyPr>
-            <a:normAutofit fontScale="85000" lnSpcReduction="10000"/>
+            <a:normAutofit fontScale="92500" lnSpcReduction="20000"/>
           </a:bodyPr>
           <a:lstStyle/>
           <a:p>
             <a:pPr lvl="0"/>
             <a:r>
-              <a:rPr lang="en-US" sz="3800" dirty="0">
-                <a:latin typeface="Palatino Linotype" pitchFamily="18" charset="0"/>
-              </a:rPr>
-              <a:t>Suppose all of the third graders at Wilson Elementary School take a math test.  The scores are normally distributed with </a:t>
-            </a:r>
-            <a:r>
-              <a:rPr lang="en-US" sz="3800" dirty="0">
+              <a:rPr lang="en-US" sz="3600" dirty="0">
+                <a:latin typeface="Palatino Linotype" pitchFamily="18" charset="0"/>
+              </a:rPr>
+              <a:t>Suppose you have a set of scores that are normally distributed with </a:t>
+            </a:r>
+            <a:r>
+              <a:rPr lang="en-US" sz="3600" dirty="0">
                 <a:latin typeface="Palatino Linotype" pitchFamily="18" charset="0"/>
                 <a:sym typeface="Symbol"/>
               </a:rPr>
               <a:t></a:t>
             </a:r>
             <a:r>
-              <a:rPr lang="en-US" sz="3800" dirty="0">
-                <a:latin typeface="Palatino Linotype" pitchFamily="18" charset="0"/>
-              </a:rPr>
-              <a:t> = 75 and </a:t>
-            </a:r>
-            <a:r>
-              <a:rPr lang="en-US" sz="3800" dirty="0">
+              <a:rPr lang="en-US" sz="3600" dirty="0">
+                <a:latin typeface="Palatino Linotype" pitchFamily="18" charset="0"/>
+              </a:rPr>
+              <a:t> = 200 and </a:t>
+            </a:r>
+            <a:r>
+              <a:rPr lang="en-US" sz="3600" dirty="0">
                 <a:latin typeface="Palatino Linotype" pitchFamily="18" charset="0"/>
                 <a:sym typeface="Symbol"/>
               </a:rPr>
               <a:t></a:t>
             </a:r>
             <a:r>
-              <a:rPr lang="en-US" sz="3800" dirty="0">
-                <a:latin typeface="Palatino Linotype" pitchFamily="18" charset="0"/>
-              </a:rPr>
-              <a:t> = 12.</a:t>
+              <a:rPr lang="en-US" sz="3600" dirty="0">
+                <a:latin typeface="Palatino Linotype" pitchFamily="18" charset="0"/>
+              </a:rPr>
+              <a:t> = 40.</a:t>
             </a:r>
           </a:p>
           <a:p>
             <a:pPr lvl="1"/>
             <a:r>
-              <a:rPr lang="en-US" sz="3300" dirty="0">
-                <a:latin typeface="Palatino Linotype" pitchFamily="18" charset="0"/>
-              </a:rPr>
-              <a:t>(a) For the distribution of math test scores, what is the mean and standard error of the sampling distribution of the mean for samples of size 16?</a:t>
+              <a:rPr lang="en-US" sz="3100" dirty="0">
+                <a:latin typeface="Palatino Linotype" pitchFamily="18" charset="0"/>
+              </a:rPr>
+              <a:t>(a) What proportion of scores is greater than a raw score of 250?</a:t>
             </a:r>
           </a:p>
           <a:p>
             <a:pPr lvl="1"/>
             <a:r>
-              <a:rPr lang="en-US" sz="3300" dirty="0">
-                <a:latin typeface="Palatino Linotype" pitchFamily="18" charset="0"/>
-              </a:rPr>
-              <a:t>(b) Suppose a sample of 16 third graders is selected from Wilson Elementary School.  What is the probability that the mean math test score for the sample is greater than 81?</a:t>
-            </a:r>
-          </a:p>
-          <a:p>
-            <a:endParaRPr lang="en-US" dirty="0">
-              <a:latin typeface="Palatino Linotype" pitchFamily="18" charset="0"/>
-            </a:endParaRPr>
+              <a:rPr lang="en-US" sz="3100" dirty="0">
+                <a:latin typeface="Palatino Linotype" pitchFamily="18" charset="0"/>
+              </a:rPr>
+              <a:t>(b) If you randomly select one score from the distribution, what is the probability that the score is greater than 250?</a:t>
+            </a:r>
+          </a:p>
+          <a:p>
+            <a:endParaRPr lang="en-US" dirty="0"/>
           </a:p>
         </p:txBody>
       </p:sp>
@@ -23024,16 +23440,63 @@
           <a:p>
             <a:fld id="{BC036538-61FF-498C-AE50-3DCC7CF1F650}" type="slidenum">
               <a:rPr lang="en-US" smtClean="0"/>
-              <a:t>45</a:t>
+              <a:t>47</a:t>
             </a:fld>
             <a:endParaRPr lang="en-US"/>
+          </a:p>
+        </p:txBody>
+      </p:sp>
+      <p:sp>
+        <p:nvSpPr>
+          <p:cNvPr id="5" name="Rounded Rectangle 4"/>
+          <p:cNvSpPr/>
+          <p:nvPr/>
+        </p:nvSpPr>
+        <p:spPr>
+          <a:xfrm>
+            <a:off x="838200" y="4876800"/>
+            <a:ext cx="7772400" cy="1447800"/>
+          </a:xfrm>
+          <a:prstGeom prst="roundRect">
+            <a:avLst/>
+          </a:prstGeom>
+        </p:spPr>
+        <p:style>
+          <a:lnRef idx="1">
+            <a:schemeClr val="accent1"/>
+          </a:lnRef>
+          <a:fillRef idx="3">
+            <a:schemeClr val="accent1"/>
+          </a:fillRef>
+          <a:effectRef idx="2">
+            <a:schemeClr val="accent1"/>
+          </a:effectRef>
+          <a:fontRef idx="minor">
+            <a:schemeClr val="lt1"/>
+          </a:fontRef>
+        </p:style>
+        <p:txBody>
+          <a:bodyPr rtlCol="0" anchor="ctr"/>
+          <a:lstStyle/>
+          <a:p>
+            <a:r>
+              <a:rPr lang="mr-IN" dirty="0"/>
+              <a:t>&gt; 1-pnorm(250,mean=200, sd=40)</a:t>
+            </a:r>
+          </a:p>
+          <a:p>
+            <a:r>
+              <a:rPr lang="mr-IN" dirty="0"/>
+              <a:t>[1] 0.1056498</a:t>
+            </a:r>
+            <a:endParaRPr lang="en-US" dirty="0"/>
           </a:p>
         </p:txBody>
       </p:sp>
     </p:spTree>
     <p:extLst>
       <p:ext uri="{BB962C8B-B14F-4D97-AF65-F5344CB8AC3E}">
-        <p14:creationId xmlns:p14="http://schemas.microsoft.com/office/powerpoint/2010/main" val="4091089204"/>
+        <p14:creationId xmlns:p14="http://schemas.microsoft.com/office/powerpoint/2010/main" val="3796608716"/>
       </p:ext>
     </p:extLst>
   </p:cSld>
@@ -23043,7 +23506,7 @@
 </p:sld>
 </file>
 
-<file path=ppt/slides/slide46.xml><?xml version="1.0" encoding="utf-8"?>
+<file path=ppt/slides/slide48.xml><?xml version="1.0" encoding="utf-8"?>
 <p:sld xmlns:a="http://schemas.openxmlformats.org/drawingml/2006/main" xmlns:r="http://schemas.openxmlformats.org/officeDocument/2006/relationships" xmlns:p="http://schemas.openxmlformats.org/presentationml/2006/main">
   <p:cSld>
     <p:spTree>
@@ -23078,15 +23541,22 @@
           <a:lstStyle/>
           <a:p>
             <a:r>
-              <a:rPr lang="en-US" sz="4000" b="1" dirty="0">
+              <a:rPr lang="en-US" sz="4000" b="1" dirty="0" smtClean="0">
                 <a:solidFill>
                   <a:srgbClr val="000099"/>
                 </a:solidFill>
                 <a:latin typeface="Palatino Linotype" pitchFamily="18" charset="0"/>
                 <a:ea typeface="Cambria Math" pitchFamily="18" charset="0"/>
               </a:rPr>
-              <a:t>Summary</a:t>
-            </a:r>
+              <a:t>Example 1</a:t>
+            </a:r>
+            <a:endParaRPr lang="en-US" sz="4000" b="1" dirty="0">
+              <a:solidFill>
+                <a:srgbClr val="000099"/>
+              </a:solidFill>
+              <a:latin typeface="Palatino Linotype" pitchFamily="18" charset="0"/>
+              <a:ea typeface="Cambria Math" pitchFamily="18" charset="0"/>
+            </a:endParaRPr>
           </a:p>
         </p:txBody>
       </p:sp>
@@ -23098,6 +23568,82 @@
           </p:cNvSpPr>
           <p:nvPr>
             <p:ph idx="1"/>
+          </p:nvPr>
+        </p:nvSpPr>
+        <p:spPr>
+          <a:xfrm>
+            <a:off x="304800" y="1447800"/>
+            <a:ext cx="8534400" cy="5181600"/>
+          </a:xfrm>
+        </p:spPr>
+        <p:txBody>
+          <a:bodyPr>
+            <a:normAutofit/>
+          </a:bodyPr>
+          <a:lstStyle/>
+          <a:p>
+            <a:pPr lvl="0"/>
+            <a:r>
+              <a:rPr lang="en-US" sz="3600" dirty="0">
+                <a:latin typeface="Palatino Linotype" pitchFamily="18" charset="0"/>
+              </a:rPr>
+              <a:t>Suppose you have a set of scores that are normally distributed with </a:t>
+            </a:r>
+            <a:r>
+              <a:rPr lang="en-US" sz="3600" dirty="0">
+                <a:latin typeface="Palatino Linotype" pitchFamily="18" charset="0"/>
+                <a:sym typeface="Symbol"/>
+              </a:rPr>
+              <a:t></a:t>
+            </a:r>
+            <a:r>
+              <a:rPr lang="en-US" sz="3600" dirty="0">
+                <a:latin typeface="Palatino Linotype" pitchFamily="18" charset="0"/>
+              </a:rPr>
+              <a:t> = 200 and </a:t>
+            </a:r>
+            <a:r>
+              <a:rPr lang="en-US" sz="3600" dirty="0">
+                <a:latin typeface="Palatino Linotype" pitchFamily="18" charset="0"/>
+                <a:sym typeface="Symbol"/>
+              </a:rPr>
+              <a:t></a:t>
+            </a:r>
+            <a:r>
+              <a:rPr lang="en-US" sz="3600" dirty="0">
+                <a:latin typeface="Palatino Linotype" pitchFamily="18" charset="0"/>
+              </a:rPr>
+              <a:t> = 40.</a:t>
+            </a:r>
+          </a:p>
+          <a:p>
+            <a:pPr lvl="1"/>
+            <a:r>
+              <a:rPr lang="en-US" sz="3100" dirty="0" smtClean="0">
+                <a:latin typeface="Palatino Linotype" pitchFamily="18" charset="0"/>
+              </a:rPr>
+              <a:t>(</a:t>
+            </a:r>
+            <a:r>
+              <a:rPr lang="en-US" sz="3100" dirty="0">
+                <a:latin typeface="Palatino Linotype" pitchFamily="18" charset="0"/>
+              </a:rPr>
+              <a:t>c) If you randomly select one score from the distribution, what is the probability that the score is NOT between 150 and 190?</a:t>
+            </a:r>
+          </a:p>
+          <a:p>
+            <a:endParaRPr lang="en-US" dirty="0"/>
+          </a:p>
+        </p:txBody>
+      </p:sp>
+      <p:sp>
+        <p:nvSpPr>
+          <p:cNvPr id="4" name="Slide Number Placeholder 3"/>
+          <p:cNvSpPr>
+            <a:spLocks noGrp="1"/>
+          </p:cNvSpPr>
+          <p:nvPr>
+            <p:ph type="sldNum" sz="quarter" idx="12"/>
           </p:nvPr>
         </p:nvSpPr>
         <p:spPr/>
@@ -23105,68 +23651,232 @@
           <a:bodyPr/>
           <a:lstStyle/>
           <a:p>
-            <a:r>
-              <a:rPr lang="en-US" dirty="0">
-                <a:latin typeface="Palatino Linotype" pitchFamily="18" charset="0"/>
-              </a:rPr>
-              <a:t>Sampling distribution</a:t>
-            </a:r>
-          </a:p>
-          <a:p>
-            <a:pPr lvl="1"/>
-            <a:r>
-              <a:rPr lang="en-US" dirty="0">
-                <a:latin typeface="Palatino Linotype" pitchFamily="18" charset="0"/>
-              </a:rPr>
-              <a:t>Mean, standard error, and shape</a:t>
-            </a:r>
-          </a:p>
-          <a:p>
-            <a:pPr lvl="1"/>
-            <a:r>
-              <a:rPr lang="en-US" dirty="0">
-                <a:latin typeface="Palatino Linotype" pitchFamily="18" charset="0"/>
-              </a:rPr>
-              <a:t>Central limit theorem</a:t>
-            </a:r>
-          </a:p>
-          <a:p>
-            <a:r>
-              <a:rPr lang="en-US" dirty="0">
-                <a:latin typeface="Palatino Linotype" pitchFamily="18" charset="0"/>
-              </a:rPr>
-              <a:t>Z-score &amp; probability</a:t>
-            </a:r>
-          </a:p>
-        </p:txBody>
-      </p:sp>
-      <p:sp>
-        <p:nvSpPr>
-          <p:cNvPr id="4" name="Slide Number Placeholder 3"/>
-          <p:cNvSpPr>
-            <a:spLocks noGrp="1"/>
-          </p:cNvSpPr>
-          <p:nvPr>
-            <p:ph type="sldNum" sz="quarter" idx="12"/>
-          </p:nvPr>
-        </p:nvSpPr>
-        <p:spPr/>
-        <p:txBody>
-          <a:bodyPr/>
-          <a:lstStyle/>
-          <a:p>
             <a:fld id="{BC036538-61FF-498C-AE50-3DCC7CF1F650}" type="slidenum">
               <a:rPr lang="en-US" smtClean="0"/>
-              <a:t>46</a:t>
+              <a:t>48</a:t>
             </a:fld>
             <a:endParaRPr lang="en-US"/>
+          </a:p>
+        </p:txBody>
+      </p:sp>
+      <p:sp>
+        <p:nvSpPr>
+          <p:cNvPr id="5" name="Rounded Rectangle 4"/>
+          <p:cNvSpPr/>
+          <p:nvPr/>
+        </p:nvSpPr>
+        <p:spPr>
+          <a:xfrm>
+            <a:off x="838200" y="4876800"/>
+            <a:ext cx="7772400" cy="1447800"/>
+          </a:xfrm>
+          <a:prstGeom prst="roundRect">
+            <a:avLst/>
+          </a:prstGeom>
+        </p:spPr>
+        <p:style>
+          <a:lnRef idx="1">
+            <a:schemeClr val="accent1"/>
+          </a:lnRef>
+          <a:fillRef idx="3">
+            <a:schemeClr val="accent1"/>
+          </a:fillRef>
+          <a:effectRef idx="2">
+            <a:schemeClr val="accent1"/>
+          </a:effectRef>
+          <a:fontRef idx="minor">
+            <a:schemeClr val="lt1"/>
+          </a:fontRef>
+        </p:style>
+        <p:txBody>
+          <a:bodyPr rtlCol="0" anchor="ctr"/>
+          <a:lstStyle/>
+          <a:p>
+            <a:r>
+              <a:rPr lang="mr-IN" dirty="0"/>
+              <a:t>&gt; 1-(pnorm(190,mean=200, sd=40)-pnorm(150,mean=200, sd=40))</a:t>
+            </a:r>
+          </a:p>
+          <a:p>
+            <a:r>
+              <a:rPr lang="mr-IN" dirty="0"/>
+              <a:t>[1] 0.7043561</a:t>
+            </a:r>
+            <a:endParaRPr lang="en-US" dirty="0"/>
           </a:p>
         </p:txBody>
       </p:sp>
     </p:spTree>
     <p:extLst>
       <p:ext uri="{BB962C8B-B14F-4D97-AF65-F5344CB8AC3E}">
-        <p14:creationId xmlns:p14="http://schemas.microsoft.com/office/powerpoint/2010/main" val="1593491745"/>
+        <p14:creationId xmlns:p14="http://schemas.microsoft.com/office/powerpoint/2010/main" val="614504420"/>
+      </p:ext>
+    </p:extLst>
+  </p:cSld>
+  <p:clrMapOvr>
+    <a:masterClrMapping/>
+  </p:clrMapOvr>
+</p:sld>
+</file>
+
+<file path=ppt/slides/slide49.xml><?xml version="1.0" encoding="utf-8"?>
+<p:sld xmlns:a="http://schemas.openxmlformats.org/drawingml/2006/main" xmlns:r="http://schemas.openxmlformats.org/officeDocument/2006/relationships" xmlns:p="http://schemas.openxmlformats.org/presentationml/2006/main">
+  <p:cSld>
+    <p:spTree>
+      <p:nvGrpSpPr>
+        <p:cNvPr id="1" name=""/>
+        <p:cNvGrpSpPr/>
+        <p:nvPr/>
+      </p:nvGrpSpPr>
+      <p:grpSpPr>
+        <a:xfrm>
+          <a:off x="0" y="0"/>
+          <a:ext cx="0" cy="0"/>
+          <a:chOff x="0" y="0"/>
+          <a:chExt cx="0" cy="0"/>
+        </a:xfrm>
+      </p:grpSpPr>
+      <p:sp>
+        <p:nvSpPr>
+          <p:cNvPr id="2" name="Title 1"/>
+          <p:cNvSpPr>
+            <a:spLocks noGrp="1"/>
+          </p:cNvSpPr>
+          <p:nvPr>
+            <p:ph type="title"/>
+          </p:nvPr>
+        </p:nvSpPr>
+        <p:spPr/>
+        <p:txBody>
+          <a:bodyPr>
+            <a:normAutofit/>
+          </a:bodyPr>
+          <a:lstStyle/>
+          <a:p>
+            <a:r>
+              <a:rPr lang="en-US" b="1" dirty="0" smtClean="0">
+                <a:solidFill>
+                  <a:srgbClr val="000099"/>
+                </a:solidFill>
+                <a:latin typeface="Palatino Linotype" pitchFamily="18" charset="0"/>
+                <a:ea typeface="Cambria Math" pitchFamily="18" charset="0"/>
+              </a:rPr>
+              <a:t>Example 2</a:t>
+            </a:r>
+            <a:endParaRPr lang="en-US" dirty="0">
+              <a:latin typeface="Palatino Linotype" pitchFamily="18" charset="0"/>
+            </a:endParaRPr>
+          </a:p>
+        </p:txBody>
+      </p:sp>
+      <p:sp>
+        <p:nvSpPr>
+          <p:cNvPr id="3" name="Content Placeholder 2"/>
+          <p:cNvSpPr>
+            <a:spLocks noGrp="1"/>
+          </p:cNvSpPr>
+          <p:nvPr>
+            <p:ph idx="1"/>
+          </p:nvPr>
+        </p:nvSpPr>
+        <p:spPr>
+          <a:xfrm>
+            <a:off x="457200" y="1447800"/>
+            <a:ext cx="8229600" cy="5181600"/>
+          </a:xfrm>
+        </p:spPr>
+        <p:txBody>
+          <a:bodyPr>
+            <a:normAutofit fontScale="85000" lnSpcReduction="10000"/>
+          </a:bodyPr>
+          <a:lstStyle/>
+          <a:p>
+            <a:pPr lvl="0"/>
+            <a:r>
+              <a:rPr lang="en-US" sz="3800" dirty="0">
+                <a:latin typeface="Palatino Linotype" pitchFamily="18" charset="0"/>
+              </a:rPr>
+              <a:t>Suppose all of the third graders at Wilson Elementary School take a math test.  The scores are normally distributed with </a:t>
+            </a:r>
+            <a:r>
+              <a:rPr lang="en-US" sz="3800" dirty="0">
+                <a:latin typeface="Palatino Linotype" pitchFamily="18" charset="0"/>
+                <a:sym typeface="Symbol"/>
+              </a:rPr>
+              <a:t></a:t>
+            </a:r>
+            <a:r>
+              <a:rPr lang="en-US" sz="3800" dirty="0">
+                <a:latin typeface="Palatino Linotype" pitchFamily="18" charset="0"/>
+              </a:rPr>
+              <a:t> = 75 and </a:t>
+            </a:r>
+            <a:r>
+              <a:rPr lang="en-US" sz="3800" dirty="0">
+                <a:latin typeface="Palatino Linotype" pitchFamily="18" charset="0"/>
+                <a:sym typeface="Symbol"/>
+              </a:rPr>
+              <a:t></a:t>
+            </a:r>
+            <a:r>
+              <a:rPr lang="en-US" sz="3800" dirty="0">
+                <a:latin typeface="Palatino Linotype" pitchFamily="18" charset="0"/>
+              </a:rPr>
+              <a:t> = 12.</a:t>
+            </a:r>
+          </a:p>
+          <a:p>
+            <a:pPr lvl="1"/>
+            <a:r>
+              <a:rPr lang="en-US" sz="3300" dirty="0">
+                <a:latin typeface="Palatino Linotype" pitchFamily="18" charset="0"/>
+              </a:rPr>
+              <a:t>(a) For the distribution of math test scores, what is the mean and standard error of the sampling distribution of the mean for samples of size 16?</a:t>
+            </a:r>
+          </a:p>
+          <a:p>
+            <a:pPr lvl="1"/>
+            <a:r>
+              <a:rPr lang="en-US" sz="3300" dirty="0">
+                <a:latin typeface="Palatino Linotype" pitchFamily="18" charset="0"/>
+              </a:rPr>
+              <a:t>(b) Suppose a sample of 16 third graders is selected from Wilson Elementary School.  What is the probability that the mean math test score for the sample is greater than 81?</a:t>
+            </a:r>
+          </a:p>
+          <a:p>
+            <a:endParaRPr lang="en-US" dirty="0">
+              <a:latin typeface="Palatino Linotype" pitchFamily="18" charset="0"/>
+            </a:endParaRPr>
+          </a:p>
+        </p:txBody>
+      </p:sp>
+      <p:sp>
+        <p:nvSpPr>
+          <p:cNvPr id="4" name="Slide Number Placeholder 3"/>
+          <p:cNvSpPr>
+            <a:spLocks noGrp="1"/>
+          </p:cNvSpPr>
+          <p:nvPr>
+            <p:ph type="sldNum" sz="quarter" idx="12"/>
+          </p:nvPr>
+        </p:nvSpPr>
+        <p:spPr/>
+        <p:txBody>
+          <a:bodyPr/>
+          <a:lstStyle/>
+          <a:p>
+            <a:fld id="{BC036538-61FF-498C-AE50-3DCC7CF1F650}" type="slidenum">
+              <a:rPr lang="en-US" smtClean="0"/>
+              <a:t>49</a:t>
+            </a:fld>
+            <a:endParaRPr lang="en-US"/>
+          </a:p>
+        </p:txBody>
+      </p:sp>
+    </p:spTree>
+    <p:extLst>
+      <p:ext uri="{BB962C8B-B14F-4D97-AF65-F5344CB8AC3E}">
+        <p14:creationId xmlns:p14="http://schemas.microsoft.com/office/powerpoint/2010/main" val="4091089204"/>
       </p:ext>
     </p:extLst>
   </p:cSld>
@@ -23322,7 +24032,7 @@
           <p:cNvPr id="7" name="Group 6">
             <a:extLst>
               <a:ext uri="{FF2B5EF4-FFF2-40B4-BE49-F238E27FC236}">
-                <a16:creationId xmlns="" xmlns:a16="http://schemas.microsoft.com/office/drawing/2014/main" id="{14F529C8-E550-3F45-8988-9B0107BD0B3C}"/>
+                <a16:creationId xmlns:a16="http://schemas.microsoft.com/office/drawing/2014/main" xmlns="" id="{14F529C8-E550-3F45-8988-9B0107BD0B3C}"/>
               </a:ext>
             </a:extLst>
           </p:cNvPr>
@@ -23406,7 +24116,7 @@
             <p:cNvPr id="6" name="Rectangle 5">
               <a:extLst>
                 <a:ext uri="{FF2B5EF4-FFF2-40B4-BE49-F238E27FC236}">
-                  <a16:creationId xmlns="" xmlns:a16="http://schemas.microsoft.com/office/drawing/2014/main" id="{FEE77C56-F899-D548-B499-36961A9AB296}"/>
+                  <a16:creationId xmlns:a16="http://schemas.microsoft.com/office/drawing/2014/main" xmlns="" id="{FEE77C56-F899-D548-B499-36961A9AB296}"/>
                 </a:ext>
               </a:extLst>
             </p:cNvPr>
@@ -23460,7 +24170,7 @@
             <p:cNvPr id="5" name="TextBox 4">
               <a:extLst>
                 <a:ext uri="{FF2B5EF4-FFF2-40B4-BE49-F238E27FC236}">
-                  <a16:creationId xmlns="" xmlns:a16="http://schemas.microsoft.com/office/drawing/2014/main" id="{FC93EBEA-3004-9344-BE12-2F2B15789E63}"/>
+                  <a16:creationId xmlns:a16="http://schemas.microsoft.com/office/drawing/2014/main" xmlns="" id="{FC93EBEA-3004-9344-BE12-2F2B15789E63}"/>
                 </a:ext>
               </a:extLst>
             </p:cNvPr>
@@ -23495,6 +24205,567 @@
     <p:extLst>
       <p:ext uri="{BB962C8B-B14F-4D97-AF65-F5344CB8AC3E}">
         <p14:creationId xmlns:p14="http://schemas.microsoft.com/office/powerpoint/2010/main" val="1267217085"/>
+      </p:ext>
+    </p:extLst>
+  </p:cSld>
+  <p:clrMapOvr>
+    <a:masterClrMapping/>
+  </p:clrMapOvr>
+</p:sld>
+</file>
+
+<file path=ppt/slides/slide50.xml><?xml version="1.0" encoding="utf-8"?>
+<p:sld xmlns:a="http://schemas.openxmlformats.org/drawingml/2006/main" xmlns:r="http://schemas.openxmlformats.org/officeDocument/2006/relationships" xmlns:p="http://schemas.openxmlformats.org/presentationml/2006/main">
+  <p:cSld>
+    <p:spTree>
+      <p:nvGrpSpPr>
+        <p:cNvPr id="1" name=""/>
+        <p:cNvGrpSpPr/>
+        <p:nvPr/>
+      </p:nvGrpSpPr>
+      <p:grpSpPr>
+        <a:xfrm>
+          <a:off x="0" y="0"/>
+          <a:ext cx="0" cy="0"/>
+          <a:chOff x="0" y="0"/>
+          <a:chExt cx="0" cy="0"/>
+        </a:xfrm>
+      </p:grpSpPr>
+      <p:sp>
+        <p:nvSpPr>
+          <p:cNvPr id="2" name="Title 1"/>
+          <p:cNvSpPr>
+            <a:spLocks noGrp="1"/>
+          </p:cNvSpPr>
+          <p:nvPr>
+            <p:ph type="title"/>
+          </p:nvPr>
+        </p:nvSpPr>
+        <p:spPr/>
+        <p:txBody>
+          <a:bodyPr>
+            <a:normAutofit/>
+          </a:bodyPr>
+          <a:lstStyle/>
+          <a:p>
+            <a:r>
+              <a:rPr lang="en-US" b="1" dirty="0" smtClean="0">
+                <a:solidFill>
+                  <a:srgbClr val="000099"/>
+                </a:solidFill>
+                <a:latin typeface="Palatino Linotype" pitchFamily="18" charset="0"/>
+                <a:ea typeface="Cambria Math" pitchFamily="18" charset="0"/>
+              </a:rPr>
+              <a:t>Example 2</a:t>
+            </a:r>
+            <a:endParaRPr lang="en-US" dirty="0">
+              <a:latin typeface="Palatino Linotype" pitchFamily="18" charset="0"/>
+            </a:endParaRPr>
+          </a:p>
+        </p:txBody>
+      </p:sp>
+      <p:sp>
+        <p:nvSpPr>
+          <p:cNvPr id="3" name="Content Placeholder 2"/>
+          <p:cNvSpPr>
+            <a:spLocks noGrp="1"/>
+          </p:cNvSpPr>
+          <p:nvPr>
+            <p:ph idx="1"/>
+          </p:nvPr>
+        </p:nvSpPr>
+        <p:spPr>
+          <a:xfrm>
+            <a:off x="457200" y="1447800"/>
+            <a:ext cx="8229600" cy="2971800"/>
+          </a:xfrm>
+        </p:spPr>
+        <p:txBody>
+          <a:bodyPr>
+            <a:normAutofit fontScale="77500" lnSpcReduction="20000"/>
+          </a:bodyPr>
+          <a:lstStyle/>
+          <a:p>
+            <a:pPr lvl="0"/>
+            <a:r>
+              <a:rPr lang="en-US" sz="3800" dirty="0">
+                <a:latin typeface="Palatino Linotype" pitchFamily="18" charset="0"/>
+              </a:rPr>
+              <a:t>Suppose all of the third graders at Wilson Elementary School take a math test.  The scores are normally distributed with </a:t>
+            </a:r>
+            <a:r>
+              <a:rPr lang="en-US" sz="3800" dirty="0">
+                <a:latin typeface="Palatino Linotype" pitchFamily="18" charset="0"/>
+                <a:sym typeface="Symbol"/>
+              </a:rPr>
+              <a:t></a:t>
+            </a:r>
+            <a:r>
+              <a:rPr lang="en-US" sz="3800" dirty="0">
+                <a:latin typeface="Palatino Linotype" pitchFamily="18" charset="0"/>
+              </a:rPr>
+              <a:t> = 75 and </a:t>
+            </a:r>
+            <a:r>
+              <a:rPr lang="en-US" sz="3800" dirty="0">
+                <a:latin typeface="Palatino Linotype" pitchFamily="18" charset="0"/>
+                <a:sym typeface="Symbol"/>
+              </a:rPr>
+              <a:t></a:t>
+            </a:r>
+            <a:r>
+              <a:rPr lang="en-US" sz="3800" dirty="0">
+                <a:latin typeface="Palatino Linotype" pitchFamily="18" charset="0"/>
+              </a:rPr>
+              <a:t> = 12.</a:t>
+            </a:r>
+          </a:p>
+          <a:p>
+            <a:pPr lvl="1"/>
+            <a:r>
+              <a:rPr lang="en-US" sz="3300" dirty="0">
+                <a:latin typeface="Palatino Linotype" pitchFamily="18" charset="0"/>
+              </a:rPr>
+              <a:t>(a) For the distribution of math test scores, what is the mean and standard error of the sampling distribution of the mean for samples of size 16?</a:t>
+            </a:r>
+          </a:p>
+          <a:p>
+            <a:endParaRPr lang="en-US" dirty="0">
+              <a:latin typeface="Palatino Linotype" pitchFamily="18" charset="0"/>
+            </a:endParaRPr>
+          </a:p>
+        </p:txBody>
+      </p:sp>
+      <p:sp>
+        <p:nvSpPr>
+          <p:cNvPr id="4" name="Slide Number Placeholder 3"/>
+          <p:cNvSpPr>
+            <a:spLocks noGrp="1"/>
+          </p:cNvSpPr>
+          <p:nvPr>
+            <p:ph type="sldNum" sz="quarter" idx="12"/>
+          </p:nvPr>
+        </p:nvSpPr>
+        <p:spPr/>
+        <p:txBody>
+          <a:bodyPr/>
+          <a:lstStyle/>
+          <a:p>
+            <a:fld id="{BC036538-61FF-498C-AE50-3DCC7CF1F650}" type="slidenum">
+              <a:rPr lang="en-US" smtClean="0"/>
+              <a:t>50</a:t>
+            </a:fld>
+            <a:endParaRPr lang="en-US"/>
+          </a:p>
+        </p:txBody>
+      </p:sp>
+      <p:sp>
+        <p:nvSpPr>
+          <p:cNvPr id="5" name="Rounded Rectangle 4"/>
+          <p:cNvSpPr/>
+          <p:nvPr/>
+        </p:nvSpPr>
+        <p:spPr>
+          <a:xfrm>
+            <a:off x="990600" y="4419600"/>
+            <a:ext cx="7467600" cy="1828800"/>
+          </a:xfrm>
+          <a:prstGeom prst="roundRect">
+            <a:avLst/>
+          </a:prstGeom>
+        </p:spPr>
+        <p:style>
+          <a:lnRef idx="1">
+            <a:schemeClr val="accent1"/>
+          </a:lnRef>
+          <a:fillRef idx="3">
+            <a:schemeClr val="accent1"/>
+          </a:fillRef>
+          <a:effectRef idx="2">
+            <a:schemeClr val="accent1"/>
+          </a:effectRef>
+          <a:fontRef idx="minor">
+            <a:schemeClr val="lt1"/>
+          </a:fontRef>
+        </p:style>
+        <p:txBody>
+          <a:bodyPr rtlCol="0" anchor="ctr"/>
+          <a:lstStyle/>
+          <a:p>
+            <a:r>
+              <a:rPr lang="mr-IN" dirty="0"/>
+              <a:t>&gt; se=12/(sqrt(16))</a:t>
+            </a:r>
+          </a:p>
+          <a:p>
+            <a:r>
+              <a:rPr lang="mr-IN" dirty="0"/>
+              <a:t>&gt; </a:t>
+            </a:r>
+          </a:p>
+          <a:p>
+            <a:r>
+              <a:rPr lang="mr-IN" dirty="0"/>
+              <a:t>&gt; se</a:t>
+            </a:r>
+          </a:p>
+          <a:p>
+            <a:r>
+              <a:rPr lang="mr-IN" dirty="0"/>
+              <a:t>[1] 3</a:t>
+            </a:r>
+            <a:endParaRPr lang="en-US" dirty="0"/>
+          </a:p>
+        </p:txBody>
+      </p:sp>
+    </p:spTree>
+    <p:extLst>
+      <p:ext uri="{BB962C8B-B14F-4D97-AF65-F5344CB8AC3E}">
+        <p14:creationId xmlns:p14="http://schemas.microsoft.com/office/powerpoint/2010/main" val="1488412949"/>
+      </p:ext>
+    </p:extLst>
+  </p:cSld>
+  <p:clrMapOvr>
+    <a:masterClrMapping/>
+  </p:clrMapOvr>
+</p:sld>
+</file>
+
+<file path=ppt/slides/slide51.xml><?xml version="1.0" encoding="utf-8"?>
+<p:sld xmlns:a="http://schemas.openxmlformats.org/drawingml/2006/main" xmlns:r="http://schemas.openxmlformats.org/officeDocument/2006/relationships" xmlns:p="http://schemas.openxmlformats.org/presentationml/2006/main">
+  <p:cSld>
+    <p:spTree>
+      <p:nvGrpSpPr>
+        <p:cNvPr id="1" name=""/>
+        <p:cNvGrpSpPr/>
+        <p:nvPr/>
+      </p:nvGrpSpPr>
+      <p:grpSpPr>
+        <a:xfrm>
+          <a:off x="0" y="0"/>
+          <a:ext cx="0" cy="0"/>
+          <a:chOff x="0" y="0"/>
+          <a:chExt cx="0" cy="0"/>
+        </a:xfrm>
+      </p:grpSpPr>
+      <p:sp>
+        <p:nvSpPr>
+          <p:cNvPr id="2" name="Title 1"/>
+          <p:cNvSpPr>
+            <a:spLocks noGrp="1"/>
+          </p:cNvSpPr>
+          <p:nvPr>
+            <p:ph type="title"/>
+          </p:nvPr>
+        </p:nvSpPr>
+        <p:spPr/>
+        <p:txBody>
+          <a:bodyPr>
+            <a:normAutofit/>
+          </a:bodyPr>
+          <a:lstStyle/>
+          <a:p>
+            <a:r>
+              <a:rPr lang="en-US" b="1" dirty="0" smtClean="0">
+                <a:solidFill>
+                  <a:srgbClr val="000099"/>
+                </a:solidFill>
+                <a:latin typeface="Palatino Linotype" pitchFamily="18" charset="0"/>
+                <a:ea typeface="Cambria Math" pitchFamily="18" charset="0"/>
+              </a:rPr>
+              <a:t>Example 2</a:t>
+            </a:r>
+            <a:endParaRPr lang="en-US" dirty="0">
+              <a:latin typeface="Palatino Linotype" pitchFamily="18" charset="0"/>
+            </a:endParaRPr>
+          </a:p>
+        </p:txBody>
+      </p:sp>
+      <p:sp>
+        <p:nvSpPr>
+          <p:cNvPr id="3" name="Content Placeholder 2"/>
+          <p:cNvSpPr>
+            <a:spLocks noGrp="1"/>
+          </p:cNvSpPr>
+          <p:nvPr>
+            <p:ph idx="1"/>
+          </p:nvPr>
+        </p:nvSpPr>
+        <p:spPr>
+          <a:xfrm>
+            <a:off x="457200" y="1447800"/>
+            <a:ext cx="8229600" cy="2819400"/>
+          </a:xfrm>
+        </p:spPr>
+        <p:txBody>
+          <a:bodyPr>
+            <a:normAutofit fontScale="70000" lnSpcReduction="20000"/>
+          </a:bodyPr>
+          <a:lstStyle/>
+          <a:p>
+            <a:pPr lvl="0"/>
+            <a:r>
+              <a:rPr lang="en-US" sz="3800" dirty="0">
+                <a:latin typeface="Palatino Linotype" pitchFamily="18" charset="0"/>
+              </a:rPr>
+              <a:t>Suppose all of the third graders at Wilson Elementary School take a math test.  The scores are normally distributed with </a:t>
+            </a:r>
+            <a:r>
+              <a:rPr lang="en-US" sz="3800" dirty="0">
+                <a:latin typeface="Palatino Linotype" pitchFamily="18" charset="0"/>
+                <a:sym typeface="Symbol"/>
+              </a:rPr>
+              <a:t></a:t>
+            </a:r>
+            <a:r>
+              <a:rPr lang="en-US" sz="3800" dirty="0">
+                <a:latin typeface="Palatino Linotype" pitchFamily="18" charset="0"/>
+              </a:rPr>
+              <a:t> = 75 and </a:t>
+            </a:r>
+            <a:r>
+              <a:rPr lang="en-US" sz="3800" dirty="0">
+                <a:latin typeface="Palatino Linotype" pitchFamily="18" charset="0"/>
+                <a:sym typeface="Symbol"/>
+              </a:rPr>
+              <a:t></a:t>
+            </a:r>
+            <a:r>
+              <a:rPr lang="en-US" sz="3800" dirty="0">
+                <a:latin typeface="Palatino Linotype" pitchFamily="18" charset="0"/>
+              </a:rPr>
+              <a:t> = 12.</a:t>
+            </a:r>
+          </a:p>
+          <a:p>
+            <a:pPr lvl="1"/>
+            <a:r>
+              <a:rPr lang="en-US" sz="3300" dirty="0" smtClean="0">
+                <a:latin typeface="Palatino Linotype" pitchFamily="18" charset="0"/>
+              </a:rPr>
+              <a:t>(</a:t>
+            </a:r>
+            <a:r>
+              <a:rPr lang="en-US" sz="3300" dirty="0">
+                <a:latin typeface="Palatino Linotype" pitchFamily="18" charset="0"/>
+              </a:rPr>
+              <a:t>b) Suppose a sample of 16 third graders is selected from Wilson Elementary School.  What is the probability that the mean math test score for the sample is greater than 81?</a:t>
+            </a:r>
+          </a:p>
+          <a:p>
+            <a:endParaRPr lang="en-US" dirty="0">
+              <a:latin typeface="Palatino Linotype" pitchFamily="18" charset="0"/>
+            </a:endParaRPr>
+          </a:p>
+        </p:txBody>
+      </p:sp>
+      <p:sp>
+        <p:nvSpPr>
+          <p:cNvPr id="4" name="Slide Number Placeholder 3"/>
+          <p:cNvSpPr>
+            <a:spLocks noGrp="1"/>
+          </p:cNvSpPr>
+          <p:nvPr>
+            <p:ph type="sldNum" sz="quarter" idx="12"/>
+          </p:nvPr>
+        </p:nvSpPr>
+        <p:spPr/>
+        <p:txBody>
+          <a:bodyPr/>
+          <a:lstStyle/>
+          <a:p>
+            <a:fld id="{BC036538-61FF-498C-AE50-3DCC7CF1F650}" type="slidenum">
+              <a:rPr lang="en-US" smtClean="0"/>
+              <a:t>51</a:t>
+            </a:fld>
+            <a:endParaRPr lang="en-US"/>
+          </a:p>
+        </p:txBody>
+      </p:sp>
+      <p:sp>
+        <p:nvSpPr>
+          <p:cNvPr id="5" name="Rounded Rectangle 4"/>
+          <p:cNvSpPr/>
+          <p:nvPr/>
+        </p:nvSpPr>
+        <p:spPr>
+          <a:xfrm>
+            <a:off x="838200" y="4114800"/>
+            <a:ext cx="7696200" cy="1905000"/>
+          </a:xfrm>
+          <a:prstGeom prst="roundRect">
+            <a:avLst/>
+          </a:prstGeom>
+        </p:spPr>
+        <p:style>
+          <a:lnRef idx="1">
+            <a:schemeClr val="accent1"/>
+          </a:lnRef>
+          <a:fillRef idx="3">
+            <a:schemeClr val="accent1"/>
+          </a:fillRef>
+          <a:effectRef idx="2">
+            <a:schemeClr val="accent1"/>
+          </a:effectRef>
+          <a:fontRef idx="minor">
+            <a:schemeClr val="lt1"/>
+          </a:fontRef>
+        </p:style>
+        <p:txBody>
+          <a:bodyPr rtlCol="0" anchor="ctr"/>
+          <a:lstStyle/>
+          <a:p>
+            <a:r>
+              <a:rPr lang="mr-IN" dirty="0"/>
+              <a:t>&gt; 1-pnorm(81,mean=75, sd=12)</a:t>
+            </a:r>
+          </a:p>
+          <a:p>
+            <a:r>
+              <a:rPr lang="mr-IN" dirty="0"/>
+              <a:t>[1] 0.3085375</a:t>
+            </a:r>
+            <a:endParaRPr lang="en-US" dirty="0"/>
+          </a:p>
+        </p:txBody>
+      </p:sp>
+    </p:spTree>
+    <p:extLst>
+      <p:ext uri="{BB962C8B-B14F-4D97-AF65-F5344CB8AC3E}">
+        <p14:creationId xmlns:p14="http://schemas.microsoft.com/office/powerpoint/2010/main" val="3432182269"/>
+      </p:ext>
+    </p:extLst>
+  </p:cSld>
+  <p:clrMapOvr>
+    <a:masterClrMapping/>
+  </p:clrMapOvr>
+</p:sld>
+</file>
+
+<file path=ppt/slides/slide52.xml><?xml version="1.0" encoding="utf-8"?>
+<p:sld xmlns:a="http://schemas.openxmlformats.org/drawingml/2006/main" xmlns:r="http://schemas.openxmlformats.org/officeDocument/2006/relationships" xmlns:p="http://schemas.openxmlformats.org/presentationml/2006/main">
+  <p:cSld>
+    <p:spTree>
+      <p:nvGrpSpPr>
+        <p:cNvPr id="1" name=""/>
+        <p:cNvGrpSpPr/>
+        <p:nvPr/>
+      </p:nvGrpSpPr>
+      <p:grpSpPr>
+        <a:xfrm>
+          <a:off x="0" y="0"/>
+          <a:ext cx="0" cy="0"/>
+          <a:chOff x="0" y="0"/>
+          <a:chExt cx="0" cy="0"/>
+        </a:xfrm>
+      </p:grpSpPr>
+      <p:sp>
+        <p:nvSpPr>
+          <p:cNvPr id="2" name="Title 1"/>
+          <p:cNvSpPr>
+            <a:spLocks noGrp="1"/>
+          </p:cNvSpPr>
+          <p:nvPr>
+            <p:ph type="title"/>
+          </p:nvPr>
+        </p:nvSpPr>
+        <p:spPr/>
+        <p:txBody>
+          <a:bodyPr>
+            <a:normAutofit/>
+          </a:bodyPr>
+          <a:lstStyle/>
+          <a:p>
+            <a:r>
+              <a:rPr lang="en-US" sz="4000" b="1" dirty="0">
+                <a:solidFill>
+                  <a:srgbClr val="000099"/>
+                </a:solidFill>
+                <a:latin typeface="Palatino Linotype" pitchFamily="18" charset="0"/>
+                <a:ea typeface="Cambria Math" pitchFamily="18" charset="0"/>
+              </a:rPr>
+              <a:t>Summary</a:t>
+            </a:r>
+          </a:p>
+        </p:txBody>
+      </p:sp>
+      <p:sp>
+        <p:nvSpPr>
+          <p:cNvPr id="3" name="Content Placeholder 2"/>
+          <p:cNvSpPr>
+            <a:spLocks noGrp="1"/>
+          </p:cNvSpPr>
+          <p:nvPr>
+            <p:ph idx="1"/>
+          </p:nvPr>
+        </p:nvSpPr>
+        <p:spPr/>
+        <p:txBody>
+          <a:bodyPr/>
+          <a:lstStyle/>
+          <a:p>
+            <a:r>
+              <a:rPr lang="en-US" dirty="0">
+                <a:latin typeface="Palatino Linotype" pitchFamily="18" charset="0"/>
+              </a:rPr>
+              <a:t>Sampling distribution</a:t>
+            </a:r>
+          </a:p>
+          <a:p>
+            <a:pPr lvl="1"/>
+            <a:r>
+              <a:rPr lang="en-US" dirty="0">
+                <a:latin typeface="Palatino Linotype" pitchFamily="18" charset="0"/>
+              </a:rPr>
+              <a:t>Mean, standard error, and shape</a:t>
+            </a:r>
+          </a:p>
+          <a:p>
+            <a:pPr lvl="1"/>
+            <a:r>
+              <a:rPr lang="en-US" dirty="0">
+                <a:latin typeface="Palatino Linotype" pitchFamily="18" charset="0"/>
+              </a:rPr>
+              <a:t>Central limit theorem</a:t>
+            </a:r>
+          </a:p>
+          <a:p>
+            <a:r>
+              <a:rPr lang="en-US" dirty="0">
+                <a:latin typeface="Palatino Linotype" pitchFamily="18" charset="0"/>
+              </a:rPr>
+              <a:t>Z-score &amp; probability</a:t>
+            </a:r>
+          </a:p>
+        </p:txBody>
+      </p:sp>
+      <p:sp>
+        <p:nvSpPr>
+          <p:cNvPr id="4" name="Slide Number Placeholder 3"/>
+          <p:cNvSpPr>
+            <a:spLocks noGrp="1"/>
+          </p:cNvSpPr>
+          <p:nvPr>
+            <p:ph type="sldNum" sz="quarter" idx="12"/>
+          </p:nvPr>
+        </p:nvSpPr>
+        <p:spPr/>
+        <p:txBody>
+          <a:bodyPr/>
+          <a:lstStyle/>
+          <a:p>
+            <a:fld id="{BC036538-61FF-498C-AE50-3DCC7CF1F650}" type="slidenum">
+              <a:rPr lang="en-US" smtClean="0"/>
+              <a:t>52</a:t>
+            </a:fld>
+            <a:endParaRPr lang="en-US"/>
+          </a:p>
+        </p:txBody>
+      </p:sp>
+    </p:spTree>
+    <p:extLst>
+      <p:ext uri="{BB962C8B-B14F-4D97-AF65-F5344CB8AC3E}">
+        <p14:creationId xmlns:p14="http://schemas.microsoft.com/office/powerpoint/2010/main" val="1593491745"/>
       </p:ext>
     </p:extLst>
   </p:cSld>

</xml_diff>